<commit_message>
Reviewed Angular samples, also added some slides
</commit_message>
<xml_diff>
--- a/ReactiveProgramming_RxJS.pptx
+++ b/ReactiveProgramming_RxJS.pptx
@@ -5,10 +5,10 @@
     <p:sldMasterId id="2147483793" r:id="rId1"/>
   </p:sldMasterIdLst>
   <p:notesMasterIdLst>
-    <p:notesMasterId r:id="rId24"/>
+    <p:notesMasterId r:id="rId32"/>
   </p:notesMasterIdLst>
   <p:handoutMasterIdLst>
-    <p:handoutMasterId r:id="rId25"/>
+    <p:handoutMasterId r:id="rId33"/>
   </p:handoutMasterIdLst>
   <p:sldIdLst>
     <p:sldId id="292" r:id="rId2"/>
@@ -30,9 +30,17 @@
     <p:sldId id="434" r:id="rId18"/>
     <p:sldId id="436" r:id="rId19"/>
     <p:sldId id="437" r:id="rId20"/>
-    <p:sldId id="407" r:id="rId21"/>
-    <p:sldId id="419" r:id="rId22"/>
-    <p:sldId id="416" r:id="rId23"/>
+    <p:sldId id="438" r:id="rId21"/>
+    <p:sldId id="439" r:id="rId22"/>
+    <p:sldId id="441" r:id="rId23"/>
+    <p:sldId id="442" r:id="rId24"/>
+    <p:sldId id="443" r:id="rId25"/>
+    <p:sldId id="444" r:id="rId26"/>
+    <p:sldId id="445" r:id="rId27"/>
+    <p:sldId id="440" r:id="rId28"/>
+    <p:sldId id="407" r:id="rId29"/>
+    <p:sldId id="419" r:id="rId30"/>
+    <p:sldId id="416" r:id="rId31"/>
   </p:sldIdLst>
   <p:sldSz cx="12192000" cy="6858000"/>
   <p:notesSz cx="6858000" cy="9144000"/>
@@ -807,7 +815,7 @@
           <a:p>
             <a:fld id="{C519897D-FFB3-4111-B327-449DADBE2990}" type="slidenum">
               <a:rPr lang="en-US" smtClean="0"/>
-              <a:t>20</a:t>
+              <a:t>28</a:t>
             </a:fld>
             <a:endParaRPr lang="en-US"/>
           </a:p>
@@ -891,7 +899,7 @@
           <a:p>
             <a:fld id="{C519897D-FFB3-4111-B327-449DADBE2990}" type="slidenum">
               <a:rPr lang="en-US" smtClean="0"/>
-              <a:t>21</a:t>
+              <a:t>29</a:t>
             </a:fld>
             <a:endParaRPr lang="en-US"/>
           </a:p>
@@ -975,7 +983,7 @@
           <a:p>
             <a:fld id="{C519897D-FFB3-4111-B327-449DADBE2990}" type="slidenum">
               <a:rPr lang="en-US" smtClean="0"/>
-              <a:t>22</a:t>
+              <a:t>30</a:t>
             </a:fld>
             <a:endParaRPr lang="en-US"/>
           </a:p>
@@ -6890,7 +6898,6 @@
               <a:rPr lang="it-IT" dirty="0" smtClean="0"/>
               <a:t> Programming:</a:t>
             </a:r>
-            <a:endParaRPr lang="it-IT" dirty="0" smtClean="0"/>
           </a:p>
           <a:p>
             <a:endParaRPr lang="it-IT" dirty="0" smtClean="0"/>
@@ -7239,6 +7246,2370 @@
           <a:lstStyle/>
           <a:p>
             <a:r>
+              <a:rPr lang="it-IT" dirty="0" err="1" smtClean="0"/>
+              <a:t>Angular</a:t>
+            </a:r>
+            <a:r>
+              <a:rPr lang="it-IT" dirty="0" smtClean="0"/>
+              <a:t> &amp; </a:t>
+            </a:r>
+            <a:r>
+              <a:rPr lang="it-IT" dirty="0" err="1" smtClean="0"/>
+              <a:t>RxJS</a:t>
+            </a:r>
+            <a:endParaRPr lang="it-IT" dirty="0"/>
+          </a:p>
+        </p:txBody>
+      </p:sp>
+      <p:sp>
+        <p:nvSpPr>
+          <p:cNvPr id="5" name="Segnaposto contenuto 4"/>
+          <p:cNvSpPr>
+            <a:spLocks noGrp="1"/>
+          </p:cNvSpPr>
+          <p:nvPr>
+            <p:ph idx="1"/>
+          </p:nvPr>
+        </p:nvSpPr>
+        <p:spPr/>
+        <p:txBody>
+          <a:bodyPr>
+            <a:noAutofit/>
+          </a:bodyPr>
+          <a:lstStyle/>
+          <a:p>
+            <a:endParaRPr lang="it-IT" sz="2800" dirty="0" smtClean="0"/>
+          </a:p>
+          <a:p>
+            <a:r>
+              <a:rPr lang="it-IT" sz="2800" dirty="0" err="1" smtClean="0"/>
+              <a:t>Observables</a:t>
+            </a:r>
+            <a:r>
+              <a:rPr lang="it-IT" sz="2800" dirty="0" smtClean="0"/>
+              <a:t> are </a:t>
+            </a:r>
+            <a:r>
+              <a:rPr lang="it-IT" sz="2800" dirty="0" err="1" smtClean="0"/>
+              <a:t>widely</a:t>
+            </a:r>
+            <a:r>
+              <a:rPr lang="it-IT" sz="2800" dirty="0" smtClean="0"/>
+              <a:t> </a:t>
+            </a:r>
+            <a:r>
+              <a:rPr lang="it-IT" sz="2800" dirty="0" err="1" smtClean="0"/>
+              <a:t>used</a:t>
+            </a:r>
+            <a:r>
+              <a:rPr lang="it-IT" sz="2800" dirty="0" smtClean="0"/>
+              <a:t> in </a:t>
+            </a:r>
+            <a:r>
+              <a:rPr lang="it-IT" sz="2800" dirty="0" err="1" smtClean="0"/>
+              <a:t>Angular</a:t>
+            </a:r>
+            <a:r>
+              <a:rPr lang="it-IT" sz="2800" dirty="0" smtClean="0"/>
+              <a:t>.</a:t>
+            </a:r>
+          </a:p>
+          <a:p>
+            <a:endParaRPr lang="it-IT" sz="2800" dirty="0" smtClean="0"/>
+          </a:p>
+          <a:p>
+            <a:r>
+              <a:rPr lang="it-IT" sz="2800" dirty="0" smtClean="0"/>
+              <a:t>The </a:t>
+            </a:r>
+            <a:r>
+              <a:rPr lang="it-IT" sz="2800" dirty="0" err="1" smtClean="0"/>
+              <a:t>Observables</a:t>
+            </a:r>
+            <a:r>
+              <a:rPr lang="it-IT" sz="2800" dirty="0" smtClean="0"/>
+              <a:t> </a:t>
+            </a:r>
+            <a:r>
+              <a:rPr lang="it-IT" sz="2800" dirty="0" err="1" smtClean="0"/>
+              <a:t>exposed</a:t>
+            </a:r>
+            <a:r>
+              <a:rPr lang="it-IT" sz="2800" dirty="0" smtClean="0"/>
+              <a:t> by </a:t>
+            </a:r>
+            <a:r>
+              <a:rPr lang="it-IT" sz="2800" dirty="0" err="1" smtClean="0"/>
+              <a:t>Angular</a:t>
+            </a:r>
+            <a:r>
+              <a:rPr lang="it-IT" sz="2800" dirty="0" smtClean="0"/>
+              <a:t> </a:t>
+            </a:r>
+            <a:r>
+              <a:rPr lang="it-IT" sz="2800" dirty="0" err="1" smtClean="0"/>
+              <a:t>built</a:t>
+            </a:r>
+            <a:r>
+              <a:rPr lang="it-IT" sz="2800" dirty="0" smtClean="0"/>
+              <a:t>-in </a:t>
+            </a:r>
+            <a:r>
+              <a:rPr lang="it-IT" sz="2800" dirty="0" err="1" smtClean="0"/>
+              <a:t>services</a:t>
+            </a:r>
+            <a:r>
+              <a:rPr lang="it-IT" sz="2800" dirty="0" smtClean="0"/>
+              <a:t> (</a:t>
+            </a:r>
+            <a:r>
+              <a:rPr lang="it-IT" sz="2800" dirty="0" err="1" smtClean="0"/>
+              <a:t>like</a:t>
+            </a:r>
+            <a:r>
+              <a:rPr lang="it-IT" sz="2800" dirty="0" smtClean="0"/>
+              <a:t> Http from </a:t>
+            </a:r>
+            <a:r>
+              <a:rPr lang="it-IT" sz="2800" dirty="0" err="1" smtClean="0"/>
+              <a:t>HttpModule</a:t>
+            </a:r>
+            <a:r>
+              <a:rPr lang="it-IT" sz="2800" dirty="0" smtClean="0"/>
+              <a:t>) are </a:t>
+            </a:r>
+            <a:r>
+              <a:rPr lang="it-IT" sz="2800" b="1" dirty="0" err="1" smtClean="0">
+                <a:solidFill>
+                  <a:srgbClr val="0070C0"/>
+                </a:solidFill>
+              </a:rPr>
+              <a:t>Unicast</a:t>
+            </a:r>
+            <a:r>
+              <a:rPr lang="it-IT" sz="2800" dirty="0" smtClean="0"/>
+              <a:t>, so </a:t>
+            </a:r>
+            <a:r>
+              <a:rPr lang="it-IT" sz="2800" dirty="0" err="1" smtClean="0"/>
+              <a:t>they</a:t>
+            </a:r>
+            <a:r>
+              <a:rPr lang="it-IT" sz="2800" dirty="0" smtClean="0"/>
+              <a:t> are </a:t>
+            </a:r>
+            <a:r>
+              <a:rPr lang="it-IT" sz="2800" dirty="0" err="1" smtClean="0"/>
+              <a:t>not</a:t>
+            </a:r>
+            <a:r>
+              <a:rPr lang="it-IT" sz="2800" dirty="0" smtClean="0"/>
+              <a:t> </a:t>
+            </a:r>
+            <a:r>
+              <a:rPr lang="it-IT" sz="2800" dirty="0" err="1" smtClean="0"/>
+              <a:t>shared</a:t>
+            </a:r>
+            <a:r>
+              <a:rPr lang="it-IT" sz="2800" dirty="0" smtClean="0"/>
+              <a:t> </a:t>
+            </a:r>
+            <a:r>
+              <a:rPr lang="it-IT" sz="2800" dirty="0" err="1" smtClean="0"/>
+              <a:t>between</a:t>
+            </a:r>
+            <a:r>
+              <a:rPr lang="it-IT" sz="2800" dirty="0" smtClean="0"/>
+              <a:t> </a:t>
+            </a:r>
+            <a:r>
+              <a:rPr lang="it-IT" sz="2800" dirty="0" err="1" smtClean="0"/>
+              <a:t>subscriptions</a:t>
+            </a:r>
+            <a:r>
+              <a:rPr lang="it-IT" sz="2800" dirty="0" smtClean="0"/>
+              <a:t>.</a:t>
+            </a:r>
+          </a:p>
+        </p:txBody>
+      </p:sp>
+    </p:spTree>
+    <p:extLst>
+      <p:ext uri="{BB962C8B-B14F-4D97-AF65-F5344CB8AC3E}">
+        <p14:creationId xmlns:p14="http://schemas.microsoft.com/office/powerpoint/2010/main" val="997846537"/>
+      </p:ext>
+    </p:extLst>
+  </p:cSld>
+  <p:clrMapOvr>
+    <a:masterClrMapping/>
+  </p:clrMapOvr>
+  <p:timing>
+    <p:tnLst>
+      <p:par>
+        <p:cTn id="1" dur="indefinite" restart="never" nodeType="tmRoot">
+          <p:childTnLst>
+            <p:seq concurrent="1" nextAc="seek">
+              <p:cTn id="2" dur="indefinite" nodeType="mainSeq">
+                <p:childTnLst>
+                  <p:par>
+                    <p:cTn id="3" fill="hold">
+                      <p:stCondLst>
+                        <p:cond delay="indefinite"/>
+                        <p:cond evt="onBegin" delay="0">
+                          <p:tn val="2"/>
+                        </p:cond>
+                      </p:stCondLst>
+                      <p:childTnLst>
+                        <p:par>
+                          <p:cTn id="4" fill="hold">
+                            <p:stCondLst>
+                              <p:cond delay="0"/>
+                            </p:stCondLst>
+                            <p:childTnLst>
+                              <p:par>
+                                <p:cTn id="5" presetID="10" presetClass="entr" presetSubtype="0" fill="hold" nodeType="afterEffect">
+                                  <p:stCondLst>
+                                    <p:cond delay="0"/>
+                                  </p:stCondLst>
+                                  <p:childTnLst>
+                                    <p:set>
+                                      <p:cBhvr>
+                                        <p:cTn id="6" dur="1" fill="hold">
+                                          <p:stCondLst>
+                                            <p:cond delay="0"/>
+                                          </p:stCondLst>
+                                        </p:cTn>
+                                        <p:tgtEl>
+                                          <p:spTgt spid="5">
+                                            <p:txEl>
+                                              <p:pRg st="1" end="1"/>
+                                            </p:txEl>
+                                          </p:spTgt>
+                                        </p:tgtEl>
+                                        <p:attrNameLst>
+                                          <p:attrName>style.visibility</p:attrName>
+                                        </p:attrNameLst>
+                                      </p:cBhvr>
+                                      <p:to>
+                                        <p:strVal val="visible"/>
+                                      </p:to>
+                                    </p:set>
+                                    <p:animEffect transition="in" filter="fade">
+                                      <p:cBhvr>
+                                        <p:cTn id="7" dur="500"/>
+                                        <p:tgtEl>
+                                          <p:spTgt spid="5">
+                                            <p:txEl>
+                                              <p:pRg st="1" end="1"/>
+                                            </p:txEl>
+                                          </p:spTgt>
+                                        </p:tgtEl>
+                                      </p:cBhvr>
+                                    </p:animEffect>
+                                  </p:childTnLst>
+                                </p:cTn>
+                              </p:par>
+                            </p:childTnLst>
+                          </p:cTn>
+                        </p:par>
+                        <p:par>
+                          <p:cTn id="8" fill="hold">
+                            <p:stCondLst>
+                              <p:cond delay="500"/>
+                            </p:stCondLst>
+                            <p:childTnLst>
+                              <p:par>
+                                <p:cTn id="9" presetID="10" presetClass="entr" presetSubtype="0" fill="hold" nodeType="afterEffect">
+                                  <p:stCondLst>
+                                    <p:cond delay="0"/>
+                                  </p:stCondLst>
+                                  <p:childTnLst>
+                                    <p:set>
+                                      <p:cBhvr>
+                                        <p:cTn id="10" dur="1" fill="hold">
+                                          <p:stCondLst>
+                                            <p:cond delay="0"/>
+                                          </p:stCondLst>
+                                        </p:cTn>
+                                        <p:tgtEl>
+                                          <p:spTgt spid="5">
+                                            <p:txEl>
+                                              <p:pRg st="3" end="3"/>
+                                            </p:txEl>
+                                          </p:spTgt>
+                                        </p:tgtEl>
+                                        <p:attrNameLst>
+                                          <p:attrName>style.visibility</p:attrName>
+                                        </p:attrNameLst>
+                                      </p:cBhvr>
+                                      <p:to>
+                                        <p:strVal val="visible"/>
+                                      </p:to>
+                                    </p:set>
+                                    <p:animEffect transition="in" filter="fade">
+                                      <p:cBhvr>
+                                        <p:cTn id="11" dur="500"/>
+                                        <p:tgtEl>
+                                          <p:spTgt spid="5">
+                                            <p:txEl>
+                                              <p:pRg st="3" end="3"/>
+                                            </p:txEl>
+                                          </p:spTgt>
+                                        </p:tgtEl>
+                                      </p:cBhvr>
+                                    </p:animEffect>
+                                  </p:childTnLst>
+                                </p:cTn>
+                              </p:par>
+                            </p:childTnLst>
+                          </p:cTn>
+                        </p:par>
+                      </p:childTnLst>
+                    </p:cTn>
+                  </p:par>
+                </p:childTnLst>
+              </p:cTn>
+              <p:prevCondLst>
+                <p:cond evt="onPrev" delay="0">
+                  <p:tgtEl>
+                    <p:sldTgt/>
+                  </p:tgtEl>
+                </p:cond>
+              </p:prevCondLst>
+              <p:nextCondLst>
+                <p:cond evt="onNext" delay="0">
+                  <p:tgtEl>
+                    <p:sldTgt/>
+                  </p:tgtEl>
+                </p:cond>
+              </p:nextCondLst>
+            </p:seq>
+          </p:childTnLst>
+        </p:cTn>
+      </p:par>
+    </p:tnLst>
+  </p:timing>
+</p:sld>
+</file>
+
+<file path=ppt/slides/slide21.xml><?xml version="1.0" encoding="utf-8"?>
+<p:sld xmlns:a="http://schemas.openxmlformats.org/drawingml/2006/main" xmlns:r="http://schemas.openxmlformats.org/officeDocument/2006/relationships" xmlns:p="http://schemas.openxmlformats.org/presentationml/2006/main">
+  <p:cSld>
+    <p:spTree>
+      <p:nvGrpSpPr>
+        <p:cNvPr id="1" name=""/>
+        <p:cNvGrpSpPr/>
+        <p:nvPr/>
+      </p:nvGrpSpPr>
+      <p:grpSpPr>
+        <a:xfrm>
+          <a:off x="0" y="0"/>
+          <a:ext cx="0" cy="0"/>
+          <a:chOff x="0" y="0"/>
+          <a:chExt cx="0" cy="0"/>
+        </a:xfrm>
+      </p:grpSpPr>
+      <p:sp>
+        <p:nvSpPr>
+          <p:cNvPr id="4" name="Titolo 3"/>
+          <p:cNvSpPr>
+            <a:spLocks noGrp="1"/>
+          </p:cNvSpPr>
+          <p:nvPr>
+            <p:ph type="title"/>
+          </p:nvPr>
+        </p:nvSpPr>
+        <p:spPr/>
+        <p:txBody>
+          <a:bodyPr/>
+          <a:lstStyle/>
+          <a:p>
+            <a:r>
+              <a:rPr lang="it-IT" dirty="0" err="1" smtClean="0"/>
+              <a:t>Consuming</a:t>
+            </a:r>
+            <a:r>
+              <a:rPr lang="it-IT" dirty="0" smtClean="0"/>
+              <a:t> </a:t>
+            </a:r>
+            <a:r>
+              <a:rPr lang="it-IT" dirty="0" err="1" smtClean="0"/>
+              <a:t>Observables</a:t>
+            </a:r>
+            <a:endParaRPr lang="it-IT" dirty="0"/>
+          </a:p>
+        </p:txBody>
+      </p:sp>
+      <p:sp>
+        <p:nvSpPr>
+          <p:cNvPr id="5" name="Segnaposto contenuto 4"/>
+          <p:cNvSpPr>
+            <a:spLocks noGrp="1"/>
+          </p:cNvSpPr>
+          <p:nvPr>
+            <p:ph idx="1"/>
+          </p:nvPr>
+        </p:nvSpPr>
+        <p:spPr/>
+        <p:txBody>
+          <a:bodyPr/>
+          <a:lstStyle/>
+          <a:p>
+            <a:endParaRPr lang="it-IT" dirty="0" smtClean="0"/>
+          </a:p>
+          <a:p>
+            <a:r>
+              <a:rPr lang="it-IT" sz="2800" dirty="0" smtClean="0"/>
+              <a:t>To </a:t>
+            </a:r>
+            <a:r>
+              <a:rPr lang="it-IT" sz="2800" dirty="0" err="1" smtClean="0"/>
+              <a:t>consume</a:t>
+            </a:r>
+            <a:r>
+              <a:rPr lang="it-IT" sz="2800" dirty="0" smtClean="0"/>
+              <a:t> the </a:t>
+            </a:r>
+            <a:r>
+              <a:rPr lang="it-IT" sz="2800" dirty="0" err="1" smtClean="0"/>
+              <a:t>Observables</a:t>
+            </a:r>
+            <a:r>
+              <a:rPr lang="it-IT" sz="2800" dirty="0" smtClean="0"/>
+              <a:t> </a:t>
+            </a:r>
+            <a:r>
+              <a:rPr lang="it-IT" sz="2800" dirty="0" err="1" smtClean="0"/>
+              <a:t>you</a:t>
+            </a:r>
+            <a:r>
+              <a:rPr lang="it-IT" sz="2800" dirty="0" smtClean="0"/>
+              <a:t> can:</a:t>
+            </a:r>
+          </a:p>
+          <a:p>
+            <a:endParaRPr lang="it-IT" sz="2800" dirty="0" smtClean="0"/>
+          </a:p>
+          <a:p>
+            <a:pPr>
+              <a:buFont typeface="Arial" panose="020B0604020202020204" pitchFamily="34" charset="0"/>
+              <a:buChar char="•"/>
+            </a:pPr>
+            <a:r>
+              <a:rPr lang="it-IT" sz="2800" b="1" dirty="0" err="1" smtClean="0">
+                <a:solidFill>
+                  <a:srgbClr val="0070C0"/>
+                </a:solidFill>
+              </a:rPr>
+              <a:t>Explicitly</a:t>
+            </a:r>
+            <a:r>
+              <a:rPr lang="it-IT" sz="2800" b="1" dirty="0" smtClean="0">
+                <a:solidFill>
+                  <a:srgbClr val="0070C0"/>
+                </a:solidFill>
+              </a:rPr>
+              <a:t> </a:t>
+            </a:r>
+            <a:r>
+              <a:rPr lang="it-IT" sz="2800" b="1" dirty="0" err="1" smtClean="0">
+                <a:solidFill>
+                  <a:srgbClr val="0070C0"/>
+                </a:solidFill>
+              </a:rPr>
+              <a:t>subscribe</a:t>
+            </a:r>
+            <a:r>
+              <a:rPr lang="it-IT" sz="2800" b="1" dirty="0" smtClean="0">
+                <a:solidFill>
+                  <a:srgbClr val="0070C0"/>
+                </a:solidFill>
+              </a:rPr>
+              <a:t> </a:t>
+            </a:r>
+            <a:r>
+              <a:rPr lang="it-IT" sz="2800" dirty="0" smtClean="0"/>
+              <a:t>and </a:t>
+            </a:r>
+            <a:r>
+              <a:rPr lang="it-IT" sz="2800" dirty="0" err="1" smtClean="0"/>
+              <a:t>assign</a:t>
+            </a:r>
+            <a:r>
+              <a:rPr lang="it-IT" sz="2800" dirty="0" smtClean="0"/>
+              <a:t> the data to public </a:t>
+            </a:r>
+            <a:r>
+              <a:rPr lang="it-IT" sz="2800" dirty="0" err="1" smtClean="0"/>
+              <a:t>properties</a:t>
+            </a:r>
+            <a:r>
+              <a:rPr lang="it-IT" sz="2800" dirty="0" smtClean="0"/>
+              <a:t> of the </a:t>
+            </a:r>
+            <a:r>
+              <a:rPr lang="it-IT" sz="2800" dirty="0" err="1" smtClean="0"/>
+              <a:t>components</a:t>
+            </a:r>
+            <a:r>
+              <a:rPr lang="it-IT" sz="2800" dirty="0" smtClean="0"/>
+              <a:t>.</a:t>
+            </a:r>
+          </a:p>
+          <a:p>
+            <a:pPr>
+              <a:buFont typeface="Arial" panose="020B0604020202020204" pitchFamily="34" charset="0"/>
+              <a:buChar char="•"/>
+            </a:pPr>
+            <a:endParaRPr lang="it-IT" sz="2800" dirty="0"/>
+          </a:p>
+          <a:p>
+            <a:pPr>
+              <a:buFont typeface="Arial" panose="020B0604020202020204" pitchFamily="34" charset="0"/>
+              <a:buChar char="•"/>
+            </a:pPr>
+            <a:r>
+              <a:rPr lang="it-IT" sz="2800" dirty="0" smtClean="0"/>
+              <a:t>(</a:t>
+            </a:r>
+            <a:r>
+              <a:rPr lang="it-IT" sz="2800" dirty="0" err="1" smtClean="0"/>
+              <a:t>Recommended</a:t>
+            </a:r>
+            <a:r>
+              <a:rPr lang="it-IT" sz="2800" dirty="0" smtClean="0"/>
+              <a:t> way) </a:t>
+            </a:r>
+            <a:r>
+              <a:rPr lang="it-IT" sz="2800" b="1" dirty="0" err="1" smtClean="0">
+                <a:solidFill>
+                  <a:srgbClr val="0070C0"/>
+                </a:solidFill>
+              </a:rPr>
+              <a:t>AsyncPipe</a:t>
+            </a:r>
+            <a:r>
+              <a:rPr lang="it-IT" sz="2800" dirty="0" smtClean="0">
+                <a:solidFill>
+                  <a:srgbClr val="0070C0"/>
+                </a:solidFill>
+              </a:rPr>
+              <a:t> </a:t>
+            </a:r>
+            <a:r>
+              <a:rPr lang="it-IT" sz="2800" dirty="0" smtClean="0"/>
+              <a:t>to </a:t>
+            </a:r>
+            <a:r>
+              <a:rPr lang="it-IT" sz="2800" dirty="0" err="1" smtClean="0"/>
+              <a:t>bind</a:t>
+            </a:r>
+            <a:r>
+              <a:rPr lang="it-IT" sz="2800" dirty="0" smtClean="0"/>
+              <a:t> </a:t>
+            </a:r>
+            <a:r>
+              <a:rPr lang="it-IT" sz="2800" dirty="0" smtClean="0"/>
+              <a:t>an </a:t>
+            </a:r>
+            <a:r>
+              <a:rPr lang="it-IT" sz="2800" dirty="0" err="1" smtClean="0"/>
+              <a:t>Observable</a:t>
+            </a:r>
+            <a:r>
+              <a:rPr lang="it-IT" sz="2800" dirty="0" smtClean="0"/>
+              <a:t> to the UI.</a:t>
+            </a:r>
+          </a:p>
+        </p:txBody>
+      </p:sp>
+    </p:spTree>
+    <p:extLst>
+      <p:ext uri="{BB962C8B-B14F-4D97-AF65-F5344CB8AC3E}">
+        <p14:creationId xmlns:p14="http://schemas.microsoft.com/office/powerpoint/2010/main" val="850859646"/>
+      </p:ext>
+    </p:extLst>
+  </p:cSld>
+  <p:clrMapOvr>
+    <a:masterClrMapping/>
+  </p:clrMapOvr>
+  <p:timing>
+    <p:tnLst>
+      <p:par>
+        <p:cTn id="1" dur="indefinite" restart="never" nodeType="tmRoot">
+          <p:childTnLst>
+            <p:seq concurrent="1" nextAc="seek">
+              <p:cTn id="2" dur="indefinite" nodeType="mainSeq">
+                <p:childTnLst>
+                  <p:par>
+                    <p:cTn id="3" fill="hold">
+                      <p:stCondLst>
+                        <p:cond delay="indefinite"/>
+                      </p:stCondLst>
+                      <p:childTnLst>
+                        <p:par>
+                          <p:cTn id="4" fill="hold">
+                            <p:stCondLst>
+                              <p:cond delay="0"/>
+                            </p:stCondLst>
+                            <p:childTnLst>
+                              <p:par>
+                                <p:cTn id="5" presetID="10" presetClass="entr" presetSubtype="0" fill="hold" nodeType="clickEffect">
+                                  <p:stCondLst>
+                                    <p:cond delay="0"/>
+                                  </p:stCondLst>
+                                  <p:childTnLst>
+                                    <p:set>
+                                      <p:cBhvr>
+                                        <p:cTn id="6" dur="1" fill="hold">
+                                          <p:stCondLst>
+                                            <p:cond delay="0"/>
+                                          </p:stCondLst>
+                                        </p:cTn>
+                                        <p:tgtEl>
+                                          <p:spTgt spid="5">
+                                            <p:txEl>
+                                              <p:pRg st="3" end="3"/>
+                                            </p:txEl>
+                                          </p:spTgt>
+                                        </p:tgtEl>
+                                        <p:attrNameLst>
+                                          <p:attrName>style.visibility</p:attrName>
+                                        </p:attrNameLst>
+                                      </p:cBhvr>
+                                      <p:to>
+                                        <p:strVal val="visible"/>
+                                      </p:to>
+                                    </p:set>
+                                    <p:animEffect transition="in" filter="fade">
+                                      <p:cBhvr>
+                                        <p:cTn id="7" dur="500"/>
+                                        <p:tgtEl>
+                                          <p:spTgt spid="5">
+                                            <p:txEl>
+                                              <p:pRg st="3" end="3"/>
+                                            </p:txEl>
+                                          </p:spTgt>
+                                        </p:tgtEl>
+                                      </p:cBhvr>
+                                    </p:animEffect>
+                                  </p:childTnLst>
+                                </p:cTn>
+                              </p:par>
+                            </p:childTnLst>
+                          </p:cTn>
+                        </p:par>
+                      </p:childTnLst>
+                    </p:cTn>
+                  </p:par>
+                  <p:par>
+                    <p:cTn id="8" fill="hold">
+                      <p:stCondLst>
+                        <p:cond delay="indefinite"/>
+                      </p:stCondLst>
+                      <p:childTnLst>
+                        <p:par>
+                          <p:cTn id="9" fill="hold">
+                            <p:stCondLst>
+                              <p:cond delay="0"/>
+                            </p:stCondLst>
+                            <p:childTnLst>
+                              <p:par>
+                                <p:cTn id="10" presetID="10" presetClass="entr" presetSubtype="0" fill="hold" nodeType="clickEffect">
+                                  <p:stCondLst>
+                                    <p:cond delay="0"/>
+                                  </p:stCondLst>
+                                  <p:childTnLst>
+                                    <p:set>
+                                      <p:cBhvr>
+                                        <p:cTn id="11" dur="1" fill="hold">
+                                          <p:stCondLst>
+                                            <p:cond delay="0"/>
+                                          </p:stCondLst>
+                                        </p:cTn>
+                                        <p:tgtEl>
+                                          <p:spTgt spid="5">
+                                            <p:txEl>
+                                              <p:pRg st="5" end="5"/>
+                                            </p:txEl>
+                                          </p:spTgt>
+                                        </p:tgtEl>
+                                        <p:attrNameLst>
+                                          <p:attrName>style.visibility</p:attrName>
+                                        </p:attrNameLst>
+                                      </p:cBhvr>
+                                      <p:to>
+                                        <p:strVal val="visible"/>
+                                      </p:to>
+                                    </p:set>
+                                    <p:animEffect transition="in" filter="fade">
+                                      <p:cBhvr>
+                                        <p:cTn id="12" dur="500"/>
+                                        <p:tgtEl>
+                                          <p:spTgt spid="5">
+                                            <p:txEl>
+                                              <p:pRg st="5" end="5"/>
+                                            </p:txEl>
+                                          </p:spTgt>
+                                        </p:tgtEl>
+                                      </p:cBhvr>
+                                    </p:animEffect>
+                                  </p:childTnLst>
+                                </p:cTn>
+                              </p:par>
+                            </p:childTnLst>
+                          </p:cTn>
+                        </p:par>
+                      </p:childTnLst>
+                    </p:cTn>
+                  </p:par>
+                </p:childTnLst>
+              </p:cTn>
+              <p:prevCondLst>
+                <p:cond evt="onPrev" delay="0">
+                  <p:tgtEl>
+                    <p:sldTgt/>
+                  </p:tgtEl>
+                </p:cond>
+              </p:prevCondLst>
+              <p:nextCondLst>
+                <p:cond evt="onNext" delay="0">
+                  <p:tgtEl>
+                    <p:sldTgt/>
+                  </p:tgtEl>
+                </p:cond>
+              </p:nextCondLst>
+            </p:seq>
+          </p:childTnLst>
+        </p:cTn>
+      </p:par>
+    </p:tnLst>
+  </p:timing>
+</p:sld>
+</file>
+
+<file path=ppt/slides/slide22.xml><?xml version="1.0" encoding="utf-8"?>
+<p:sld xmlns:a="http://schemas.openxmlformats.org/drawingml/2006/main" xmlns:r="http://schemas.openxmlformats.org/officeDocument/2006/relationships" xmlns:p="http://schemas.openxmlformats.org/presentationml/2006/main">
+  <p:cSld>
+    <p:spTree>
+      <p:nvGrpSpPr>
+        <p:cNvPr id="1" name=""/>
+        <p:cNvGrpSpPr/>
+        <p:nvPr/>
+      </p:nvGrpSpPr>
+      <p:grpSpPr>
+        <a:xfrm>
+          <a:off x="0" y="0"/>
+          <a:ext cx="0" cy="0"/>
+          <a:chOff x="0" y="0"/>
+          <a:chExt cx="0" cy="0"/>
+        </a:xfrm>
+      </p:grpSpPr>
+      <p:sp>
+        <p:nvSpPr>
+          <p:cNvPr id="4" name="Titolo 3"/>
+          <p:cNvSpPr>
+            <a:spLocks noGrp="1"/>
+          </p:cNvSpPr>
+          <p:nvPr>
+            <p:ph type="title"/>
+          </p:nvPr>
+        </p:nvSpPr>
+        <p:spPr/>
+        <p:txBody>
+          <a:bodyPr>
+            <a:normAutofit fontScale="90000"/>
+          </a:bodyPr>
+          <a:lstStyle/>
+          <a:p>
+            <a:r>
+              <a:rPr lang="it-IT" sz="6000" dirty="0" smtClean="0"/>
+              <a:t>Demo </a:t>
+            </a:r>
+            <a:r>
+              <a:rPr lang="it-IT" sz="6000" dirty="0" smtClean="0"/>
+              <a:t>01</a:t>
+            </a:r>
+            <a:r>
+              <a:rPr lang="it-IT" sz="6000" dirty="0" smtClean="0"/>
+              <a:t/>
+            </a:r>
+            <a:br>
+              <a:rPr lang="it-IT" sz="6000" dirty="0" smtClean="0"/>
+            </a:br>
+            <a:r>
+              <a:rPr lang="it-IT" dirty="0" smtClean="0"/>
+              <a:t/>
+            </a:r>
+            <a:br>
+              <a:rPr lang="it-IT" dirty="0" smtClean="0"/>
+            </a:br>
+            <a:r>
+              <a:rPr lang="it-IT" dirty="0" err="1" smtClean="0"/>
+              <a:t>Unicast</a:t>
+            </a:r>
+            <a:r>
+              <a:rPr lang="it-IT" dirty="0" smtClean="0"/>
+              <a:t> / </a:t>
+            </a:r>
+            <a:r>
+              <a:rPr lang="it-IT" dirty="0" err="1" smtClean="0"/>
+              <a:t>Cold</a:t>
+            </a:r>
+            <a:r>
+              <a:rPr lang="it-IT" dirty="0" smtClean="0"/>
+              <a:t> </a:t>
+            </a:r>
+            <a:r>
+              <a:rPr lang="it-IT" dirty="0" err="1" smtClean="0"/>
+              <a:t>Observables</a:t>
+            </a:r>
+            <a:endParaRPr lang="it-IT" dirty="0"/>
+          </a:p>
+        </p:txBody>
+      </p:sp>
+      <p:sp>
+        <p:nvSpPr>
+          <p:cNvPr id="5" name="Segnaposto testo 4"/>
+          <p:cNvSpPr>
+            <a:spLocks noGrp="1"/>
+          </p:cNvSpPr>
+          <p:nvPr>
+            <p:ph type="body" idx="1"/>
+          </p:nvPr>
+        </p:nvSpPr>
+        <p:spPr/>
+        <p:txBody>
+          <a:bodyPr/>
+          <a:lstStyle/>
+          <a:p>
+            <a:r>
+              <a:rPr lang="it-IT" dirty="0" err="1" smtClean="0"/>
+              <a:t>Beware</a:t>
+            </a:r>
+            <a:r>
+              <a:rPr lang="it-IT" dirty="0" smtClean="0"/>
+              <a:t> of </a:t>
+            </a:r>
+            <a:r>
+              <a:rPr lang="it-IT" dirty="0" err="1" smtClean="0"/>
+              <a:t>unicast</a:t>
+            </a:r>
+            <a:r>
+              <a:rPr lang="it-IT" dirty="0" smtClean="0"/>
+              <a:t> </a:t>
+            </a:r>
+            <a:r>
+              <a:rPr lang="it-IT" dirty="0" err="1" smtClean="0"/>
+              <a:t>observables</a:t>
+            </a:r>
+            <a:r>
+              <a:rPr lang="it-IT" dirty="0" smtClean="0"/>
+              <a:t> and multiple </a:t>
+            </a:r>
+            <a:r>
+              <a:rPr lang="it-IT" dirty="0" err="1" smtClean="0"/>
+              <a:t>subscriptions</a:t>
+            </a:r>
+            <a:endParaRPr lang="it-IT" dirty="0"/>
+          </a:p>
+        </p:txBody>
+      </p:sp>
+    </p:spTree>
+    <p:extLst>
+      <p:ext uri="{BB962C8B-B14F-4D97-AF65-F5344CB8AC3E}">
+        <p14:creationId xmlns:p14="http://schemas.microsoft.com/office/powerpoint/2010/main" val="2237372139"/>
+      </p:ext>
+    </p:extLst>
+  </p:cSld>
+  <p:clrMapOvr>
+    <a:masterClrMapping/>
+  </p:clrMapOvr>
+  <p:timing>
+    <p:tnLst>
+      <p:par>
+        <p:cTn id="1" dur="indefinite" restart="never" nodeType="tmRoot"/>
+      </p:par>
+    </p:tnLst>
+  </p:timing>
+</p:sld>
+</file>
+
+<file path=ppt/slides/slide23.xml><?xml version="1.0" encoding="utf-8"?>
+<p:sld xmlns:a="http://schemas.openxmlformats.org/drawingml/2006/main" xmlns:r="http://schemas.openxmlformats.org/officeDocument/2006/relationships" xmlns:p="http://schemas.openxmlformats.org/presentationml/2006/main">
+  <p:cSld>
+    <p:spTree>
+      <p:nvGrpSpPr>
+        <p:cNvPr id="1" name=""/>
+        <p:cNvGrpSpPr/>
+        <p:nvPr/>
+      </p:nvGrpSpPr>
+      <p:grpSpPr>
+        <a:xfrm>
+          <a:off x="0" y="0"/>
+          <a:ext cx="0" cy="0"/>
+          <a:chOff x="0" y="0"/>
+          <a:chExt cx="0" cy="0"/>
+        </a:xfrm>
+      </p:grpSpPr>
+      <p:sp>
+        <p:nvSpPr>
+          <p:cNvPr id="4" name="Titolo 3"/>
+          <p:cNvSpPr>
+            <a:spLocks noGrp="1"/>
+          </p:cNvSpPr>
+          <p:nvPr>
+            <p:ph type="title"/>
+          </p:nvPr>
+        </p:nvSpPr>
+        <p:spPr/>
+        <p:txBody>
+          <a:bodyPr>
+            <a:normAutofit/>
+          </a:bodyPr>
+          <a:lstStyle/>
+          <a:p>
+            <a:r>
+              <a:rPr lang="it-IT" sz="6000" dirty="0" smtClean="0"/>
+              <a:t>Demo </a:t>
+            </a:r>
+            <a:r>
+              <a:rPr lang="it-IT" sz="6000" dirty="0" smtClean="0"/>
+              <a:t>02</a:t>
+            </a:r>
+            <a:r>
+              <a:rPr lang="it-IT" sz="6000" dirty="0" smtClean="0"/>
+              <a:t/>
+            </a:r>
+            <a:br>
+              <a:rPr lang="it-IT" sz="6000" dirty="0" smtClean="0"/>
+            </a:br>
+            <a:r>
+              <a:rPr lang="it-IT" dirty="0" smtClean="0"/>
+              <a:t/>
+            </a:r>
+            <a:br>
+              <a:rPr lang="it-IT" dirty="0" smtClean="0"/>
+            </a:br>
+            <a:r>
+              <a:rPr lang="it-IT" dirty="0" smtClean="0"/>
+              <a:t>.</a:t>
+            </a:r>
+            <a:r>
+              <a:rPr lang="it-IT" dirty="0" err="1" smtClean="0"/>
+              <a:t>toPromise</a:t>
+            </a:r>
+            <a:r>
+              <a:rPr lang="it-IT" dirty="0" smtClean="0"/>
+              <a:t>()</a:t>
+            </a:r>
+            <a:endParaRPr lang="it-IT" dirty="0"/>
+          </a:p>
+        </p:txBody>
+      </p:sp>
+      <p:sp>
+        <p:nvSpPr>
+          <p:cNvPr id="5" name="Segnaposto testo 4"/>
+          <p:cNvSpPr>
+            <a:spLocks noGrp="1"/>
+          </p:cNvSpPr>
+          <p:nvPr>
+            <p:ph type="body" idx="1"/>
+          </p:nvPr>
+        </p:nvSpPr>
+        <p:spPr/>
+        <p:txBody>
+          <a:bodyPr>
+            <a:normAutofit fontScale="92500" lnSpcReduction="10000"/>
+          </a:bodyPr>
+          <a:lstStyle/>
+          <a:p>
+            <a:r>
+              <a:rPr lang="it-IT" dirty="0" smtClean="0"/>
+              <a:t>Go back to </a:t>
+            </a:r>
+            <a:r>
+              <a:rPr lang="it-IT" dirty="0" err="1" smtClean="0"/>
+              <a:t>promises</a:t>
+            </a:r>
+            <a:r>
+              <a:rPr lang="it-IT" dirty="0" smtClean="0"/>
+              <a:t> to mitigate the multiple </a:t>
+            </a:r>
+            <a:r>
+              <a:rPr lang="it-IT" dirty="0" err="1" smtClean="0"/>
+              <a:t>execution</a:t>
+            </a:r>
+            <a:r>
+              <a:rPr lang="it-IT" dirty="0" smtClean="0"/>
+              <a:t> </a:t>
+            </a:r>
+            <a:r>
+              <a:rPr lang="it-IT" dirty="0" err="1" smtClean="0"/>
+              <a:t>problem</a:t>
+            </a:r>
+            <a:r>
+              <a:rPr lang="it-IT" dirty="0"/>
+              <a:t>.</a:t>
+            </a:r>
+            <a:endParaRPr lang="it-IT" dirty="0" smtClean="0"/>
+          </a:p>
+          <a:p>
+            <a:r>
+              <a:rPr lang="it-IT" dirty="0" err="1" smtClean="0"/>
+              <a:t>but</a:t>
+            </a:r>
+            <a:r>
+              <a:rPr lang="it-IT" dirty="0" smtClean="0"/>
+              <a:t> </a:t>
+            </a:r>
+            <a:r>
+              <a:rPr lang="it-IT" dirty="0" err="1" smtClean="0"/>
+              <a:t>there</a:t>
+            </a:r>
+            <a:r>
+              <a:rPr lang="it-IT" dirty="0" smtClean="0"/>
+              <a:t> are </a:t>
+            </a:r>
+            <a:r>
+              <a:rPr lang="it-IT" dirty="0" err="1" smtClean="0"/>
+              <a:t>drawbacks</a:t>
+            </a:r>
+            <a:r>
+              <a:rPr lang="it-IT" dirty="0" smtClean="0"/>
+              <a:t>…</a:t>
+            </a:r>
+            <a:endParaRPr lang="it-IT" dirty="0"/>
+          </a:p>
+        </p:txBody>
+      </p:sp>
+    </p:spTree>
+    <p:extLst>
+      <p:ext uri="{BB962C8B-B14F-4D97-AF65-F5344CB8AC3E}">
+        <p14:creationId xmlns:p14="http://schemas.microsoft.com/office/powerpoint/2010/main" val="2770691382"/>
+      </p:ext>
+    </p:extLst>
+  </p:cSld>
+  <p:clrMapOvr>
+    <a:masterClrMapping/>
+  </p:clrMapOvr>
+  <p:timing>
+    <p:tnLst>
+      <p:par>
+        <p:cTn id="1" dur="indefinite" restart="never" nodeType="tmRoot"/>
+      </p:par>
+    </p:tnLst>
+  </p:timing>
+</p:sld>
+</file>
+
+<file path=ppt/slides/slide24.xml><?xml version="1.0" encoding="utf-8"?>
+<p:sld xmlns:a="http://schemas.openxmlformats.org/drawingml/2006/main" xmlns:r="http://schemas.openxmlformats.org/officeDocument/2006/relationships" xmlns:p="http://schemas.openxmlformats.org/presentationml/2006/main">
+  <p:cSld>
+    <p:spTree>
+      <p:nvGrpSpPr>
+        <p:cNvPr id="1" name=""/>
+        <p:cNvGrpSpPr/>
+        <p:nvPr/>
+      </p:nvGrpSpPr>
+      <p:grpSpPr>
+        <a:xfrm>
+          <a:off x="0" y="0"/>
+          <a:ext cx="0" cy="0"/>
+          <a:chOff x="0" y="0"/>
+          <a:chExt cx="0" cy="0"/>
+        </a:xfrm>
+      </p:grpSpPr>
+      <p:sp>
+        <p:nvSpPr>
+          <p:cNvPr id="4" name="Titolo 3"/>
+          <p:cNvSpPr>
+            <a:spLocks noGrp="1"/>
+          </p:cNvSpPr>
+          <p:nvPr>
+            <p:ph type="title"/>
+          </p:nvPr>
+        </p:nvSpPr>
+        <p:spPr/>
+        <p:txBody>
+          <a:bodyPr>
+            <a:normAutofit/>
+          </a:bodyPr>
+          <a:lstStyle/>
+          <a:p>
+            <a:r>
+              <a:rPr lang="it-IT" sz="6000" dirty="0" smtClean="0"/>
+              <a:t>Demo </a:t>
+            </a:r>
+            <a:r>
+              <a:rPr lang="it-IT" sz="6000" dirty="0" smtClean="0"/>
+              <a:t>03</a:t>
+            </a:r>
+            <a:r>
+              <a:rPr lang="it-IT" sz="6000" dirty="0" smtClean="0"/>
+              <a:t/>
+            </a:r>
+            <a:br>
+              <a:rPr lang="it-IT" sz="6000" dirty="0" smtClean="0"/>
+            </a:br>
+            <a:r>
+              <a:rPr lang="it-IT" dirty="0" smtClean="0"/>
+              <a:t/>
+            </a:r>
+            <a:br>
+              <a:rPr lang="it-IT" dirty="0" smtClean="0"/>
+            </a:br>
+            <a:r>
+              <a:rPr lang="it-IT" dirty="0" smtClean="0"/>
+              <a:t>Multicast</a:t>
+            </a:r>
+            <a:endParaRPr lang="it-IT" dirty="0"/>
+          </a:p>
+        </p:txBody>
+      </p:sp>
+      <p:sp>
+        <p:nvSpPr>
+          <p:cNvPr id="5" name="Segnaposto testo 4"/>
+          <p:cNvSpPr>
+            <a:spLocks noGrp="1"/>
+          </p:cNvSpPr>
+          <p:nvPr>
+            <p:ph type="body" idx="1"/>
+          </p:nvPr>
+        </p:nvSpPr>
+        <p:spPr/>
+        <p:txBody>
+          <a:bodyPr/>
+          <a:lstStyle/>
+          <a:p>
+            <a:r>
+              <a:rPr lang="it-IT" dirty="0" err="1" smtClean="0"/>
+              <a:t>Make</a:t>
+            </a:r>
+            <a:r>
+              <a:rPr lang="it-IT" dirty="0" smtClean="0"/>
+              <a:t> </a:t>
+            </a:r>
+            <a:r>
+              <a:rPr lang="it-IT" dirty="0" err="1" smtClean="0"/>
+              <a:t>it</a:t>
+            </a:r>
+            <a:r>
+              <a:rPr lang="it-IT" dirty="0" smtClean="0"/>
+              <a:t> </a:t>
+            </a:r>
+            <a:r>
+              <a:rPr lang="it-IT" dirty="0" err="1" smtClean="0"/>
+              <a:t>multicast</a:t>
+            </a:r>
+            <a:r>
+              <a:rPr lang="it-IT" dirty="0" smtClean="0"/>
+              <a:t>: </a:t>
+            </a:r>
+            <a:r>
+              <a:rPr lang="it-IT" dirty="0" err="1" smtClean="0"/>
+              <a:t>try</a:t>
+            </a:r>
+            <a:r>
+              <a:rPr lang="it-IT" dirty="0" smtClean="0"/>
+              <a:t> with </a:t>
+            </a:r>
+            <a:r>
+              <a:rPr lang="it-IT" dirty="0" err="1" smtClean="0"/>
+              <a:t>publish</a:t>
+            </a:r>
+            <a:r>
+              <a:rPr lang="it-IT" dirty="0" smtClean="0"/>
+              <a:t>(), share(), </a:t>
+            </a:r>
+            <a:r>
+              <a:rPr lang="it-IT" dirty="0" err="1" smtClean="0"/>
+              <a:t>sharereplay</a:t>
+            </a:r>
+            <a:r>
+              <a:rPr lang="it-IT" dirty="0" smtClean="0"/>
+              <a:t>()</a:t>
+            </a:r>
+            <a:endParaRPr lang="it-IT" dirty="0"/>
+          </a:p>
+        </p:txBody>
+      </p:sp>
+    </p:spTree>
+    <p:extLst>
+      <p:ext uri="{BB962C8B-B14F-4D97-AF65-F5344CB8AC3E}">
+        <p14:creationId xmlns:p14="http://schemas.microsoft.com/office/powerpoint/2010/main" val="765595901"/>
+      </p:ext>
+    </p:extLst>
+  </p:cSld>
+  <p:clrMapOvr>
+    <a:masterClrMapping/>
+  </p:clrMapOvr>
+  <p:timing>
+    <p:tnLst>
+      <p:par>
+        <p:cTn id="1" dur="indefinite" restart="never" nodeType="tmRoot"/>
+      </p:par>
+    </p:tnLst>
+  </p:timing>
+</p:sld>
+</file>
+
+<file path=ppt/slides/slide25.xml><?xml version="1.0" encoding="utf-8"?>
+<p:sld xmlns:a="http://schemas.openxmlformats.org/drawingml/2006/main" xmlns:r="http://schemas.openxmlformats.org/officeDocument/2006/relationships" xmlns:p="http://schemas.openxmlformats.org/presentationml/2006/main">
+  <p:cSld>
+    <p:spTree>
+      <p:nvGrpSpPr>
+        <p:cNvPr id="1" name=""/>
+        <p:cNvGrpSpPr/>
+        <p:nvPr/>
+      </p:nvGrpSpPr>
+      <p:grpSpPr>
+        <a:xfrm>
+          <a:off x="0" y="0"/>
+          <a:ext cx="0" cy="0"/>
+          <a:chOff x="0" y="0"/>
+          <a:chExt cx="0" cy="0"/>
+        </a:xfrm>
+      </p:grpSpPr>
+      <p:sp>
+        <p:nvSpPr>
+          <p:cNvPr id="4" name="Titolo 3"/>
+          <p:cNvSpPr>
+            <a:spLocks noGrp="1"/>
+          </p:cNvSpPr>
+          <p:nvPr>
+            <p:ph type="title"/>
+          </p:nvPr>
+        </p:nvSpPr>
+        <p:spPr/>
+        <p:txBody>
+          <a:bodyPr>
+            <a:normAutofit/>
+          </a:bodyPr>
+          <a:lstStyle/>
+          <a:p>
+            <a:r>
+              <a:rPr lang="it-IT" sz="6000" dirty="0" smtClean="0"/>
+              <a:t>Demo </a:t>
+            </a:r>
+            <a:r>
+              <a:rPr lang="it-IT" sz="6000" dirty="0" smtClean="0"/>
+              <a:t>04</a:t>
+            </a:r>
+            <a:r>
+              <a:rPr lang="it-IT" dirty="0" smtClean="0"/>
+              <a:t/>
+            </a:r>
+            <a:br>
+              <a:rPr lang="it-IT" dirty="0" smtClean="0"/>
+            </a:br>
+            <a:r>
+              <a:rPr lang="it-IT" dirty="0" smtClean="0"/>
+              <a:t>The «right» way to share an </a:t>
+            </a:r>
+            <a:r>
+              <a:rPr lang="it-IT" dirty="0" err="1" smtClean="0"/>
+              <a:t>observable</a:t>
+            </a:r>
+            <a:endParaRPr lang="it-IT" dirty="0"/>
+          </a:p>
+        </p:txBody>
+      </p:sp>
+      <p:sp>
+        <p:nvSpPr>
+          <p:cNvPr id="5" name="Segnaposto testo 4"/>
+          <p:cNvSpPr>
+            <a:spLocks noGrp="1"/>
+          </p:cNvSpPr>
+          <p:nvPr>
+            <p:ph type="body" idx="1"/>
+          </p:nvPr>
+        </p:nvSpPr>
+        <p:spPr/>
+        <p:txBody>
+          <a:bodyPr/>
+          <a:lstStyle/>
+          <a:p>
+            <a:r>
+              <a:rPr lang="it-IT" dirty="0" smtClean="0"/>
+              <a:t>shows the </a:t>
+            </a:r>
+            <a:r>
+              <a:rPr lang="it-IT" dirty="0" err="1" smtClean="0"/>
+              <a:t>effect</a:t>
+            </a:r>
+            <a:r>
+              <a:rPr lang="it-IT" dirty="0" smtClean="0"/>
+              <a:t> of </a:t>
+            </a:r>
+            <a:r>
+              <a:rPr lang="it-IT" dirty="0" err="1" smtClean="0"/>
+              <a:t>using</a:t>
+            </a:r>
+            <a:r>
+              <a:rPr lang="it-IT" dirty="0" smtClean="0"/>
+              <a:t> share() and </a:t>
+            </a:r>
+            <a:r>
+              <a:rPr lang="it-IT" dirty="0" err="1" smtClean="0"/>
+              <a:t>shareReplay</a:t>
+            </a:r>
+            <a:r>
+              <a:rPr lang="it-IT" dirty="0" smtClean="0"/>
+              <a:t>() with the </a:t>
+            </a:r>
+            <a:r>
+              <a:rPr lang="it-IT" dirty="0" err="1" smtClean="0"/>
+              <a:t>AsyncPipe</a:t>
+            </a:r>
+            <a:endParaRPr lang="it-IT" dirty="0"/>
+          </a:p>
+        </p:txBody>
+      </p:sp>
+    </p:spTree>
+    <p:extLst>
+      <p:ext uri="{BB962C8B-B14F-4D97-AF65-F5344CB8AC3E}">
+        <p14:creationId xmlns:p14="http://schemas.microsoft.com/office/powerpoint/2010/main" val="652729121"/>
+      </p:ext>
+    </p:extLst>
+  </p:cSld>
+  <p:clrMapOvr>
+    <a:masterClrMapping/>
+  </p:clrMapOvr>
+  <p:timing>
+    <p:tnLst>
+      <p:par>
+        <p:cTn id="1" dur="indefinite" restart="never" nodeType="tmRoot"/>
+      </p:par>
+    </p:tnLst>
+  </p:timing>
+</p:sld>
+</file>
+
+<file path=ppt/slides/slide26.xml><?xml version="1.0" encoding="utf-8"?>
+<p:sld xmlns:a="http://schemas.openxmlformats.org/drawingml/2006/main" xmlns:r="http://schemas.openxmlformats.org/officeDocument/2006/relationships" xmlns:p="http://schemas.openxmlformats.org/presentationml/2006/main">
+  <p:cSld>
+    <p:spTree>
+      <p:nvGrpSpPr>
+        <p:cNvPr id="1" name=""/>
+        <p:cNvGrpSpPr/>
+        <p:nvPr/>
+      </p:nvGrpSpPr>
+      <p:grpSpPr>
+        <a:xfrm>
+          <a:off x="0" y="0"/>
+          <a:ext cx="0" cy="0"/>
+          <a:chOff x="0" y="0"/>
+          <a:chExt cx="0" cy="0"/>
+        </a:xfrm>
+      </p:grpSpPr>
+      <p:sp>
+        <p:nvSpPr>
+          <p:cNvPr id="4" name="Titolo 3"/>
+          <p:cNvSpPr>
+            <a:spLocks noGrp="1"/>
+          </p:cNvSpPr>
+          <p:nvPr>
+            <p:ph type="title"/>
+          </p:nvPr>
+        </p:nvSpPr>
+        <p:spPr/>
+        <p:txBody>
+          <a:bodyPr>
+            <a:normAutofit fontScale="90000"/>
+          </a:bodyPr>
+          <a:lstStyle/>
+          <a:p>
+            <a:r>
+              <a:rPr lang="it-IT" sz="6000" dirty="0" smtClean="0"/>
+              <a:t>Demo </a:t>
+            </a:r>
+            <a:r>
+              <a:rPr lang="it-IT" sz="6000" dirty="0" smtClean="0"/>
+              <a:t>05</a:t>
+            </a:r>
+            <a:r>
+              <a:rPr lang="it-IT" dirty="0" smtClean="0"/>
+              <a:t/>
+            </a:r>
+            <a:br>
+              <a:rPr lang="it-IT" dirty="0" smtClean="0"/>
+            </a:br>
+            <a:r>
+              <a:rPr lang="it-IT" dirty="0"/>
+              <a:t/>
+            </a:r>
+            <a:br>
+              <a:rPr lang="it-IT" dirty="0"/>
+            </a:br>
+            <a:r>
+              <a:rPr lang="it-IT" dirty="0" err="1" smtClean="0"/>
+              <a:t>Unsubscribe</a:t>
+            </a:r>
+            <a:r>
+              <a:rPr lang="it-IT" dirty="0" smtClean="0"/>
+              <a:t> (in </a:t>
+            </a:r>
+            <a:r>
+              <a:rPr lang="it-IT" dirty="0" err="1" smtClean="0"/>
+              <a:t>Angular</a:t>
+            </a:r>
+            <a:r>
+              <a:rPr lang="it-IT" dirty="0"/>
+              <a:t>)</a:t>
+            </a:r>
+            <a:endParaRPr lang="it-IT" dirty="0" smtClean="0"/>
+          </a:p>
+        </p:txBody>
+      </p:sp>
+      <p:sp>
+        <p:nvSpPr>
+          <p:cNvPr id="5" name="Segnaposto testo 4"/>
+          <p:cNvSpPr>
+            <a:spLocks noGrp="1"/>
+          </p:cNvSpPr>
+          <p:nvPr>
+            <p:ph type="body" idx="1"/>
+          </p:nvPr>
+        </p:nvSpPr>
+        <p:spPr/>
+        <p:txBody>
+          <a:bodyPr>
+            <a:normAutofit fontScale="85000" lnSpcReduction="20000"/>
+          </a:bodyPr>
+          <a:lstStyle/>
+          <a:p>
+            <a:r>
+              <a:rPr lang="it-IT" dirty="0"/>
+              <a:t>How to do </a:t>
+            </a:r>
+            <a:r>
+              <a:rPr lang="it-IT" dirty="0" err="1"/>
+              <a:t>it</a:t>
+            </a:r>
+            <a:endParaRPr lang="it-IT" dirty="0"/>
+          </a:p>
+          <a:p>
+            <a:r>
+              <a:rPr lang="it-IT" dirty="0" err="1"/>
+              <a:t>When</a:t>
+            </a:r>
+            <a:r>
+              <a:rPr lang="it-IT" dirty="0"/>
+              <a:t> to do </a:t>
+            </a:r>
+            <a:r>
+              <a:rPr lang="it-IT" dirty="0" err="1" smtClean="0"/>
+              <a:t>it</a:t>
+            </a:r>
+            <a:endParaRPr lang="it-IT" dirty="0" smtClean="0"/>
+          </a:p>
+          <a:p>
+            <a:r>
+              <a:rPr lang="it-IT" dirty="0" smtClean="0"/>
+              <a:t>Brest </a:t>
+            </a:r>
+            <a:r>
+              <a:rPr lang="it-IT" dirty="0" err="1" smtClean="0"/>
+              <a:t>practice</a:t>
+            </a:r>
+            <a:r>
+              <a:rPr lang="it-IT" dirty="0" smtClean="0"/>
+              <a:t> to do </a:t>
+            </a:r>
+            <a:r>
+              <a:rPr lang="it-IT" dirty="0" err="1" smtClean="0"/>
+              <a:t>it</a:t>
+            </a:r>
+            <a:endParaRPr lang="it-IT" dirty="0"/>
+          </a:p>
+        </p:txBody>
+      </p:sp>
+    </p:spTree>
+    <p:extLst>
+      <p:ext uri="{BB962C8B-B14F-4D97-AF65-F5344CB8AC3E}">
+        <p14:creationId xmlns:p14="http://schemas.microsoft.com/office/powerpoint/2010/main" val="485016218"/>
+      </p:ext>
+    </p:extLst>
+  </p:cSld>
+  <p:clrMapOvr>
+    <a:masterClrMapping/>
+  </p:clrMapOvr>
+  <p:timing>
+    <p:tnLst>
+      <p:par>
+        <p:cTn id="1" dur="indefinite" restart="never" nodeType="tmRoot"/>
+      </p:par>
+    </p:tnLst>
+  </p:timing>
+</p:sld>
+</file>
+
+<file path=ppt/slides/slide27.xml><?xml version="1.0" encoding="utf-8"?>
+<p:sld xmlns:a="http://schemas.openxmlformats.org/drawingml/2006/main" xmlns:r="http://schemas.openxmlformats.org/officeDocument/2006/relationships" xmlns:p="http://schemas.openxmlformats.org/presentationml/2006/main">
+  <p:cSld>
+    <p:spTree>
+      <p:nvGrpSpPr>
+        <p:cNvPr id="1" name=""/>
+        <p:cNvGrpSpPr/>
+        <p:nvPr/>
+      </p:nvGrpSpPr>
+      <p:grpSpPr>
+        <a:xfrm>
+          <a:off x="0" y="0"/>
+          <a:ext cx="0" cy="0"/>
+          <a:chOff x="0" y="0"/>
+          <a:chExt cx="0" cy="0"/>
+        </a:xfrm>
+      </p:grpSpPr>
+      <p:sp>
+        <p:nvSpPr>
+          <p:cNvPr id="2" name="Titolo 1"/>
+          <p:cNvSpPr>
+            <a:spLocks noGrp="1"/>
+          </p:cNvSpPr>
+          <p:nvPr>
+            <p:ph type="title"/>
+          </p:nvPr>
+        </p:nvSpPr>
+        <p:spPr/>
+        <p:txBody>
+          <a:bodyPr/>
+          <a:lstStyle/>
+          <a:p>
+            <a:r>
+              <a:rPr lang="it-IT" dirty="0" smtClean="0"/>
+              <a:t>Benefits and </a:t>
+            </a:r>
+            <a:r>
+              <a:rPr lang="it-IT" dirty="0" err="1" smtClean="0"/>
+              <a:t>Drawbacks</a:t>
+            </a:r>
+            <a:endParaRPr lang="it-IT" dirty="0"/>
+          </a:p>
+        </p:txBody>
+      </p:sp>
+      <p:sp>
+        <p:nvSpPr>
+          <p:cNvPr id="3" name="Segnaposto contenuto 2"/>
+          <p:cNvSpPr>
+            <a:spLocks noGrp="1"/>
+          </p:cNvSpPr>
+          <p:nvPr>
+            <p:ph idx="1"/>
+          </p:nvPr>
+        </p:nvSpPr>
+        <p:spPr/>
+        <p:txBody>
+          <a:bodyPr>
+            <a:normAutofit fontScale="92500" lnSpcReduction="20000"/>
+          </a:bodyPr>
+          <a:lstStyle/>
+          <a:p>
+            <a:endParaRPr lang="it-IT" dirty="0" smtClean="0"/>
+          </a:p>
+          <a:p>
+            <a:r>
+              <a:rPr lang="it-IT" dirty="0" smtClean="0"/>
+              <a:t>The wide </a:t>
+            </a:r>
+            <a:r>
+              <a:rPr lang="it-IT" dirty="0" err="1" smtClean="0"/>
+              <a:t>range</a:t>
+            </a:r>
+            <a:r>
+              <a:rPr lang="it-IT" dirty="0" smtClean="0"/>
+              <a:t> of </a:t>
+            </a:r>
+            <a:r>
+              <a:rPr lang="it-IT" dirty="0" err="1" smtClean="0"/>
+              <a:t>available</a:t>
+            </a:r>
+            <a:r>
+              <a:rPr lang="it-IT" dirty="0" smtClean="0"/>
+              <a:t> </a:t>
+            </a:r>
+            <a:r>
+              <a:rPr lang="it-IT" dirty="0" err="1" smtClean="0"/>
+              <a:t>operators</a:t>
+            </a:r>
+            <a:r>
+              <a:rPr lang="it-IT" dirty="0" smtClean="0"/>
+              <a:t> </a:t>
+            </a:r>
+            <a:r>
+              <a:rPr lang="it-IT" dirty="0" err="1" smtClean="0"/>
+              <a:t>allows</a:t>
+            </a:r>
+            <a:r>
+              <a:rPr lang="it-IT" dirty="0" smtClean="0"/>
+              <a:t> for </a:t>
+            </a:r>
+            <a:r>
+              <a:rPr lang="it-IT" dirty="0" err="1" smtClean="0"/>
+              <a:t>creating</a:t>
+            </a:r>
+            <a:r>
+              <a:rPr lang="it-IT" dirty="0" smtClean="0"/>
+              <a:t> </a:t>
+            </a:r>
+            <a:r>
+              <a:rPr lang="it-IT" dirty="0" err="1" smtClean="0"/>
+              <a:t>very</a:t>
+            </a:r>
+            <a:r>
+              <a:rPr lang="it-IT" dirty="0" smtClean="0"/>
+              <a:t> </a:t>
+            </a:r>
+            <a:r>
+              <a:rPr lang="it-IT" dirty="0" err="1" smtClean="0"/>
+              <a:t>complex</a:t>
+            </a:r>
+            <a:r>
+              <a:rPr lang="it-IT" dirty="0" smtClean="0"/>
+              <a:t> </a:t>
+            </a:r>
+            <a:r>
+              <a:rPr lang="it-IT" dirty="0" err="1" smtClean="0"/>
+              <a:t>workflows</a:t>
+            </a:r>
+            <a:r>
+              <a:rPr lang="it-IT" dirty="0" smtClean="0"/>
+              <a:t> with </a:t>
+            </a:r>
+            <a:r>
+              <a:rPr lang="it-IT" dirty="0" err="1" smtClean="0"/>
+              <a:t>ease</a:t>
+            </a:r>
+            <a:r>
+              <a:rPr lang="it-IT" dirty="0" smtClean="0"/>
+              <a:t>.</a:t>
+            </a:r>
+          </a:p>
+          <a:p>
+            <a:endParaRPr lang="it-IT" dirty="0"/>
+          </a:p>
+          <a:p>
+            <a:r>
+              <a:rPr lang="it-IT" dirty="0" err="1" smtClean="0"/>
+              <a:t>Provide</a:t>
+            </a:r>
+            <a:r>
+              <a:rPr lang="it-IT" dirty="0" smtClean="0"/>
+              <a:t> </a:t>
+            </a:r>
+            <a:r>
+              <a:rPr lang="it-IT" dirty="0" err="1" smtClean="0"/>
+              <a:t>better</a:t>
+            </a:r>
+            <a:r>
+              <a:rPr lang="it-IT" dirty="0" smtClean="0"/>
+              <a:t> </a:t>
+            </a:r>
+            <a:r>
+              <a:rPr lang="it-IT" dirty="0" err="1" smtClean="0"/>
+              <a:t>decoupling</a:t>
+            </a:r>
+            <a:r>
+              <a:rPr lang="it-IT" dirty="0" smtClean="0"/>
+              <a:t> </a:t>
+            </a:r>
+            <a:r>
+              <a:rPr lang="it-IT" dirty="0" err="1" smtClean="0"/>
+              <a:t>between</a:t>
+            </a:r>
+            <a:r>
+              <a:rPr lang="it-IT" dirty="0" smtClean="0"/>
+              <a:t> </a:t>
+            </a:r>
+            <a:r>
+              <a:rPr lang="it-IT" dirty="0" err="1" smtClean="0"/>
+              <a:t>components</a:t>
+            </a:r>
+            <a:r>
+              <a:rPr lang="it-IT" dirty="0" smtClean="0"/>
+              <a:t>, </a:t>
+            </a:r>
+            <a:r>
+              <a:rPr lang="it-IT" dirty="0" err="1" smtClean="0"/>
+              <a:t>they</a:t>
+            </a:r>
+            <a:r>
+              <a:rPr lang="it-IT" dirty="0" smtClean="0"/>
+              <a:t> can </a:t>
+            </a:r>
+            <a:r>
+              <a:rPr lang="it-IT" dirty="0" err="1" smtClean="0"/>
+              <a:t>communicate</a:t>
+            </a:r>
+            <a:r>
+              <a:rPr lang="it-IT" dirty="0" smtClean="0"/>
+              <a:t> </a:t>
+            </a:r>
+            <a:r>
+              <a:rPr lang="it-IT" dirty="0" err="1" smtClean="0"/>
+              <a:t>through</a:t>
+            </a:r>
+            <a:r>
+              <a:rPr lang="it-IT" dirty="0" smtClean="0"/>
+              <a:t> </a:t>
+            </a:r>
+            <a:r>
+              <a:rPr lang="it-IT" dirty="0" err="1" smtClean="0"/>
+              <a:t>messages</a:t>
+            </a:r>
+            <a:r>
+              <a:rPr lang="it-IT" dirty="0" smtClean="0"/>
+              <a:t>.</a:t>
+            </a:r>
+          </a:p>
+          <a:p>
+            <a:endParaRPr lang="it-IT" dirty="0"/>
+          </a:p>
+          <a:p>
+            <a:r>
+              <a:rPr lang="it-IT" dirty="0" smtClean="0"/>
+              <a:t>With some state management </a:t>
+            </a:r>
+            <a:r>
+              <a:rPr lang="it-IT" dirty="0" err="1" smtClean="0"/>
+              <a:t>strategies</a:t>
+            </a:r>
+            <a:r>
+              <a:rPr lang="it-IT" dirty="0" smtClean="0"/>
+              <a:t> (</a:t>
+            </a:r>
+            <a:r>
+              <a:rPr lang="it-IT" dirty="0" err="1" smtClean="0"/>
+              <a:t>like</a:t>
+            </a:r>
+            <a:r>
+              <a:rPr lang="it-IT" dirty="0" smtClean="0"/>
+              <a:t> </a:t>
+            </a:r>
+            <a:r>
+              <a:rPr lang="it-IT" dirty="0" err="1" smtClean="0"/>
+              <a:t>using</a:t>
+            </a:r>
+            <a:r>
+              <a:rPr lang="it-IT" dirty="0" smtClean="0"/>
+              <a:t> </a:t>
+            </a:r>
+            <a:r>
+              <a:rPr lang="it-IT" dirty="0" err="1" smtClean="0"/>
+              <a:t>immutable</a:t>
+            </a:r>
+            <a:r>
+              <a:rPr lang="it-IT" dirty="0" smtClean="0"/>
+              <a:t> </a:t>
+            </a:r>
+            <a:r>
+              <a:rPr lang="it-IT" dirty="0" err="1" smtClean="0"/>
+              <a:t>objects</a:t>
+            </a:r>
+            <a:r>
+              <a:rPr lang="it-IT" dirty="0" smtClean="0"/>
+              <a:t>), </a:t>
+            </a:r>
+            <a:r>
+              <a:rPr lang="it-IT" dirty="0" err="1" smtClean="0"/>
+              <a:t>Observables</a:t>
+            </a:r>
+            <a:r>
+              <a:rPr lang="it-IT" dirty="0" smtClean="0"/>
+              <a:t> can be </a:t>
+            </a:r>
+            <a:r>
+              <a:rPr lang="it-IT" dirty="0" err="1" smtClean="0"/>
+              <a:t>used</a:t>
+            </a:r>
+            <a:r>
+              <a:rPr lang="it-IT" dirty="0" smtClean="0"/>
+              <a:t> to </a:t>
+            </a:r>
+            <a:r>
+              <a:rPr lang="it-IT" dirty="0" err="1" smtClean="0"/>
+              <a:t>push</a:t>
+            </a:r>
+            <a:r>
+              <a:rPr lang="it-IT" dirty="0" smtClean="0"/>
+              <a:t> state </a:t>
+            </a:r>
+            <a:r>
+              <a:rPr lang="it-IT" smtClean="0"/>
+              <a:t>change </a:t>
+            </a:r>
+            <a:r>
+              <a:rPr lang="it-IT" dirty="0" err="1" smtClean="0"/>
+              <a:t>notifications</a:t>
+            </a:r>
+            <a:r>
+              <a:rPr lang="it-IT" dirty="0" smtClean="0"/>
+              <a:t> to the UI.</a:t>
+            </a:r>
+          </a:p>
+          <a:p>
+            <a:r>
+              <a:rPr lang="it-IT" dirty="0" smtClean="0"/>
+              <a:t>Under some </a:t>
+            </a:r>
+            <a:r>
+              <a:rPr lang="it-IT" dirty="0" err="1" smtClean="0"/>
+              <a:t>conditions</a:t>
+            </a:r>
+            <a:r>
+              <a:rPr lang="it-IT" dirty="0" smtClean="0"/>
+              <a:t> </a:t>
+            </a:r>
+            <a:r>
+              <a:rPr lang="it-IT" dirty="0" err="1" smtClean="0"/>
+              <a:t>we</a:t>
+            </a:r>
+            <a:r>
+              <a:rPr lang="it-IT" dirty="0" smtClean="0"/>
+              <a:t> can </a:t>
+            </a:r>
+            <a:r>
+              <a:rPr lang="it-IT" dirty="0" err="1" smtClean="0"/>
+              <a:t>disable</a:t>
+            </a:r>
+            <a:r>
+              <a:rPr lang="it-IT" dirty="0" smtClean="0"/>
+              <a:t> </a:t>
+            </a:r>
+            <a:r>
+              <a:rPr lang="it-IT" dirty="0" err="1" smtClean="0"/>
+              <a:t>Angular</a:t>
+            </a:r>
+            <a:r>
+              <a:rPr lang="it-IT" dirty="0" smtClean="0"/>
+              <a:t> </a:t>
+            </a:r>
+            <a:r>
+              <a:rPr lang="it-IT" dirty="0" err="1" smtClean="0"/>
+              <a:t>dirty</a:t>
+            </a:r>
+            <a:r>
+              <a:rPr lang="it-IT" dirty="0" smtClean="0"/>
+              <a:t> </a:t>
+            </a:r>
+            <a:r>
+              <a:rPr lang="it-IT" dirty="0" err="1" smtClean="0"/>
+              <a:t>checking</a:t>
+            </a:r>
+            <a:r>
+              <a:rPr lang="it-IT" dirty="0" smtClean="0"/>
+              <a:t> </a:t>
+            </a:r>
+            <a:r>
+              <a:rPr lang="it-IT" dirty="0" err="1" smtClean="0"/>
+              <a:t>mechanic</a:t>
+            </a:r>
+            <a:r>
+              <a:rPr lang="it-IT" dirty="0"/>
+              <a:t> </a:t>
+            </a:r>
+            <a:r>
+              <a:rPr lang="it-IT" dirty="0" smtClean="0"/>
+              <a:t>and </a:t>
+            </a:r>
+            <a:r>
+              <a:rPr lang="it-IT" dirty="0" err="1" smtClean="0"/>
+              <a:t>improve</a:t>
+            </a:r>
+            <a:r>
+              <a:rPr lang="it-IT" dirty="0" smtClean="0"/>
+              <a:t> the </a:t>
+            </a:r>
+            <a:r>
+              <a:rPr lang="it-IT" dirty="0" err="1" smtClean="0"/>
+              <a:t>components</a:t>
+            </a:r>
+            <a:r>
+              <a:rPr lang="it-IT" dirty="0" smtClean="0"/>
+              <a:t> performances.</a:t>
+            </a:r>
+          </a:p>
+          <a:p>
+            <a:endParaRPr lang="it-IT" dirty="0"/>
+          </a:p>
+          <a:p>
+            <a:r>
+              <a:rPr lang="it-IT" dirty="0" err="1" smtClean="0"/>
+              <a:t>Keep</a:t>
+            </a:r>
+            <a:r>
+              <a:rPr lang="it-IT" dirty="0" smtClean="0"/>
+              <a:t> in </a:t>
+            </a:r>
+            <a:r>
+              <a:rPr lang="it-IT" dirty="0" err="1" smtClean="0"/>
+              <a:t>mind</a:t>
+            </a:r>
+            <a:r>
+              <a:rPr lang="it-IT" dirty="0" smtClean="0"/>
+              <a:t> the </a:t>
+            </a:r>
+            <a:r>
+              <a:rPr lang="it-IT" dirty="0" err="1" smtClean="0"/>
+              <a:t>Unicast</a:t>
+            </a:r>
+            <a:r>
+              <a:rPr lang="it-IT" dirty="0" smtClean="0"/>
+              <a:t> / Multicast </a:t>
+            </a:r>
+            <a:r>
+              <a:rPr lang="it-IT" dirty="0" err="1" smtClean="0"/>
+              <a:t>behavior</a:t>
+            </a:r>
+            <a:r>
+              <a:rPr lang="it-IT" dirty="0" smtClean="0"/>
+              <a:t> and </a:t>
+            </a:r>
+            <a:r>
+              <a:rPr lang="it-IT" dirty="0" err="1" smtClean="0"/>
+              <a:t>apply</a:t>
+            </a:r>
+            <a:r>
+              <a:rPr lang="it-IT" dirty="0" smtClean="0"/>
+              <a:t> </a:t>
+            </a:r>
+            <a:r>
+              <a:rPr lang="it-IT" dirty="0" err="1" smtClean="0"/>
+              <a:t>strategies</a:t>
+            </a:r>
+            <a:r>
+              <a:rPr lang="it-IT" dirty="0" smtClean="0"/>
+              <a:t> to reduce the </a:t>
+            </a:r>
+            <a:r>
+              <a:rPr lang="it-IT" dirty="0" err="1" smtClean="0"/>
+              <a:t>possible</a:t>
+            </a:r>
+            <a:r>
+              <a:rPr lang="it-IT" dirty="0" smtClean="0"/>
+              <a:t> performances </a:t>
+            </a:r>
+            <a:r>
+              <a:rPr lang="it-IT" dirty="0" err="1" smtClean="0"/>
+              <a:t>penalties</a:t>
+            </a:r>
+            <a:r>
+              <a:rPr lang="it-IT" dirty="0" smtClean="0"/>
+              <a:t> </a:t>
+            </a:r>
+            <a:r>
+              <a:rPr lang="it-IT" dirty="0" err="1" smtClean="0"/>
+              <a:t>that</a:t>
+            </a:r>
+            <a:r>
+              <a:rPr lang="it-IT" dirty="0" smtClean="0"/>
+              <a:t> </a:t>
+            </a:r>
+            <a:r>
+              <a:rPr lang="it-IT" dirty="0" err="1" smtClean="0"/>
+              <a:t>results</a:t>
+            </a:r>
+            <a:r>
+              <a:rPr lang="it-IT" dirty="0" smtClean="0"/>
+              <a:t> in multiple </a:t>
+            </a:r>
+            <a:r>
+              <a:rPr lang="it-IT" dirty="0" err="1" smtClean="0"/>
+              <a:t>subscriptions</a:t>
+            </a:r>
+            <a:r>
+              <a:rPr lang="it-IT" dirty="0" smtClean="0"/>
+              <a:t> to the </a:t>
+            </a:r>
+            <a:r>
+              <a:rPr lang="it-IT" dirty="0" err="1" smtClean="0"/>
+              <a:t>same</a:t>
+            </a:r>
+            <a:r>
+              <a:rPr lang="it-IT" dirty="0" smtClean="0"/>
+              <a:t> </a:t>
+            </a:r>
+            <a:r>
+              <a:rPr lang="it-IT" dirty="0" err="1" smtClean="0"/>
+              <a:t>observable</a:t>
+            </a:r>
+            <a:endParaRPr lang="it-IT" dirty="0"/>
+          </a:p>
+        </p:txBody>
+      </p:sp>
+    </p:spTree>
+    <p:extLst>
+      <p:ext uri="{BB962C8B-B14F-4D97-AF65-F5344CB8AC3E}">
+        <p14:creationId xmlns:p14="http://schemas.microsoft.com/office/powerpoint/2010/main" val="3701086600"/>
+      </p:ext>
+    </p:extLst>
+  </p:cSld>
+  <p:clrMapOvr>
+    <a:masterClrMapping/>
+  </p:clrMapOvr>
+  <p:timing>
+    <p:tnLst>
+      <p:par>
+        <p:cTn id="1" dur="indefinite" restart="never" nodeType="tmRoot">
+          <p:childTnLst>
+            <p:seq concurrent="1" nextAc="seek">
+              <p:cTn id="2" dur="indefinite" nodeType="mainSeq">
+                <p:childTnLst>
+                  <p:par>
+                    <p:cTn id="3" fill="hold">
+                      <p:stCondLst>
+                        <p:cond delay="indefinite"/>
+                      </p:stCondLst>
+                      <p:childTnLst>
+                        <p:par>
+                          <p:cTn id="4" fill="hold">
+                            <p:stCondLst>
+                              <p:cond delay="0"/>
+                            </p:stCondLst>
+                            <p:childTnLst>
+                              <p:par>
+                                <p:cTn id="5" presetID="10" presetClass="entr" presetSubtype="0" fill="hold" nodeType="clickEffect">
+                                  <p:stCondLst>
+                                    <p:cond delay="0"/>
+                                  </p:stCondLst>
+                                  <p:childTnLst>
+                                    <p:set>
+                                      <p:cBhvr>
+                                        <p:cTn id="6" dur="1" fill="hold">
+                                          <p:stCondLst>
+                                            <p:cond delay="0"/>
+                                          </p:stCondLst>
+                                        </p:cTn>
+                                        <p:tgtEl>
+                                          <p:spTgt spid="3">
+                                            <p:txEl>
+                                              <p:pRg st="1" end="1"/>
+                                            </p:txEl>
+                                          </p:spTgt>
+                                        </p:tgtEl>
+                                        <p:attrNameLst>
+                                          <p:attrName>style.visibility</p:attrName>
+                                        </p:attrNameLst>
+                                      </p:cBhvr>
+                                      <p:to>
+                                        <p:strVal val="visible"/>
+                                      </p:to>
+                                    </p:set>
+                                    <p:animEffect transition="in" filter="fade">
+                                      <p:cBhvr>
+                                        <p:cTn id="7" dur="500"/>
+                                        <p:tgtEl>
+                                          <p:spTgt spid="3">
+                                            <p:txEl>
+                                              <p:pRg st="1" end="1"/>
+                                            </p:txEl>
+                                          </p:spTgt>
+                                        </p:tgtEl>
+                                      </p:cBhvr>
+                                    </p:animEffect>
+                                  </p:childTnLst>
+                                </p:cTn>
+                              </p:par>
+                            </p:childTnLst>
+                          </p:cTn>
+                        </p:par>
+                      </p:childTnLst>
+                    </p:cTn>
+                  </p:par>
+                  <p:par>
+                    <p:cTn id="8" fill="hold">
+                      <p:stCondLst>
+                        <p:cond delay="indefinite"/>
+                      </p:stCondLst>
+                      <p:childTnLst>
+                        <p:par>
+                          <p:cTn id="9" fill="hold">
+                            <p:stCondLst>
+                              <p:cond delay="0"/>
+                            </p:stCondLst>
+                            <p:childTnLst>
+                              <p:par>
+                                <p:cTn id="10" presetID="10" presetClass="entr" presetSubtype="0" fill="hold" nodeType="clickEffect">
+                                  <p:stCondLst>
+                                    <p:cond delay="0"/>
+                                  </p:stCondLst>
+                                  <p:childTnLst>
+                                    <p:set>
+                                      <p:cBhvr>
+                                        <p:cTn id="11" dur="1" fill="hold">
+                                          <p:stCondLst>
+                                            <p:cond delay="0"/>
+                                          </p:stCondLst>
+                                        </p:cTn>
+                                        <p:tgtEl>
+                                          <p:spTgt spid="3">
+                                            <p:txEl>
+                                              <p:pRg st="3" end="3"/>
+                                            </p:txEl>
+                                          </p:spTgt>
+                                        </p:tgtEl>
+                                        <p:attrNameLst>
+                                          <p:attrName>style.visibility</p:attrName>
+                                        </p:attrNameLst>
+                                      </p:cBhvr>
+                                      <p:to>
+                                        <p:strVal val="visible"/>
+                                      </p:to>
+                                    </p:set>
+                                    <p:animEffect transition="in" filter="fade">
+                                      <p:cBhvr>
+                                        <p:cTn id="12" dur="500"/>
+                                        <p:tgtEl>
+                                          <p:spTgt spid="3">
+                                            <p:txEl>
+                                              <p:pRg st="3" end="3"/>
+                                            </p:txEl>
+                                          </p:spTgt>
+                                        </p:tgtEl>
+                                      </p:cBhvr>
+                                    </p:animEffect>
+                                  </p:childTnLst>
+                                </p:cTn>
+                              </p:par>
+                            </p:childTnLst>
+                          </p:cTn>
+                        </p:par>
+                      </p:childTnLst>
+                    </p:cTn>
+                  </p:par>
+                  <p:par>
+                    <p:cTn id="13" fill="hold">
+                      <p:stCondLst>
+                        <p:cond delay="indefinite"/>
+                      </p:stCondLst>
+                      <p:childTnLst>
+                        <p:par>
+                          <p:cTn id="14" fill="hold">
+                            <p:stCondLst>
+                              <p:cond delay="0"/>
+                            </p:stCondLst>
+                            <p:childTnLst>
+                              <p:par>
+                                <p:cTn id="15" presetID="10" presetClass="entr" presetSubtype="0" fill="hold" nodeType="clickEffect">
+                                  <p:stCondLst>
+                                    <p:cond delay="0"/>
+                                  </p:stCondLst>
+                                  <p:childTnLst>
+                                    <p:set>
+                                      <p:cBhvr>
+                                        <p:cTn id="16" dur="1" fill="hold">
+                                          <p:stCondLst>
+                                            <p:cond delay="0"/>
+                                          </p:stCondLst>
+                                        </p:cTn>
+                                        <p:tgtEl>
+                                          <p:spTgt spid="3">
+                                            <p:txEl>
+                                              <p:pRg st="5" end="5"/>
+                                            </p:txEl>
+                                          </p:spTgt>
+                                        </p:tgtEl>
+                                        <p:attrNameLst>
+                                          <p:attrName>style.visibility</p:attrName>
+                                        </p:attrNameLst>
+                                      </p:cBhvr>
+                                      <p:to>
+                                        <p:strVal val="visible"/>
+                                      </p:to>
+                                    </p:set>
+                                    <p:animEffect transition="in" filter="fade">
+                                      <p:cBhvr>
+                                        <p:cTn id="17" dur="500"/>
+                                        <p:tgtEl>
+                                          <p:spTgt spid="3">
+                                            <p:txEl>
+                                              <p:pRg st="5" end="5"/>
+                                            </p:txEl>
+                                          </p:spTgt>
+                                        </p:tgtEl>
+                                      </p:cBhvr>
+                                    </p:animEffect>
+                                  </p:childTnLst>
+                                </p:cTn>
+                              </p:par>
+                            </p:childTnLst>
+                          </p:cTn>
+                        </p:par>
+                        <p:par>
+                          <p:cTn id="18" fill="hold">
+                            <p:stCondLst>
+                              <p:cond delay="500"/>
+                            </p:stCondLst>
+                            <p:childTnLst>
+                              <p:par>
+                                <p:cTn id="19" presetID="10" presetClass="entr" presetSubtype="0" fill="hold" nodeType="afterEffect">
+                                  <p:stCondLst>
+                                    <p:cond delay="0"/>
+                                  </p:stCondLst>
+                                  <p:childTnLst>
+                                    <p:set>
+                                      <p:cBhvr>
+                                        <p:cTn id="20" dur="1" fill="hold">
+                                          <p:stCondLst>
+                                            <p:cond delay="0"/>
+                                          </p:stCondLst>
+                                        </p:cTn>
+                                        <p:tgtEl>
+                                          <p:spTgt spid="3">
+                                            <p:txEl>
+                                              <p:pRg st="6" end="6"/>
+                                            </p:txEl>
+                                          </p:spTgt>
+                                        </p:tgtEl>
+                                        <p:attrNameLst>
+                                          <p:attrName>style.visibility</p:attrName>
+                                        </p:attrNameLst>
+                                      </p:cBhvr>
+                                      <p:to>
+                                        <p:strVal val="visible"/>
+                                      </p:to>
+                                    </p:set>
+                                    <p:animEffect transition="in" filter="fade">
+                                      <p:cBhvr>
+                                        <p:cTn id="21" dur="500"/>
+                                        <p:tgtEl>
+                                          <p:spTgt spid="3">
+                                            <p:txEl>
+                                              <p:pRg st="6" end="6"/>
+                                            </p:txEl>
+                                          </p:spTgt>
+                                        </p:tgtEl>
+                                      </p:cBhvr>
+                                    </p:animEffect>
+                                  </p:childTnLst>
+                                </p:cTn>
+                              </p:par>
+                            </p:childTnLst>
+                          </p:cTn>
+                        </p:par>
+                      </p:childTnLst>
+                    </p:cTn>
+                  </p:par>
+                  <p:par>
+                    <p:cTn id="22" fill="hold">
+                      <p:stCondLst>
+                        <p:cond delay="indefinite"/>
+                      </p:stCondLst>
+                      <p:childTnLst>
+                        <p:par>
+                          <p:cTn id="23" fill="hold">
+                            <p:stCondLst>
+                              <p:cond delay="0"/>
+                            </p:stCondLst>
+                            <p:childTnLst>
+                              <p:par>
+                                <p:cTn id="24" presetID="10" presetClass="entr" presetSubtype="0" fill="hold" nodeType="clickEffect">
+                                  <p:stCondLst>
+                                    <p:cond delay="0"/>
+                                  </p:stCondLst>
+                                  <p:childTnLst>
+                                    <p:set>
+                                      <p:cBhvr>
+                                        <p:cTn id="25" dur="1" fill="hold">
+                                          <p:stCondLst>
+                                            <p:cond delay="0"/>
+                                          </p:stCondLst>
+                                        </p:cTn>
+                                        <p:tgtEl>
+                                          <p:spTgt spid="3">
+                                            <p:txEl>
+                                              <p:pRg st="8" end="8"/>
+                                            </p:txEl>
+                                          </p:spTgt>
+                                        </p:tgtEl>
+                                        <p:attrNameLst>
+                                          <p:attrName>style.visibility</p:attrName>
+                                        </p:attrNameLst>
+                                      </p:cBhvr>
+                                      <p:to>
+                                        <p:strVal val="visible"/>
+                                      </p:to>
+                                    </p:set>
+                                    <p:animEffect transition="in" filter="fade">
+                                      <p:cBhvr>
+                                        <p:cTn id="26" dur="500"/>
+                                        <p:tgtEl>
+                                          <p:spTgt spid="3">
+                                            <p:txEl>
+                                              <p:pRg st="8" end="8"/>
+                                            </p:txEl>
+                                          </p:spTgt>
+                                        </p:tgtEl>
+                                      </p:cBhvr>
+                                    </p:animEffect>
+                                  </p:childTnLst>
+                                </p:cTn>
+                              </p:par>
+                            </p:childTnLst>
+                          </p:cTn>
+                        </p:par>
+                      </p:childTnLst>
+                    </p:cTn>
+                  </p:par>
+                </p:childTnLst>
+              </p:cTn>
+              <p:prevCondLst>
+                <p:cond evt="onPrev" delay="0">
+                  <p:tgtEl>
+                    <p:sldTgt/>
+                  </p:tgtEl>
+                </p:cond>
+              </p:prevCondLst>
+              <p:nextCondLst>
+                <p:cond evt="onNext" delay="0">
+                  <p:tgtEl>
+                    <p:sldTgt/>
+                  </p:tgtEl>
+                </p:cond>
+              </p:nextCondLst>
+            </p:seq>
+          </p:childTnLst>
+        </p:cTn>
+      </p:par>
+    </p:tnLst>
+  </p:timing>
+</p:sld>
+</file>
+
+<file path=ppt/slides/slide28.xml><?xml version="1.0" encoding="utf-8"?>
+<p:sld xmlns:a="http://schemas.openxmlformats.org/drawingml/2006/main" xmlns:r="http://schemas.openxmlformats.org/officeDocument/2006/relationships" xmlns:p="http://schemas.openxmlformats.org/presentationml/2006/main">
+  <p:cSld>
+    <p:spTree>
+      <p:nvGrpSpPr>
+        <p:cNvPr id="1" name=""/>
+        <p:cNvGrpSpPr/>
+        <p:nvPr/>
+      </p:nvGrpSpPr>
+      <p:grpSpPr>
+        <a:xfrm>
+          <a:off x="0" y="0"/>
+          <a:ext cx="0" cy="0"/>
+          <a:chOff x="0" y="0"/>
+          <a:chExt cx="0" cy="0"/>
+        </a:xfrm>
+      </p:grpSpPr>
+      <p:sp>
+        <p:nvSpPr>
+          <p:cNvPr id="4" name="Titolo 3"/>
+          <p:cNvSpPr>
+            <a:spLocks noGrp="1"/>
+          </p:cNvSpPr>
+          <p:nvPr>
+            <p:ph type="title"/>
+          </p:nvPr>
+        </p:nvSpPr>
+        <p:spPr/>
+        <p:txBody>
+          <a:bodyPr/>
+          <a:lstStyle/>
+          <a:p>
+            <a:r>
               <a:rPr lang="it-IT" dirty="0" smtClean="0"/>
               <a:t>Reference</a:t>
             </a:r>
@@ -7537,7 +9908,7 @@
 </p:sld>
 </file>
 
-<file path=ppt/slides/slide21.xml><?xml version="1.0" encoding="utf-8"?>
+<file path=ppt/slides/slide29.xml><?xml version="1.0" encoding="utf-8"?>
 <p:sld xmlns:a="http://schemas.openxmlformats.org/drawingml/2006/main" xmlns:r="http://schemas.openxmlformats.org/officeDocument/2006/relationships" xmlns:p="http://schemas.openxmlformats.org/presentationml/2006/main">
   <p:cSld>
     <p:spTree>
@@ -7668,384 +10039,6 @@
 </p:sld>
 </file>
 
-<file path=ppt/slides/slide22.xml><?xml version="1.0" encoding="utf-8"?>
-<p:sld xmlns:a="http://schemas.openxmlformats.org/drawingml/2006/main" xmlns:r="http://schemas.openxmlformats.org/officeDocument/2006/relationships" xmlns:p="http://schemas.openxmlformats.org/presentationml/2006/main">
-  <p:cSld>
-    <p:spTree>
-      <p:nvGrpSpPr>
-        <p:cNvPr id="1" name=""/>
-        <p:cNvGrpSpPr/>
-        <p:nvPr/>
-      </p:nvGrpSpPr>
-      <p:grpSpPr>
-        <a:xfrm>
-          <a:off x="0" y="0"/>
-          <a:ext cx="0" cy="0"/>
-          <a:chOff x="0" y="0"/>
-          <a:chExt cx="0" cy="0"/>
-        </a:xfrm>
-      </p:grpSpPr>
-      <p:sp>
-        <p:nvSpPr>
-          <p:cNvPr id="2" name="Titolo 1"/>
-          <p:cNvSpPr>
-            <a:spLocks noGrp="1"/>
-          </p:cNvSpPr>
-          <p:nvPr>
-            <p:ph type="title"/>
-          </p:nvPr>
-        </p:nvSpPr>
-        <p:spPr/>
-        <p:txBody>
-          <a:bodyPr/>
-          <a:lstStyle/>
-          <a:p>
-            <a:r>
-              <a:rPr lang="it-IT" dirty="0" err="1" smtClean="0"/>
-              <a:t>Who</a:t>
-            </a:r>
-            <a:r>
-              <a:rPr lang="it-IT" dirty="0" smtClean="0"/>
-              <a:t> </a:t>
-            </a:r>
-            <a:r>
-              <a:rPr lang="it-IT" dirty="0" err="1" smtClean="0"/>
-              <a:t>am</a:t>
-            </a:r>
-            <a:r>
-              <a:rPr lang="it-IT" dirty="0" smtClean="0"/>
-              <a:t> I ?</a:t>
-            </a:r>
-            <a:endParaRPr lang="it-IT" dirty="0"/>
-          </a:p>
-        </p:txBody>
-      </p:sp>
-      <p:sp>
-        <p:nvSpPr>
-          <p:cNvPr id="3" name="Segnaposto contenuto 2"/>
-          <p:cNvSpPr>
-            <a:spLocks noGrp="1"/>
-          </p:cNvSpPr>
-          <p:nvPr>
-            <p:ph idx="1"/>
-          </p:nvPr>
-        </p:nvSpPr>
-        <p:spPr/>
-        <p:txBody>
-          <a:bodyPr>
-            <a:normAutofit fontScale="85000" lnSpcReduction="20000"/>
-          </a:bodyPr>
-          <a:lstStyle/>
-          <a:p>
-            <a:pPr marL="0" indent="0">
-              <a:buNone/>
-            </a:pPr>
-            <a:endParaRPr lang="en-US" sz="4400" i="1" dirty="0" smtClean="0"/>
-          </a:p>
-          <a:p>
-            <a:pPr marL="0" indent="0">
-              <a:buNone/>
-            </a:pPr>
-            <a:r>
-              <a:rPr lang="en-US" sz="4400" i="1" dirty="0" err="1" smtClean="0"/>
-              <a:t>Dott.ing</a:t>
-            </a:r>
-            <a:r>
-              <a:rPr lang="en-US" sz="4400" i="1" dirty="0" smtClean="0"/>
-              <a:t>. Alessandro </a:t>
-            </a:r>
-            <a:r>
-              <a:rPr lang="en-US" sz="4400" i="1" dirty="0" err="1"/>
-              <a:t>Giorgetti</a:t>
-            </a:r>
-            <a:endParaRPr lang="en-US" dirty="0">
-              <a:solidFill>
-                <a:srgbClr val="000000"/>
-              </a:solidFill>
-            </a:endParaRPr>
-          </a:p>
-          <a:p>
-            <a:pPr marL="0" indent="0">
-              <a:buNone/>
-            </a:pPr>
-            <a:endParaRPr lang="en-US" sz="3200" i="1" dirty="0" smtClean="0">
-              <a:solidFill>
-                <a:srgbClr val="000000"/>
-              </a:solidFill>
-            </a:endParaRPr>
-          </a:p>
-          <a:p>
-            <a:pPr marL="0" indent="0">
-              <a:buNone/>
-            </a:pPr>
-            <a:endParaRPr lang="en-US" sz="3200" i="1" dirty="0">
-              <a:solidFill>
-                <a:srgbClr val="000000"/>
-              </a:solidFill>
-            </a:endParaRPr>
-          </a:p>
-          <a:p>
-            <a:pPr marL="0" indent="0" algn="r">
-              <a:buNone/>
-            </a:pPr>
-            <a:r>
-              <a:rPr lang="en-US" dirty="0">
-                <a:solidFill>
-                  <a:srgbClr val="000000"/>
-                </a:solidFill>
-              </a:rPr>
-              <a:t>Facebook: </a:t>
-            </a:r>
-            <a:r>
-              <a:rPr lang="en-US" dirty="0">
-                <a:solidFill>
-                  <a:srgbClr val="000000"/>
-                </a:solidFill>
-                <a:latin typeface="Calibri" charset="0"/>
-                <a:hlinkClick r:id="rId3"/>
-              </a:rPr>
-              <a:t>https://www.facebook.com/giorgetti.alessandro</a:t>
-            </a:r>
-            <a:endParaRPr lang="en-US" i="1" dirty="0">
-              <a:solidFill>
-                <a:srgbClr val="000000"/>
-              </a:solidFill>
-              <a:latin typeface="Calibri" charset="0"/>
-            </a:endParaRPr>
-          </a:p>
-          <a:p>
-            <a:pPr marL="0" indent="0" algn="r">
-              <a:buNone/>
-            </a:pPr>
-            <a:r>
-              <a:rPr lang="en-US" dirty="0">
-                <a:solidFill>
-                  <a:srgbClr val="000000"/>
-                </a:solidFill>
-              </a:rPr>
-              <a:t>Twitter: @</a:t>
-            </a:r>
-            <a:r>
-              <a:rPr lang="en-US" dirty="0" err="1">
-                <a:solidFill>
-                  <a:srgbClr val="000000"/>
-                </a:solidFill>
-              </a:rPr>
-              <a:t>a_giorgetti</a:t>
-            </a:r>
-            <a:endParaRPr lang="en-US" dirty="0">
-              <a:solidFill>
-                <a:srgbClr val="000000"/>
-              </a:solidFill>
-            </a:endParaRPr>
-          </a:p>
-          <a:p>
-            <a:pPr marL="0" indent="0" algn="r">
-              <a:buNone/>
-            </a:pPr>
-            <a:r>
-              <a:rPr lang="en-US" dirty="0">
-                <a:solidFill>
-                  <a:srgbClr val="000000"/>
-                </a:solidFill>
-              </a:rPr>
-              <a:t>LinkedIn: </a:t>
-            </a:r>
-            <a:r>
-              <a:rPr lang="en-US" dirty="0">
-                <a:solidFill>
-                  <a:srgbClr val="333333"/>
-                </a:solidFill>
-                <a:latin typeface="Arial" charset="0"/>
-                <a:hlinkClick r:id="rId4"/>
-              </a:rPr>
-              <a:t>https://it.linkedin.com/in/giorgettialessandro</a:t>
-            </a:r>
-            <a:endParaRPr lang="en-US" dirty="0">
-              <a:solidFill>
-                <a:srgbClr val="000000"/>
-              </a:solidFill>
-            </a:endParaRPr>
-          </a:p>
-          <a:p>
-            <a:pPr marL="0" indent="0" algn="r">
-              <a:buNone/>
-            </a:pPr>
-            <a:r>
-              <a:rPr lang="en-US" dirty="0">
-                <a:solidFill>
-                  <a:srgbClr val="000000"/>
-                </a:solidFill>
-              </a:rPr>
-              <a:t>E-mail: </a:t>
-            </a:r>
-            <a:r>
-              <a:rPr lang="en-US" dirty="0">
-                <a:solidFill>
-                  <a:srgbClr val="000000"/>
-                </a:solidFill>
-                <a:hlinkClick r:id="rId5"/>
-              </a:rPr>
-              <a:t>alessandro.giorgetti@live.com</a:t>
-            </a:r>
-            <a:endParaRPr lang="en-US" dirty="0">
-              <a:solidFill>
-                <a:srgbClr val="000000"/>
-              </a:solidFill>
-            </a:endParaRPr>
-          </a:p>
-          <a:p>
-            <a:pPr marL="0" indent="0" algn="r">
-              <a:buNone/>
-            </a:pPr>
-            <a:r>
-              <a:rPr lang="en-US" dirty="0">
-                <a:solidFill>
-                  <a:srgbClr val="000000"/>
-                </a:solidFill>
-              </a:rPr>
-              <a:t>Blog: </a:t>
-            </a:r>
-            <a:r>
-              <a:rPr lang="en-US" dirty="0">
-                <a:solidFill>
-                  <a:srgbClr val="000000"/>
-                </a:solidFill>
-                <a:hlinkClick r:id="rId6"/>
-              </a:rPr>
-              <a:t>www.primordialcode.com</a:t>
-            </a:r>
-            <a:endParaRPr lang="en-US" dirty="0">
-              <a:solidFill>
-                <a:srgbClr val="000000"/>
-              </a:solidFill>
-            </a:endParaRPr>
-          </a:p>
-          <a:p>
-            <a:endParaRPr lang="it-IT" dirty="0"/>
-          </a:p>
-        </p:txBody>
-      </p:sp>
-      <p:pic>
-        <p:nvPicPr>
-          <p:cNvPr id="4" name="Immagine 3"/>
-          <p:cNvPicPr>
-            <a:picLocks noChangeAspect="1"/>
-          </p:cNvPicPr>
-          <p:nvPr/>
-        </p:nvPicPr>
-        <p:blipFill>
-          <a:blip r:embed="rId7">
-            <a:extLst>
-              <a:ext uri="{28A0092B-C50C-407E-A947-70E740481C1C}">
-                <a14:useLocalDpi xmlns:a14="http://schemas.microsoft.com/office/drawing/2010/main" val="0"/>
-              </a:ext>
-            </a:extLst>
-          </a:blip>
-          <a:stretch>
-            <a:fillRect/>
-          </a:stretch>
-        </p:blipFill>
-        <p:spPr>
-          <a:xfrm>
-            <a:off x="11705996" y="6416178"/>
-            <a:ext cx="486004" cy="441822"/>
-          </a:xfrm>
-          <a:prstGeom prst="rect">
-            <a:avLst/>
-          </a:prstGeom>
-        </p:spPr>
-      </p:pic>
-      <p:sp>
-        <p:nvSpPr>
-          <p:cNvPr id="5" name="CasellaDiTesto 4"/>
-          <p:cNvSpPr txBox="1"/>
-          <p:nvPr/>
-        </p:nvSpPr>
-        <p:spPr>
-          <a:xfrm>
-            <a:off x="10101089" y="6429345"/>
-            <a:ext cx="1542409" cy="400110"/>
-          </a:xfrm>
-          <a:prstGeom prst="rect">
-            <a:avLst/>
-          </a:prstGeom>
-          <a:noFill/>
-        </p:spPr>
-        <p:txBody>
-          <a:bodyPr wrap="none" rtlCol="0">
-            <a:spAutoFit/>
-          </a:bodyPr>
-          <a:lstStyle/>
-          <a:p>
-            <a:pPr algn="r"/>
-            <a:r>
-              <a:rPr lang="it-IT" sz="1000" dirty="0" smtClean="0">
-                <a:solidFill>
-                  <a:schemeClr val="bg1"/>
-                </a:solidFill>
-              </a:rPr>
-              <a:t>Alessandro </a:t>
-            </a:r>
-            <a:r>
-              <a:rPr lang="it-IT" sz="1000" dirty="0" err="1" smtClean="0">
-                <a:solidFill>
-                  <a:schemeClr val="bg1"/>
-                </a:solidFill>
-              </a:rPr>
-              <a:t>Giorgetti</a:t>
-            </a:r>
-            <a:r>
-              <a:rPr lang="it-IT" sz="1000" dirty="0" smtClean="0">
-                <a:solidFill>
-                  <a:schemeClr val="bg1"/>
-                </a:solidFill>
-              </a:rPr>
-              <a:t/>
-            </a:r>
-            <a:br>
-              <a:rPr lang="it-IT" sz="1000" dirty="0" smtClean="0">
-                <a:solidFill>
-                  <a:schemeClr val="bg1"/>
-                </a:solidFill>
-              </a:rPr>
-            </a:br>
-            <a:r>
-              <a:rPr lang="it-IT" sz="1000" dirty="0" smtClean="0">
-                <a:solidFill>
-                  <a:schemeClr val="bg1"/>
-                </a:solidFill>
-              </a:rPr>
-              <a:t>www.primordialcode.com</a:t>
-            </a:r>
-            <a:endParaRPr lang="it-IT" sz="1000" dirty="0">
-              <a:solidFill>
-                <a:schemeClr val="bg1"/>
-              </a:solidFill>
-            </a:endParaRPr>
-          </a:p>
-        </p:txBody>
-      </p:sp>
-    </p:spTree>
-    <p:extLst>
-      <p:ext uri="{BB962C8B-B14F-4D97-AF65-F5344CB8AC3E}">
-        <p14:creationId xmlns:p14="http://schemas.microsoft.com/office/powerpoint/2010/main" val="4063457505"/>
-      </p:ext>
-    </p:extLst>
-  </p:cSld>
-  <p:clrMapOvr>
-    <a:masterClrMapping/>
-  </p:clrMapOvr>
-  <p:timing>
-    <p:tnLst>
-      <p:par>
-        <p:cTn id="1" dur="indefinite" restart="never" nodeType="tmRoot"/>
-      </p:par>
-    </p:tnLst>
-  </p:timing>
-</p:sld>
-</file>
-
 <file path=ppt/slides/slide3.xml><?xml version="1.0" encoding="utf-8"?>
 <p:sld xmlns:a="http://schemas.openxmlformats.org/drawingml/2006/main" xmlns:r="http://schemas.openxmlformats.org/officeDocument/2006/relationships" xmlns:p="http://schemas.openxmlformats.org/presentationml/2006/main">
   <p:cSld>
@@ -8196,11 +10189,7 @@
           <a:p>
             <a:r>
               <a:rPr lang="en-US" dirty="0" smtClean="0"/>
-              <a:t>… </a:t>
-            </a:r>
-            <a:r>
-              <a:rPr lang="en-US" dirty="0" smtClean="0"/>
-              <a:t>more paragraphs explaining the thing …</a:t>
+              <a:t>… more paragraphs explaining the thing …</a:t>
             </a:r>
             <a:endParaRPr lang="it-IT" dirty="0"/>
           </a:p>
@@ -8459,6 +10448,431 @@
 </p:sld>
 </file>
 
+<file path=ppt/slides/slide30.xml><?xml version="1.0" encoding="utf-8"?>
+<p:sld xmlns:a="http://schemas.openxmlformats.org/drawingml/2006/main" xmlns:r="http://schemas.openxmlformats.org/officeDocument/2006/relationships" xmlns:p="http://schemas.openxmlformats.org/presentationml/2006/main">
+  <p:cSld>
+    <p:spTree>
+      <p:nvGrpSpPr>
+        <p:cNvPr id="1" name=""/>
+        <p:cNvGrpSpPr/>
+        <p:nvPr/>
+      </p:nvGrpSpPr>
+      <p:grpSpPr>
+        <a:xfrm>
+          <a:off x="0" y="0"/>
+          <a:ext cx="0" cy="0"/>
+          <a:chOff x="0" y="0"/>
+          <a:chExt cx="0" cy="0"/>
+        </a:xfrm>
+      </p:grpSpPr>
+      <p:sp>
+        <p:nvSpPr>
+          <p:cNvPr id="2" name="Titolo 1"/>
+          <p:cNvSpPr>
+            <a:spLocks noGrp="1"/>
+          </p:cNvSpPr>
+          <p:nvPr>
+            <p:ph type="title"/>
+          </p:nvPr>
+        </p:nvSpPr>
+        <p:spPr/>
+        <p:txBody>
+          <a:bodyPr/>
+          <a:lstStyle/>
+          <a:p>
+            <a:r>
+              <a:rPr lang="it-IT" dirty="0" err="1" smtClean="0"/>
+              <a:t>Who</a:t>
+            </a:r>
+            <a:r>
+              <a:rPr lang="it-IT" dirty="0" smtClean="0"/>
+              <a:t> </a:t>
+            </a:r>
+            <a:r>
+              <a:rPr lang="it-IT" dirty="0" err="1" smtClean="0"/>
+              <a:t>am</a:t>
+            </a:r>
+            <a:r>
+              <a:rPr lang="it-IT" dirty="0" smtClean="0"/>
+              <a:t> I ?</a:t>
+            </a:r>
+            <a:endParaRPr lang="it-IT" dirty="0"/>
+          </a:p>
+        </p:txBody>
+      </p:sp>
+      <p:sp>
+        <p:nvSpPr>
+          <p:cNvPr id="3" name="Segnaposto contenuto 2"/>
+          <p:cNvSpPr>
+            <a:spLocks noGrp="1"/>
+          </p:cNvSpPr>
+          <p:nvPr>
+            <p:ph idx="1"/>
+          </p:nvPr>
+        </p:nvSpPr>
+        <p:spPr/>
+        <p:txBody>
+          <a:bodyPr>
+            <a:normAutofit fontScale="85000" lnSpcReduction="20000"/>
+          </a:bodyPr>
+          <a:lstStyle/>
+          <a:p>
+            <a:pPr marL="0" indent="0">
+              <a:buNone/>
+            </a:pPr>
+            <a:endParaRPr lang="en-US" sz="4400" i="1" dirty="0" smtClean="0"/>
+          </a:p>
+          <a:p>
+            <a:pPr marL="0" indent="0">
+              <a:buNone/>
+            </a:pPr>
+            <a:r>
+              <a:rPr lang="en-US" sz="4400" i="1" dirty="0" err="1" smtClean="0"/>
+              <a:t>Dott.ing</a:t>
+            </a:r>
+            <a:r>
+              <a:rPr lang="en-US" sz="4400" i="1" dirty="0" smtClean="0"/>
+              <a:t>. Alessandro </a:t>
+            </a:r>
+            <a:r>
+              <a:rPr lang="en-US" sz="4400" i="1" dirty="0" err="1"/>
+              <a:t>Giorgetti</a:t>
+            </a:r>
+            <a:endParaRPr lang="en-US" dirty="0">
+              <a:solidFill>
+                <a:srgbClr val="000000"/>
+              </a:solidFill>
+            </a:endParaRPr>
+          </a:p>
+          <a:p>
+            <a:pPr marL="0" indent="0">
+              <a:buNone/>
+            </a:pPr>
+            <a:endParaRPr lang="en-US" sz="3200" i="1" dirty="0" smtClean="0">
+              <a:solidFill>
+                <a:srgbClr val="000000"/>
+              </a:solidFill>
+            </a:endParaRPr>
+          </a:p>
+          <a:p>
+            <a:pPr marL="0" indent="0">
+              <a:buNone/>
+            </a:pPr>
+            <a:endParaRPr lang="en-US" sz="3200" i="1" dirty="0">
+              <a:solidFill>
+                <a:srgbClr val="000000"/>
+              </a:solidFill>
+            </a:endParaRPr>
+          </a:p>
+          <a:p>
+            <a:pPr marL="0" indent="0" algn="r">
+              <a:buNone/>
+            </a:pPr>
+            <a:r>
+              <a:rPr lang="en-US" dirty="0">
+                <a:solidFill>
+                  <a:srgbClr val="000000"/>
+                </a:solidFill>
+              </a:rPr>
+              <a:t>Facebook: </a:t>
+            </a:r>
+            <a:r>
+              <a:rPr lang="en-US" dirty="0">
+                <a:solidFill>
+                  <a:srgbClr val="000000"/>
+                </a:solidFill>
+                <a:latin typeface="Calibri" charset="0"/>
+                <a:hlinkClick r:id="rId3"/>
+              </a:rPr>
+              <a:t>https://www.facebook.com/giorgetti.alessandro</a:t>
+            </a:r>
+            <a:endParaRPr lang="en-US" i="1" dirty="0">
+              <a:solidFill>
+                <a:srgbClr val="000000"/>
+              </a:solidFill>
+              <a:latin typeface="Calibri" charset="0"/>
+            </a:endParaRPr>
+          </a:p>
+          <a:p>
+            <a:pPr marL="0" indent="0" algn="r">
+              <a:buNone/>
+            </a:pPr>
+            <a:r>
+              <a:rPr lang="en-US" dirty="0">
+                <a:solidFill>
+                  <a:srgbClr val="000000"/>
+                </a:solidFill>
+              </a:rPr>
+              <a:t>Twitter: @</a:t>
+            </a:r>
+            <a:r>
+              <a:rPr lang="en-US" dirty="0" err="1">
+                <a:solidFill>
+                  <a:srgbClr val="000000"/>
+                </a:solidFill>
+              </a:rPr>
+              <a:t>a_giorgetti</a:t>
+            </a:r>
+            <a:endParaRPr lang="en-US" dirty="0">
+              <a:solidFill>
+                <a:srgbClr val="000000"/>
+              </a:solidFill>
+            </a:endParaRPr>
+          </a:p>
+          <a:p>
+            <a:pPr marL="0" indent="0" algn="r">
+              <a:buNone/>
+            </a:pPr>
+            <a:r>
+              <a:rPr lang="en-US" dirty="0">
+                <a:solidFill>
+                  <a:srgbClr val="000000"/>
+                </a:solidFill>
+              </a:rPr>
+              <a:t>LinkedIn: </a:t>
+            </a:r>
+            <a:r>
+              <a:rPr lang="en-US" dirty="0">
+                <a:solidFill>
+                  <a:srgbClr val="333333"/>
+                </a:solidFill>
+                <a:latin typeface="Arial" charset="0"/>
+                <a:hlinkClick r:id="rId4"/>
+              </a:rPr>
+              <a:t>https://it.linkedin.com/in/giorgettialessandro</a:t>
+            </a:r>
+            <a:endParaRPr lang="en-US" dirty="0">
+              <a:solidFill>
+                <a:srgbClr val="000000"/>
+              </a:solidFill>
+            </a:endParaRPr>
+          </a:p>
+          <a:p>
+            <a:pPr marL="0" indent="0" algn="r">
+              <a:buNone/>
+            </a:pPr>
+            <a:r>
+              <a:rPr lang="en-US" dirty="0">
+                <a:solidFill>
+                  <a:srgbClr val="000000"/>
+                </a:solidFill>
+              </a:rPr>
+              <a:t>E-mail: </a:t>
+            </a:r>
+            <a:r>
+              <a:rPr lang="en-US" dirty="0">
+                <a:solidFill>
+                  <a:srgbClr val="000000"/>
+                </a:solidFill>
+                <a:hlinkClick r:id="rId5"/>
+              </a:rPr>
+              <a:t>alessandro.giorgetti@live.com</a:t>
+            </a:r>
+            <a:endParaRPr lang="en-US" dirty="0">
+              <a:solidFill>
+                <a:srgbClr val="000000"/>
+              </a:solidFill>
+            </a:endParaRPr>
+          </a:p>
+          <a:p>
+            <a:pPr marL="0" indent="0" algn="r">
+              <a:buNone/>
+            </a:pPr>
+            <a:r>
+              <a:rPr lang="en-US" dirty="0">
+                <a:solidFill>
+                  <a:srgbClr val="000000"/>
+                </a:solidFill>
+              </a:rPr>
+              <a:t>Blog: </a:t>
+            </a:r>
+            <a:r>
+              <a:rPr lang="en-US" dirty="0">
+                <a:solidFill>
+                  <a:srgbClr val="000000"/>
+                </a:solidFill>
+                <a:hlinkClick r:id="rId6"/>
+              </a:rPr>
+              <a:t>www.primordialcode.com</a:t>
+            </a:r>
+            <a:endParaRPr lang="en-US" dirty="0">
+              <a:solidFill>
+                <a:srgbClr val="000000"/>
+              </a:solidFill>
+            </a:endParaRPr>
+          </a:p>
+          <a:p>
+            <a:endParaRPr lang="it-IT" dirty="0"/>
+          </a:p>
+        </p:txBody>
+      </p:sp>
+      <p:pic>
+        <p:nvPicPr>
+          <p:cNvPr id="4" name="Immagine 3"/>
+          <p:cNvPicPr>
+            <a:picLocks noChangeAspect="1"/>
+          </p:cNvPicPr>
+          <p:nvPr/>
+        </p:nvPicPr>
+        <p:blipFill>
+          <a:blip r:embed="rId7">
+            <a:extLst>
+              <a:ext uri="{28A0092B-C50C-407E-A947-70E740481C1C}">
+                <a14:useLocalDpi xmlns:a14="http://schemas.microsoft.com/office/drawing/2010/main" val="0"/>
+              </a:ext>
+            </a:extLst>
+          </a:blip>
+          <a:stretch>
+            <a:fillRect/>
+          </a:stretch>
+        </p:blipFill>
+        <p:spPr>
+          <a:xfrm>
+            <a:off x="11705996" y="6416178"/>
+            <a:ext cx="486004" cy="441822"/>
+          </a:xfrm>
+          <a:prstGeom prst="rect">
+            <a:avLst/>
+          </a:prstGeom>
+        </p:spPr>
+      </p:pic>
+      <p:sp>
+        <p:nvSpPr>
+          <p:cNvPr id="5" name="CasellaDiTesto 4"/>
+          <p:cNvSpPr txBox="1"/>
+          <p:nvPr/>
+        </p:nvSpPr>
+        <p:spPr>
+          <a:xfrm>
+            <a:off x="10101089" y="6429345"/>
+            <a:ext cx="1542409" cy="400110"/>
+          </a:xfrm>
+          <a:prstGeom prst="rect">
+            <a:avLst/>
+          </a:prstGeom>
+          <a:noFill/>
+        </p:spPr>
+        <p:txBody>
+          <a:bodyPr wrap="none" rtlCol="0">
+            <a:spAutoFit/>
+          </a:bodyPr>
+          <a:lstStyle/>
+          <a:p>
+            <a:pPr algn="r"/>
+            <a:r>
+              <a:rPr lang="it-IT" sz="1000" dirty="0" smtClean="0">
+                <a:solidFill>
+                  <a:schemeClr val="bg1"/>
+                </a:solidFill>
+              </a:rPr>
+              <a:t>Alessandro </a:t>
+            </a:r>
+            <a:r>
+              <a:rPr lang="it-IT" sz="1000" dirty="0" err="1" smtClean="0">
+                <a:solidFill>
+                  <a:schemeClr val="bg1"/>
+                </a:solidFill>
+              </a:rPr>
+              <a:t>Giorgetti</a:t>
+            </a:r>
+            <a:r>
+              <a:rPr lang="it-IT" sz="1000" dirty="0" smtClean="0">
+                <a:solidFill>
+                  <a:schemeClr val="bg1"/>
+                </a:solidFill>
+              </a:rPr>
+              <a:t/>
+            </a:r>
+            <a:br>
+              <a:rPr lang="it-IT" sz="1000" dirty="0" smtClean="0">
+                <a:solidFill>
+                  <a:schemeClr val="bg1"/>
+                </a:solidFill>
+              </a:rPr>
+            </a:br>
+            <a:r>
+              <a:rPr lang="it-IT" sz="1000" dirty="0" smtClean="0">
+                <a:solidFill>
+                  <a:schemeClr val="bg1"/>
+                </a:solidFill>
+              </a:rPr>
+              <a:t>www.primordialcode.com</a:t>
+            </a:r>
+            <a:endParaRPr lang="it-IT" sz="1000" dirty="0">
+              <a:solidFill>
+                <a:schemeClr val="bg1"/>
+              </a:solidFill>
+            </a:endParaRPr>
+          </a:p>
+        </p:txBody>
+      </p:sp>
+      <p:pic>
+        <p:nvPicPr>
+          <p:cNvPr id="1026" name="Picture 2" descr="D:\agiorgetti.github.io\images\me.png"/>
+          <p:cNvPicPr>
+            <a:picLocks noChangeAspect="1" noChangeArrowheads="1"/>
+          </p:cNvPicPr>
+          <p:nvPr/>
+        </p:nvPicPr>
+        <p:blipFill>
+          <a:blip r:embed="rId8">
+            <a:extLst>
+              <a:ext uri="{28A0092B-C50C-407E-A947-70E740481C1C}">
+                <a14:useLocalDpi xmlns:a14="http://schemas.microsoft.com/office/drawing/2010/main" val="0"/>
+              </a:ext>
+            </a:extLst>
+          </a:blip>
+          <a:srcRect/>
+          <a:stretch>
+            <a:fillRect/>
+          </a:stretch>
+        </p:blipFill>
+        <p:spPr bwMode="auto">
+          <a:xfrm>
+            <a:off x="1206500" y="3111500"/>
+            <a:ext cx="2978150" cy="2978150"/>
+          </a:xfrm>
+          <a:prstGeom prst="rect">
+            <a:avLst/>
+          </a:prstGeom>
+          <a:noFill/>
+          <a:effectLst>
+            <a:outerShdw blurRad="50800" dist="50800" sx="1000" sy="1000" algn="ctr" rotWithShape="0">
+              <a:srgbClr val="000000"/>
+            </a:outerShdw>
+            <a:softEdge rad="63500"/>
+          </a:effectLst>
+          <a:extLst>
+            <a:ext uri="{909E8E84-426E-40DD-AFC4-6F175D3DCCD1}">
+              <a14:hiddenFill xmlns:a14="http://schemas.microsoft.com/office/drawing/2010/main">
+                <a:solidFill>
+                  <a:srgbClr val="FFFFFF"/>
+                </a:solidFill>
+              </a14:hiddenFill>
+            </a:ext>
+          </a:extLst>
+        </p:spPr>
+      </p:pic>
+    </p:spTree>
+    <p:extLst>
+      <p:ext uri="{BB962C8B-B14F-4D97-AF65-F5344CB8AC3E}">
+        <p14:creationId xmlns:p14="http://schemas.microsoft.com/office/powerpoint/2010/main" val="4063457505"/>
+      </p:ext>
+    </p:extLst>
+  </p:cSld>
+  <p:clrMapOvr>
+    <a:masterClrMapping/>
+  </p:clrMapOvr>
+  <p:timing>
+    <p:tnLst>
+      <p:par>
+        <p:cTn id="1" dur="indefinite" restart="never" nodeType="tmRoot"/>
+      </p:par>
+    </p:tnLst>
+  </p:timing>
+</p:sld>
+</file>
+
 <file path=ppt/slides/slide4.xml><?xml version="1.0" encoding="utf-8"?>
 <p:sld xmlns:a="http://schemas.openxmlformats.org/drawingml/2006/main" xmlns:r="http://schemas.openxmlformats.org/officeDocument/2006/relationships" xmlns:p="http://schemas.openxmlformats.org/presentationml/2006/main">
   <p:cSld>
@@ -8548,15 +10962,7 @@
             </a:r>
             <a:r>
               <a:rPr lang="en-US" b="1" dirty="0" smtClean="0"/>
-              <a:t>Functional </a:t>
-            </a:r>
-            <a:r>
-              <a:rPr lang="en-US" b="1" dirty="0" smtClean="0"/>
-              <a:t>Reactive </a:t>
-            </a:r>
-            <a:r>
-              <a:rPr lang="en-US" b="1" dirty="0" smtClean="0"/>
-              <a:t>Programming</a:t>
+              <a:t>Functional Reactive Programming</a:t>
             </a:r>
             <a:r>
               <a:rPr lang="en-US" dirty="0" smtClean="0"/>
@@ -8568,25 +10974,16 @@
             </a:r>
             <a:r>
               <a:rPr lang="en-US" dirty="0" smtClean="0"/>
-              <a:t>“</a:t>
-            </a:r>
-            <a:r>
-              <a:rPr lang="en-US" dirty="0" smtClean="0"/>
-              <a:t>datatypes </a:t>
+              <a:t>“datatypes </a:t>
             </a:r>
             <a:r>
               <a:rPr lang="en-US" dirty="0"/>
-              <a:t>that represent a value 'over </a:t>
-            </a:r>
-            <a:r>
-              <a:rPr lang="en-US" dirty="0"/>
-              <a:t>time</a:t>
+              <a:t>that represent a value 'over time</a:t>
             </a:r>
             <a:r>
               <a:rPr lang="en-US" dirty="0" smtClean="0"/>
               <a:t>‘ ”. </a:t>
             </a:r>
-            <a:endParaRPr lang="en-US" dirty="0" smtClean="0"/>
           </a:p>
           <a:p>
             <a:r>
@@ -8644,11 +11041,7 @@
           <a:p>
             <a:r>
               <a:rPr lang="en-US" dirty="0" smtClean="0"/>
-              <a:t>… </a:t>
-            </a:r>
-            <a:r>
-              <a:rPr lang="en-US" dirty="0" smtClean="0"/>
-              <a:t>more paragraphs explaining the thing …</a:t>
+              <a:t>… more paragraphs explaining the thing …</a:t>
             </a:r>
             <a:endParaRPr lang="it-IT" dirty="0"/>
           </a:p>
@@ -9072,11 +11465,7 @@
             </a:r>
             <a:r>
               <a:rPr lang="it-IT" sz="4400" dirty="0" smtClean="0"/>
-              <a:t> </a:t>
-            </a:r>
-            <a:r>
-              <a:rPr lang="it-IT" sz="4400" dirty="0" smtClean="0"/>
-              <a:t>(</a:t>
+              <a:t> (</a:t>
             </a:r>
             <a:r>
               <a:rPr lang="it-IT" sz="4400" dirty="0" err="1" smtClean="0"/>
@@ -9084,11 +11473,7 @@
             </a:r>
             <a:r>
               <a:rPr lang="it-IT" sz="4400" dirty="0" smtClean="0"/>
-              <a:t>) </a:t>
-            </a:r>
-            <a:r>
-              <a:rPr lang="it-IT" sz="4400" dirty="0" smtClean="0"/>
-              <a:t>Data </a:t>
+              <a:t>) Data </a:t>
             </a:r>
             <a:r>
               <a:rPr lang="it-IT" sz="4400" dirty="0" err="1" smtClean="0"/>
@@ -9371,11 +11756,7 @@
             </a:r>
             <a:r>
               <a:rPr lang="it-IT" dirty="0" smtClean="0"/>
-              <a:t> by </a:t>
-            </a:r>
-            <a:r>
-              <a:rPr lang="it-IT" dirty="0" smtClean="0"/>
-              <a:t>the </a:t>
+              <a:t> by the </a:t>
             </a:r>
             <a:r>
               <a:rPr lang="it-IT" dirty="0" err="1" smtClean="0"/>
@@ -9383,13 +11764,8 @@
             </a:r>
             <a:r>
               <a:rPr lang="it-IT" dirty="0" smtClean="0"/>
-              <a:t> </a:t>
-            </a:r>
-            <a:r>
-              <a:rPr lang="it-IT" dirty="0" smtClean="0"/>
-              <a:t>manifesto!</a:t>
-            </a:r>
-            <a:endParaRPr lang="it-IT" dirty="0" smtClean="0"/>
+              <a:t> manifesto!</a:t>
+            </a:r>
           </a:p>
           <a:p>
             <a:endParaRPr lang="it-IT" dirty="0"/>

</xml_diff>

<commit_message>
Updated slides and samples
</commit_message>
<xml_diff>
--- a/ReactiveProgramming_RxJS.pptx
+++ b/ReactiveProgramming_RxJS.pptx
@@ -141,7 +141,7 @@
   </p:defaultTextStyle>
   <p:extLst>
     <p:ext uri="{EFAFB233-063F-42B5-8137-9DF3F51BA10A}">
-      <p15:sldGuideLst xmlns:p15="http://schemas.microsoft.com/office/powerpoint/2012/main" xmlns=""/>
+      <p15:sldGuideLst xmlns="" xmlns:p15="http://schemas.microsoft.com/office/powerpoint/2012/main"/>
     </p:ext>
   </p:extLst>
 </p:presentation>
@@ -229,7 +229,7 @@
           <a:p>
             <a:fld id="{327B5F9E-84DB-4811-8F56-9C65E911095D}" type="datetimeFigureOut">
               <a:rPr lang="it-IT" smtClean="0"/>
-              <a:t>25/11/2018</a:t>
+              <a:t>03/12/2018</a:t>
             </a:fld>
             <a:endParaRPr lang="it-IT"/>
           </a:p>
@@ -394,7 +394,7 @@
           <a:p>
             <a:fld id="{60073984-6E99-4D80-ADB1-BFDA0D866557}" type="datetimeFigureOut">
               <a:rPr lang="en-US"/>
-              <a:t>11/25/2018</a:t>
+              <a:t>12/3/2018</a:t>
             </a:fld>
             <a:endParaRPr lang="en-US"/>
           </a:p>
@@ -750,6 +750,846 @@
 </p:notes>
 </file>
 
+<file path=ppt/notesSlides/notesSlide10.xml><?xml version="1.0" encoding="utf-8"?>
+<p:notes xmlns:a="http://schemas.openxmlformats.org/drawingml/2006/main" xmlns:r="http://schemas.openxmlformats.org/officeDocument/2006/relationships" xmlns:p="http://schemas.openxmlformats.org/presentationml/2006/main">
+  <p:cSld>
+    <p:spTree>
+      <p:nvGrpSpPr>
+        <p:cNvPr id="1" name=""/>
+        <p:cNvGrpSpPr/>
+        <p:nvPr/>
+      </p:nvGrpSpPr>
+      <p:grpSpPr>
+        <a:xfrm>
+          <a:off x="0" y="0"/>
+          <a:ext cx="0" cy="0"/>
+          <a:chOff x="0" y="0"/>
+          <a:chExt cx="0" cy="0"/>
+        </a:xfrm>
+      </p:grpSpPr>
+      <p:sp>
+        <p:nvSpPr>
+          <p:cNvPr id="2" name="Segnaposto immagine diapositiva 1"/>
+          <p:cNvSpPr>
+            <a:spLocks noGrp="1" noRot="1" noChangeAspect="1"/>
+          </p:cNvSpPr>
+          <p:nvPr>
+            <p:ph type="sldImg"/>
+          </p:nvPr>
+        </p:nvSpPr>
+        <p:spPr/>
+      </p:sp>
+      <p:sp>
+        <p:nvSpPr>
+          <p:cNvPr id="3" name="Segnaposto note 2"/>
+          <p:cNvSpPr>
+            <a:spLocks noGrp="1"/>
+          </p:cNvSpPr>
+          <p:nvPr>
+            <p:ph type="body" idx="1"/>
+          </p:nvPr>
+        </p:nvSpPr>
+        <p:spPr/>
+        <p:txBody>
+          <a:bodyPr/>
+          <a:lstStyle/>
+          <a:p>
+            <a:endParaRPr lang="it-IT"/>
+          </a:p>
+        </p:txBody>
+      </p:sp>
+      <p:sp>
+        <p:nvSpPr>
+          <p:cNvPr id="4" name="Segnaposto numero diapositiva 3"/>
+          <p:cNvSpPr>
+            <a:spLocks noGrp="1"/>
+          </p:cNvSpPr>
+          <p:nvPr>
+            <p:ph type="sldNum" sz="quarter" idx="10"/>
+          </p:nvPr>
+        </p:nvSpPr>
+        <p:spPr/>
+        <p:txBody>
+          <a:bodyPr/>
+          <a:lstStyle/>
+          <a:p>
+            <a:fld id="{C519897D-FFB3-4111-B327-449DADBE2990}" type="slidenum">
+              <a:rPr lang="en-US" smtClean="0"/>
+              <a:t>10</a:t>
+            </a:fld>
+            <a:endParaRPr lang="en-US"/>
+          </a:p>
+        </p:txBody>
+      </p:sp>
+    </p:spTree>
+    <p:extLst>
+      <p:ext uri="{BB962C8B-B14F-4D97-AF65-F5344CB8AC3E}">
+        <p14:creationId xmlns:p14="http://schemas.microsoft.com/office/powerpoint/2010/main" val="3397164183"/>
+      </p:ext>
+    </p:extLst>
+  </p:cSld>
+  <p:clrMapOvr>
+    <a:masterClrMapping/>
+  </p:clrMapOvr>
+</p:notes>
+</file>
+
+<file path=ppt/notesSlides/notesSlide11.xml><?xml version="1.0" encoding="utf-8"?>
+<p:notes xmlns:a="http://schemas.openxmlformats.org/drawingml/2006/main" xmlns:r="http://schemas.openxmlformats.org/officeDocument/2006/relationships" xmlns:p="http://schemas.openxmlformats.org/presentationml/2006/main">
+  <p:cSld>
+    <p:spTree>
+      <p:nvGrpSpPr>
+        <p:cNvPr id="1" name=""/>
+        <p:cNvGrpSpPr/>
+        <p:nvPr/>
+      </p:nvGrpSpPr>
+      <p:grpSpPr>
+        <a:xfrm>
+          <a:off x="0" y="0"/>
+          <a:ext cx="0" cy="0"/>
+          <a:chOff x="0" y="0"/>
+          <a:chExt cx="0" cy="0"/>
+        </a:xfrm>
+      </p:grpSpPr>
+      <p:sp>
+        <p:nvSpPr>
+          <p:cNvPr id="2" name="Segnaposto immagine diapositiva 1"/>
+          <p:cNvSpPr>
+            <a:spLocks noGrp="1" noRot="1" noChangeAspect="1"/>
+          </p:cNvSpPr>
+          <p:nvPr>
+            <p:ph type="sldImg"/>
+          </p:nvPr>
+        </p:nvSpPr>
+        <p:spPr/>
+      </p:sp>
+      <p:sp>
+        <p:nvSpPr>
+          <p:cNvPr id="3" name="Segnaposto note 2"/>
+          <p:cNvSpPr>
+            <a:spLocks noGrp="1"/>
+          </p:cNvSpPr>
+          <p:nvPr>
+            <p:ph type="body" idx="1"/>
+          </p:nvPr>
+        </p:nvSpPr>
+        <p:spPr/>
+        <p:txBody>
+          <a:bodyPr/>
+          <a:lstStyle/>
+          <a:p>
+            <a:endParaRPr lang="it-IT"/>
+          </a:p>
+        </p:txBody>
+      </p:sp>
+      <p:sp>
+        <p:nvSpPr>
+          <p:cNvPr id="4" name="Segnaposto numero diapositiva 3"/>
+          <p:cNvSpPr>
+            <a:spLocks noGrp="1"/>
+          </p:cNvSpPr>
+          <p:nvPr>
+            <p:ph type="sldNum" sz="quarter" idx="10"/>
+          </p:nvPr>
+        </p:nvSpPr>
+        <p:spPr/>
+        <p:txBody>
+          <a:bodyPr/>
+          <a:lstStyle/>
+          <a:p>
+            <a:fld id="{C519897D-FFB3-4111-B327-449DADBE2990}" type="slidenum">
+              <a:rPr lang="en-US" smtClean="0"/>
+              <a:t>11</a:t>
+            </a:fld>
+            <a:endParaRPr lang="en-US"/>
+          </a:p>
+        </p:txBody>
+      </p:sp>
+    </p:spTree>
+    <p:extLst>
+      <p:ext uri="{BB962C8B-B14F-4D97-AF65-F5344CB8AC3E}">
+        <p14:creationId xmlns:p14="http://schemas.microsoft.com/office/powerpoint/2010/main" val="1335305398"/>
+      </p:ext>
+    </p:extLst>
+  </p:cSld>
+  <p:clrMapOvr>
+    <a:masterClrMapping/>
+  </p:clrMapOvr>
+</p:notes>
+</file>
+
+<file path=ppt/notesSlides/notesSlide12.xml><?xml version="1.0" encoding="utf-8"?>
+<p:notes xmlns:a="http://schemas.openxmlformats.org/drawingml/2006/main" xmlns:r="http://schemas.openxmlformats.org/officeDocument/2006/relationships" xmlns:p="http://schemas.openxmlformats.org/presentationml/2006/main">
+  <p:cSld>
+    <p:spTree>
+      <p:nvGrpSpPr>
+        <p:cNvPr id="1" name=""/>
+        <p:cNvGrpSpPr/>
+        <p:nvPr/>
+      </p:nvGrpSpPr>
+      <p:grpSpPr>
+        <a:xfrm>
+          <a:off x="0" y="0"/>
+          <a:ext cx="0" cy="0"/>
+          <a:chOff x="0" y="0"/>
+          <a:chExt cx="0" cy="0"/>
+        </a:xfrm>
+      </p:grpSpPr>
+      <p:sp>
+        <p:nvSpPr>
+          <p:cNvPr id="2" name="Segnaposto immagine diapositiva 1"/>
+          <p:cNvSpPr>
+            <a:spLocks noGrp="1" noRot="1" noChangeAspect="1"/>
+          </p:cNvSpPr>
+          <p:nvPr>
+            <p:ph type="sldImg"/>
+          </p:nvPr>
+        </p:nvSpPr>
+        <p:spPr/>
+      </p:sp>
+      <p:sp>
+        <p:nvSpPr>
+          <p:cNvPr id="3" name="Segnaposto note 2"/>
+          <p:cNvSpPr>
+            <a:spLocks noGrp="1"/>
+          </p:cNvSpPr>
+          <p:nvPr>
+            <p:ph type="body" idx="1"/>
+          </p:nvPr>
+        </p:nvSpPr>
+        <p:spPr/>
+        <p:txBody>
+          <a:bodyPr/>
+          <a:lstStyle/>
+          <a:p>
+            <a:endParaRPr lang="it-IT"/>
+          </a:p>
+        </p:txBody>
+      </p:sp>
+      <p:sp>
+        <p:nvSpPr>
+          <p:cNvPr id="4" name="Segnaposto numero diapositiva 3"/>
+          <p:cNvSpPr>
+            <a:spLocks noGrp="1"/>
+          </p:cNvSpPr>
+          <p:nvPr>
+            <p:ph type="sldNum" sz="quarter" idx="10"/>
+          </p:nvPr>
+        </p:nvSpPr>
+        <p:spPr/>
+        <p:txBody>
+          <a:bodyPr/>
+          <a:lstStyle/>
+          <a:p>
+            <a:fld id="{C519897D-FFB3-4111-B327-449DADBE2990}" type="slidenum">
+              <a:rPr lang="en-US" smtClean="0"/>
+              <a:t>12</a:t>
+            </a:fld>
+            <a:endParaRPr lang="en-US"/>
+          </a:p>
+        </p:txBody>
+      </p:sp>
+    </p:spTree>
+    <p:extLst>
+      <p:ext uri="{BB962C8B-B14F-4D97-AF65-F5344CB8AC3E}">
+        <p14:creationId xmlns:p14="http://schemas.microsoft.com/office/powerpoint/2010/main" val="324802788"/>
+      </p:ext>
+    </p:extLst>
+  </p:cSld>
+  <p:clrMapOvr>
+    <a:masterClrMapping/>
+  </p:clrMapOvr>
+</p:notes>
+</file>
+
+<file path=ppt/notesSlides/notesSlide13.xml><?xml version="1.0" encoding="utf-8"?>
+<p:notes xmlns:a="http://schemas.openxmlformats.org/drawingml/2006/main" xmlns:r="http://schemas.openxmlformats.org/officeDocument/2006/relationships" xmlns:p="http://schemas.openxmlformats.org/presentationml/2006/main">
+  <p:cSld>
+    <p:spTree>
+      <p:nvGrpSpPr>
+        <p:cNvPr id="1" name=""/>
+        <p:cNvGrpSpPr/>
+        <p:nvPr/>
+      </p:nvGrpSpPr>
+      <p:grpSpPr>
+        <a:xfrm>
+          <a:off x="0" y="0"/>
+          <a:ext cx="0" cy="0"/>
+          <a:chOff x="0" y="0"/>
+          <a:chExt cx="0" cy="0"/>
+        </a:xfrm>
+      </p:grpSpPr>
+      <p:sp>
+        <p:nvSpPr>
+          <p:cNvPr id="2" name="Segnaposto immagine diapositiva 1"/>
+          <p:cNvSpPr>
+            <a:spLocks noGrp="1" noRot="1" noChangeAspect="1"/>
+          </p:cNvSpPr>
+          <p:nvPr>
+            <p:ph type="sldImg"/>
+          </p:nvPr>
+        </p:nvSpPr>
+        <p:spPr/>
+      </p:sp>
+      <p:sp>
+        <p:nvSpPr>
+          <p:cNvPr id="3" name="Segnaposto note 2"/>
+          <p:cNvSpPr>
+            <a:spLocks noGrp="1"/>
+          </p:cNvSpPr>
+          <p:nvPr>
+            <p:ph type="body" idx="1"/>
+          </p:nvPr>
+        </p:nvSpPr>
+        <p:spPr/>
+        <p:txBody>
+          <a:bodyPr/>
+          <a:lstStyle/>
+          <a:p>
+            <a:endParaRPr lang="it-IT"/>
+          </a:p>
+        </p:txBody>
+      </p:sp>
+      <p:sp>
+        <p:nvSpPr>
+          <p:cNvPr id="4" name="Segnaposto numero diapositiva 3"/>
+          <p:cNvSpPr>
+            <a:spLocks noGrp="1"/>
+          </p:cNvSpPr>
+          <p:nvPr>
+            <p:ph type="sldNum" sz="quarter" idx="10"/>
+          </p:nvPr>
+        </p:nvSpPr>
+        <p:spPr/>
+        <p:txBody>
+          <a:bodyPr/>
+          <a:lstStyle/>
+          <a:p>
+            <a:fld id="{C519897D-FFB3-4111-B327-449DADBE2990}" type="slidenum">
+              <a:rPr lang="en-US" smtClean="0"/>
+              <a:t>13</a:t>
+            </a:fld>
+            <a:endParaRPr lang="en-US"/>
+          </a:p>
+        </p:txBody>
+      </p:sp>
+    </p:spTree>
+    <p:extLst>
+      <p:ext uri="{BB962C8B-B14F-4D97-AF65-F5344CB8AC3E}">
+        <p14:creationId xmlns:p14="http://schemas.microsoft.com/office/powerpoint/2010/main" val="2782714156"/>
+      </p:ext>
+    </p:extLst>
+  </p:cSld>
+  <p:clrMapOvr>
+    <a:masterClrMapping/>
+  </p:clrMapOvr>
+</p:notes>
+</file>
+
+<file path=ppt/notesSlides/notesSlide14.xml><?xml version="1.0" encoding="utf-8"?>
+<p:notes xmlns:a="http://schemas.openxmlformats.org/drawingml/2006/main" xmlns:r="http://schemas.openxmlformats.org/officeDocument/2006/relationships" xmlns:p="http://schemas.openxmlformats.org/presentationml/2006/main">
+  <p:cSld>
+    <p:spTree>
+      <p:nvGrpSpPr>
+        <p:cNvPr id="1" name=""/>
+        <p:cNvGrpSpPr/>
+        <p:nvPr/>
+      </p:nvGrpSpPr>
+      <p:grpSpPr>
+        <a:xfrm>
+          <a:off x="0" y="0"/>
+          <a:ext cx="0" cy="0"/>
+          <a:chOff x="0" y="0"/>
+          <a:chExt cx="0" cy="0"/>
+        </a:xfrm>
+      </p:grpSpPr>
+      <p:sp>
+        <p:nvSpPr>
+          <p:cNvPr id="2" name="Segnaposto immagine diapositiva 1"/>
+          <p:cNvSpPr>
+            <a:spLocks noGrp="1" noRot="1" noChangeAspect="1"/>
+          </p:cNvSpPr>
+          <p:nvPr>
+            <p:ph type="sldImg"/>
+          </p:nvPr>
+        </p:nvSpPr>
+        <p:spPr/>
+      </p:sp>
+      <p:sp>
+        <p:nvSpPr>
+          <p:cNvPr id="3" name="Segnaposto note 2"/>
+          <p:cNvSpPr>
+            <a:spLocks noGrp="1"/>
+          </p:cNvSpPr>
+          <p:nvPr>
+            <p:ph type="body" idx="1"/>
+          </p:nvPr>
+        </p:nvSpPr>
+        <p:spPr/>
+        <p:txBody>
+          <a:bodyPr/>
+          <a:lstStyle/>
+          <a:p>
+            <a:endParaRPr lang="it-IT"/>
+          </a:p>
+        </p:txBody>
+      </p:sp>
+      <p:sp>
+        <p:nvSpPr>
+          <p:cNvPr id="4" name="Segnaposto numero diapositiva 3"/>
+          <p:cNvSpPr>
+            <a:spLocks noGrp="1"/>
+          </p:cNvSpPr>
+          <p:nvPr>
+            <p:ph type="sldNum" sz="quarter" idx="10"/>
+          </p:nvPr>
+        </p:nvSpPr>
+        <p:spPr/>
+        <p:txBody>
+          <a:bodyPr/>
+          <a:lstStyle/>
+          <a:p>
+            <a:fld id="{C519897D-FFB3-4111-B327-449DADBE2990}" type="slidenum">
+              <a:rPr lang="en-US" smtClean="0"/>
+              <a:t>14</a:t>
+            </a:fld>
+            <a:endParaRPr lang="en-US"/>
+          </a:p>
+        </p:txBody>
+      </p:sp>
+    </p:spTree>
+    <p:extLst>
+      <p:ext uri="{BB962C8B-B14F-4D97-AF65-F5344CB8AC3E}">
+        <p14:creationId xmlns:p14="http://schemas.microsoft.com/office/powerpoint/2010/main" val="71943022"/>
+      </p:ext>
+    </p:extLst>
+  </p:cSld>
+  <p:clrMapOvr>
+    <a:masterClrMapping/>
+  </p:clrMapOvr>
+</p:notes>
+</file>
+
+<file path=ppt/notesSlides/notesSlide15.xml><?xml version="1.0" encoding="utf-8"?>
+<p:notes xmlns:a="http://schemas.openxmlformats.org/drawingml/2006/main" xmlns:r="http://schemas.openxmlformats.org/officeDocument/2006/relationships" xmlns:p="http://schemas.openxmlformats.org/presentationml/2006/main">
+  <p:cSld>
+    <p:spTree>
+      <p:nvGrpSpPr>
+        <p:cNvPr id="1" name=""/>
+        <p:cNvGrpSpPr/>
+        <p:nvPr/>
+      </p:nvGrpSpPr>
+      <p:grpSpPr>
+        <a:xfrm>
+          <a:off x="0" y="0"/>
+          <a:ext cx="0" cy="0"/>
+          <a:chOff x="0" y="0"/>
+          <a:chExt cx="0" cy="0"/>
+        </a:xfrm>
+      </p:grpSpPr>
+      <p:sp>
+        <p:nvSpPr>
+          <p:cNvPr id="2" name="Segnaposto immagine diapositiva 1"/>
+          <p:cNvSpPr>
+            <a:spLocks noGrp="1" noRot="1" noChangeAspect="1"/>
+          </p:cNvSpPr>
+          <p:nvPr>
+            <p:ph type="sldImg"/>
+          </p:nvPr>
+        </p:nvSpPr>
+        <p:spPr/>
+      </p:sp>
+      <p:sp>
+        <p:nvSpPr>
+          <p:cNvPr id="3" name="Segnaposto note 2"/>
+          <p:cNvSpPr>
+            <a:spLocks noGrp="1"/>
+          </p:cNvSpPr>
+          <p:nvPr>
+            <p:ph type="body" idx="1"/>
+          </p:nvPr>
+        </p:nvSpPr>
+        <p:spPr/>
+        <p:txBody>
+          <a:bodyPr/>
+          <a:lstStyle/>
+          <a:p>
+            <a:endParaRPr lang="it-IT"/>
+          </a:p>
+        </p:txBody>
+      </p:sp>
+      <p:sp>
+        <p:nvSpPr>
+          <p:cNvPr id="4" name="Segnaposto numero diapositiva 3"/>
+          <p:cNvSpPr>
+            <a:spLocks noGrp="1"/>
+          </p:cNvSpPr>
+          <p:nvPr>
+            <p:ph type="sldNum" sz="quarter" idx="10"/>
+          </p:nvPr>
+        </p:nvSpPr>
+        <p:spPr/>
+        <p:txBody>
+          <a:bodyPr/>
+          <a:lstStyle/>
+          <a:p>
+            <a:fld id="{C519897D-FFB3-4111-B327-449DADBE2990}" type="slidenum">
+              <a:rPr lang="en-US" smtClean="0"/>
+              <a:t>15</a:t>
+            </a:fld>
+            <a:endParaRPr lang="en-US"/>
+          </a:p>
+        </p:txBody>
+      </p:sp>
+    </p:spTree>
+    <p:extLst>
+      <p:ext uri="{BB962C8B-B14F-4D97-AF65-F5344CB8AC3E}">
+        <p14:creationId xmlns:p14="http://schemas.microsoft.com/office/powerpoint/2010/main" val="341731454"/>
+      </p:ext>
+    </p:extLst>
+  </p:cSld>
+  <p:clrMapOvr>
+    <a:masterClrMapping/>
+  </p:clrMapOvr>
+</p:notes>
+</file>
+
+<file path=ppt/notesSlides/notesSlide16.xml><?xml version="1.0" encoding="utf-8"?>
+<p:notes xmlns:a="http://schemas.openxmlformats.org/drawingml/2006/main" xmlns:r="http://schemas.openxmlformats.org/officeDocument/2006/relationships" xmlns:p="http://schemas.openxmlformats.org/presentationml/2006/main">
+  <p:cSld>
+    <p:spTree>
+      <p:nvGrpSpPr>
+        <p:cNvPr id="1" name=""/>
+        <p:cNvGrpSpPr/>
+        <p:nvPr/>
+      </p:nvGrpSpPr>
+      <p:grpSpPr>
+        <a:xfrm>
+          <a:off x="0" y="0"/>
+          <a:ext cx="0" cy="0"/>
+          <a:chOff x="0" y="0"/>
+          <a:chExt cx="0" cy="0"/>
+        </a:xfrm>
+      </p:grpSpPr>
+      <p:sp>
+        <p:nvSpPr>
+          <p:cNvPr id="2" name="Segnaposto immagine diapositiva 1"/>
+          <p:cNvSpPr>
+            <a:spLocks noGrp="1" noRot="1" noChangeAspect="1"/>
+          </p:cNvSpPr>
+          <p:nvPr>
+            <p:ph type="sldImg"/>
+          </p:nvPr>
+        </p:nvSpPr>
+        <p:spPr/>
+      </p:sp>
+      <p:sp>
+        <p:nvSpPr>
+          <p:cNvPr id="3" name="Segnaposto note 2"/>
+          <p:cNvSpPr>
+            <a:spLocks noGrp="1"/>
+          </p:cNvSpPr>
+          <p:nvPr>
+            <p:ph type="body" idx="1"/>
+          </p:nvPr>
+        </p:nvSpPr>
+        <p:spPr/>
+        <p:txBody>
+          <a:bodyPr/>
+          <a:lstStyle/>
+          <a:p>
+            <a:endParaRPr lang="it-IT"/>
+          </a:p>
+        </p:txBody>
+      </p:sp>
+      <p:sp>
+        <p:nvSpPr>
+          <p:cNvPr id="4" name="Segnaposto numero diapositiva 3"/>
+          <p:cNvSpPr>
+            <a:spLocks noGrp="1"/>
+          </p:cNvSpPr>
+          <p:nvPr>
+            <p:ph type="sldNum" sz="quarter" idx="10"/>
+          </p:nvPr>
+        </p:nvSpPr>
+        <p:spPr/>
+        <p:txBody>
+          <a:bodyPr/>
+          <a:lstStyle/>
+          <a:p>
+            <a:fld id="{C519897D-FFB3-4111-B327-449DADBE2990}" type="slidenum">
+              <a:rPr lang="en-US" smtClean="0"/>
+              <a:t>16</a:t>
+            </a:fld>
+            <a:endParaRPr lang="en-US"/>
+          </a:p>
+        </p:txBody>
+      </p:sp>
+    </p:spTree>
+    <p:extLst>
+      <p:ext uri="{BB962C8B-B14F-4D97-AF65-F5344CB8AC3E}">
+        <p14:creationId xmlns:p14="http://schemas.microsoft.com/office/powerpoint/2010/main" val="1133531913"/>
+      </p:ext>
+    </p:extLst>
+  </p:cSld>
+  <p:clrMapOvr>
+    <a:masterClrMapping/>
+  </p:clrMapOvr>
+</p:notes>
+</file>
+
+<file path=ppt/notesSlides/notesSlide17.xml><?xml version="1.0" encoding="utf-8"?>
+<p:notes xmlns:a="http://schemas.openxmlformats.org/drawingml/2006/main" xmlns:r="http://schemas.openxmlformats.org/officeDocument/2006/relationships" xmlns:p="http://schemas.openxmlformats.org/presentationml/2006/main">
+  <p:cSld>
+    <p:spTree>
+      <p:nvGrpSpPr>
+        <p:cNvPr id="1" name=""/>
+        <p:cNvGrpSpPr/>
+        <p:nvPr/>
+      </p:nvGrpSpPr>
+      <p:grpSpPr>
+        <a:xfrm>
+          <a:off x="0" y="0"/>
+          <a:ext cx="0" cy="0"/>
+          <a:chOff x="0" y="0"/>
+          <a:chExt cx="0" cy="0"/>
+        </a:xfrm>
+      </p:grpSpPr>
+      <p:sp>
+        <p:nvSpPr>
+          <p:cNvPr id="2" name="Segnaposto immagine diapositiva 1"/>
+          <p:cNvSpPr>
+            <a:spLocks noGrp="1" noRot="1" noChangeAspect="1"/>
+          </p:cNvSpPr>
+          <p:nvPr>
+            <p:ph type="sldImg"/>
+          </p:nvPr>
+        </p:nvSpPr>
+        <p:spPr/>
+      </p:sp>
+      <p:sp>
+        <p:nvSpPr>
+          <p:cNvPr id="3" name="Segnaposto note 2"/>
+          <p:cNvSpPr>
+            <a:spLocks noGrp="1"/>
+          </p:cNvSpPr>
+          <p:nvPr>
+            <p:ph type="body" idx="1"/>
+          </p:nvPr>
+        </p:nvSpPr>
+        <p:spPr/>
+        <p:txBody>
+          <a:bodyPr/>
+          <a:lstStyle/>
+          <a:p>
+            <a:endParaRPr lang="it-IT"/>
+          </a:p>
+        </p:txBody>
+      </p:sp>
+      <p:sp>
+        <p:nvSpPr>
+          <p:cNvPr id="4" name="Segnaposto numero diapositiva 3"/>
+          <p:cNvSpPr>
+            <a:spLocks noGrp="1"/>
+          </p:cNvSpPr>
+          <p:nvPr>
+            <p:ph type="sldNum" sz="quarter" idx="10"/>
+          </p:nvPr>
+        </p:nvSpPr>
+        <p:spPr/>
+        <p:txBody>
+          <a:bodyPr/>
+          <a:lstStyle/>
+          <a:p>
+            <a:fld id="{C519897D-FFB3-4111-B327-449DADBE2990}" type="slidenum">
+              <a:rPr lang="en-US" smtClean="0"/>
+              <a:t>17</a:t>
+            </a:fld>
+            <a:endParaRPr lang="en-US"/>
+          </a:p>
+        </p:txBody>
+      </p:sp>
+    </p:spTree>
+    <p:extLst>
+      <p:ext uri="{BB962C8B-B14F-4D97-AF65-F5344CB8AC3E}">
+        <p14:creationId xmlns:p14="http://schemas.microsoft.com/office/powerpoint/2010/main" val="703716112"/>
+      </p:ext>
+    </p:extLst>
+  </p:cSld>
+  <p:clrMapOvr>
+    <a:masterClrMapping/>
+  </p:clrMapOvr>
+</p:notes>
+</file>
+
+<file path=ppt/notesSlides/notesSlide18.xml><?xml version="1.0" encoding="utf-8"?>
+<p:notes xmlns:a="http://schemas.openxmlformats.org/drawingml/2006/main" xmlns:r="http://schemas.openxmlformats.org/officeDocument/2006/relationships" xmlns:p="http://schemas.openxmlformats.org/presentationml/2006/main">
+  <p:cSld>
+    <p:spTree>
+      <p:nvGrpSpPr>
+        <p:cNvPr id="1" name=""/>
+        <p:cNvGrpSpPr/>
+        <p:nvPr/>
+      </p:nvGrpSpPr>
+      <p:grpSpPr>
+        <a:xfrm>
+          <a:off x="0" y="0"/>
+          <a:ext cx="0" cy="0"/>
+          <a:chOff x="0" y="0"/>
+          <a:chExt cx="0" cy="0"/>
+        </a:xfrm>
+      </p:grpSpPr>
+      <p:sp>
+        <p:nvSpPr>
+          <p:cNvPr id="2" name="Segnaposto immagine diapositiva 1"/>
+          <p:cNvSpPr>
+            <a:spLocks noGrp="1" noRot="1" noChangeAspect="1"/>
+          </p:cNvSpPr>
+          <p:nvPr>
+            <p:ph type="sldImg"/>
+          </p:nvPr>
+        </p:nvSpPr>
+        <p:spPr/>
+      </p:sp>
+      <p:sp>
+        <p:nvSpPr>
+          <p:cNvPr id="3" name="Segnaposto note 2"/>
+          <p:cNvSpPr>
+            <a:spLocks noGrp="1"/>
+          </p:cNvSpPr>
+          <p:nvPr>
+            <p:ph type="body" idx="1"/>
+          </p:nvPr>
+        </p:nvSpPr>
+        <p:spPr/>
+        <p:txBody>
+          <a:bodyPr/>
+          <a:lstStyle/>
+          <a:p>
+            <a:endParaRPr lang="it-IT"/>
+          </a:p>
+        </p:txBody>
+      </p:sp>
+      <p:sp>
+        <p:nvSpPr>
+          <p:cNvPr id="4" name="Segnaposto numero diapositiva 3"/>
+          <p:cNvSpPr>
+            <a:spLocks noGrp="1"/>
+          </p:cNvSpPr>
+          <p:nvPr>
+            <p:ph type="sldNum" sz="quarter" idx="10"/>
+          </p:nvPr>
+        </p:nvSpPr>
+        <p:spPr/>
+        <p:txBody>
+          <a:bodyPr/>
+          <a:lstStyle/>
+          <a:p>
+            <a:fld id="{C519897D-FFB3-4111-B327-449DADBE2990}" type="slidenum">
+              <a:rPr lang="en-US" smtClean="0"/>
+              <a:t>18</a:t>
+            </a:fld>
+            <a:endParaRPr lang="en-US"/>
+          </a:p>
+        </p:txBody>
+      </p:sp>
+    </p:spTree>
+    <p:extLst>
+      <p:ext uri="{BB962C8B-B14F-4D97-AF65-F5344CB8AC3E}">
+        <p14:creationId xmlns:p14="http://schemas.microsoft.com/office/powerpoint/2010/main" val="2593431247"/>
+      </p:ext>
+    </p:extLst>
+  </p:cSld>
+  <p:clrMapOvr>
+    <a:masterClrMapping/>
+  </p:clrMapOvr>
+</p:notes>
+</file>
+
+<file path=ppt/notesSlides/notesSlide19.xml><?xml version="1.0" encoding="utf-8"?>
+<p:notes xmlns:a="http://schemas.openxmlformats.org/drawingml/2006/main" xmlns:r="http://schemas.openxmlformats.org/officeDocument/2006/relationships" xmlns:p="http://schemas.openxmlformats.org/presentationml/2006/main">
+  <p:cSld>
+    <p:spTree>
+      <p:nvGrpSpPr>
+        <p:cNvPr id="1" name=""/>
+        <p:cNvGrpSpPr/>
+        <p:nvPr/>
+      </p:nvGrpSpPr>
+      <p:grpSpPr>
+        <a:xfrm>
+          <a:off x="0" y="0"/>
+          <a:ext cx="0" cy="0"/>
+          <a:chOff x="0" y="0"/>
+          <a:chExt cx="0" cy="0"/>
+        </a:xfrm>
+      </p:grpSpPr>
+      <p:sp>
+        <p:nvSpPr>
+          <p:cNvPr id="2" name="Segnaposto immagine diapositiva 1"/>
+          <p:cNvSpPr>
+            <a:spLocks noGrp="1" noRot="1" noChangeAspect="1"/>
+          </p:cNvSpPr>
+          <p:nvPr>
+            <p:ph type="sldImg"/>
+          </p:nvPr>
+        </p:nvSpPr>
+        <p:spPr/>
+      </p:sp>
+      <p:sp>
+        <p:nvSpPr>
+          <p:cNvPr id="3" name="Segnaposto note 2"/>
+          <p:cNvSpPr>
+            <a:spLocks noGrp="1"/>
+          </p:cNvSpPr>
+          <p:nvPr>
+            <p:ph type="body" idx="1"/>
+          </p:nvPr>
+        </p:nvSpPr>
+        <p:spPr/>
+        <p:txBody>
+          <a:bodyPr/>
+          <a:lstStyle/>
+          <a:p>
+            <a:endParaRPr lang="it-IT"/>
+          </a:p>
+        </p:txBody>
+      </p:sp>
+      <p:sp>
+        <p:nvSpPr>
+          <p:cNvPr id="4" name="Segnaposto numero diapositiva 3"/>
+          <p:cNvSpPr>
+            <a:spLocks noGrp="1"/>
+          </p:cNvSpPr>
+          <p:nvPr>
+            <p:ph type="sldNum" sz="quarter" idx="10"/>
+          </p:nvPr>
+        </p:nvSpPr>
+        <p:spPr/>
+        <p:txBody>
+          <a:bodyPr/>
+          <a:lstStyle/>
+          <a:p>
+            <a:fld id="{C519897D-FFB3-4111-B327-449DADBE2990}" type="slidenum">
+              <a:rPr lang="en-US" smtClean="0"/>
+              <a:t>19</a:t>
+            </a:fld>
+            <a:endParaRPr lang="en-US"/>
+          </a:p>
+        </p:txBody>
+      </p:sp>
+    </p:spTree>
+    <p:extLst>
+      <p:ext uri="{BB962C8B-B14F-4D97-AF65-F5344CB8AC3E}">
+        <p14:creationId xmlns:p14="http://schemas.microsoft.com/office/powerpoint/2010/main" val="3851825447"/>
+      </p:ext>
+    </p:extLst>
+  </p:cSld>
+  <p:clrMapOvr>
+    <a:masterClrMapping/>
+  </p:clrMapOvr>
+</p:notes>
+</file>
+
 <file path=ppt/notesSlides/notesSlide2.xml><?xml version="1.0" encoding="utf-8"?>
 <p:notes xmlns:a="http://schemas.openxmlformats.org/drawingml/2006/main" xmlns:r="http://schemas.openxmlformats.org/officeDocument/2006/relationships" xmlns:p="http://schemas.openxmlformats.org/presentationml/2006/main">
   <p:cSld>
@@ -815,6 +1655,762 @@
           <a:p>
             <a:fld id="{C519897D-FFB3-4111-B327-449DADBE2990}" type="slidenum">
               <a:rPr lang="en-US" smtClean="0"/>
+              <a:t>2</a:t>
+            </a:fld>
+            <a:endParaRPr lang="en-US"/>
+          </a:p>
+        </p:txBody>
+      </p:sp>
+    </p:spTree>
+    <p:extLst>
+      <p:ext uri="{BB962C8B-B14F-4D97-AF65-F5344CB8AC3E}">
+        <p14:creationId xmlns:p14="http://schemas.microsoft.com/office/powerpoint/2010/main" val="3712180970"/>
+      </p:ext>
+    </p:extLst>
+  </p:cSld>
+  <p:clrMapOvr>
+    <a:masterClrMapping/>
+  </p:clrMapOvr>
+</p:notes>
+</file>
+
+<file path=ppt/notesSlides/notesSlide20.xml><?xml version="1.0" encoding="utf-8"?>
+<p:notes xmlns:a="http://schemas.openxmlformats.org/drawingml/2006/main" xmlns:r="http://schemas.openxmlformats.org/officeDocument/2006/relationships" xmlns:p="http://schemas.openxmlformats.org/presentationml/2006/main">
+  <p:cSld>
+    <p:spTree>
+      <p:nvGrpSpPr>
+        <p:cNvPr id="1" name=""/>
+        <p:cNvGrpSpPr/>
+        <p:nvPr/>
+      </p:nvGrpSpPr>
+      <p:grpSpPr>
+        <a:xfrm>
+          <a:off x="0" y="0"/>
+          <a:ext cx="0" cy="0"/>
+          <a:chOff x="0" y="0"/>
+          <a:chExt cx="0" cy="0"/>
+        </a:xfrm>
+      </p:grpSpPr>
+      <p:sp>
+        <p:nvSpPr>
+          <p:cNvPr id="2" name="Segnaposto immagine diapositiva 1"/>
+          <p:cNvSpPr>
+            <a:spLocks noGrp="1" noRot="1" noChangeAspect="1"/>
+          </p:cNvSpPr>
+          <p:nvPr>
+            <p:ph type="sldImg"/>
+          </p:nvPr>
+        </p:nvSpPr>
+        <p:spPr/>
+      </p:sp>
+      <p:sp>
+        <p:nvSpPr>
+          <p:cNvPr id="3" name="Segnaposto note 2"/>
+          <p:cNvSpPr>
+            <a:spLocks noGrp="1"/>
+          </p:cNvSpPr>
+          <p:nvPr>
+            <p:ph type="body" idx="1"/>
+          </p:nvPr>
+        </p:nvSpPr>
+        <p:spPr/>
+        <p:txBody>
+          <a:bodyPr/>
+          <a:lstStyle/>
+          <a:p>
+            <a:endParaRPr lang="it-IT"/>
+          </a:p>
+        </p:txBody>
+      </p:sp>
+      <p:sp>
+        <p:nvSpPr>
+          <p:cNvPr id="4" name="Segnaposto numero diapositiva 3"/>
+          <p:cNvSpPr>
+            <a:spLocks noGrp="1"/>
+          </p:cNvSpPr>
+          <p:nvPr>
+            <p:ph type="sldNum" sz="quarter" idx="10"/>
+          </p:nvPr>
+        </p:nvSpPr>
+        <p:spPr/>
+        <p:txBody>
+          <a:bodyPr/>
+          <a:lstStyle/>
+          <a:p>
+            <a:fld id="{C519897D-FFB3-4111-B327-449DADBE2990}" type="slidenum">
+              <a:rPr lang="en-US" smtClean="0"/>
+              <a:t>20</a:t>
+            </a:fld>
+            <a:endParaRPr lang="en-US"/>
+          </a:p>
+        </p:txBody>
+      </p:sp>
+    </p:spTree>
+    <p:extLst>
+      <p:ext uri="{BB962C8B-B14F-4D97-AF65-F5344CB8AC3E}">
+        <p14:creationId xmlns:p14="http://schemas.microsoft.com/office/powerpoint/2010/main" val="4139132856"/>
+      </p:ext>
+    </p:extLst>
+  </p:cSld>
+  <p:clrMapOvr>
+    <a:masterClrMapping/>
+  </p:clrMapOvr>
+</p:notes>
+</file>
+
+<file path=ppt/notesSlides/notesSlide21.xml><?xml version="1.0" encoding="utf-8"?>
+<p:notes xmlns:a="http://schemas.openxmlformats.org/drawingml/2006/main" xmlns:r="http://schemas.openxmlformats.org/officeDocument/2006/relationships" xmlns:p="http://schemas.openxmlformats.org/presentationml/2006/main">
+  <p:cSld>
+    <p:spTree>
+      <p:nvGrpSpPr>
+        <p:cNvPr id="1" name=""/>
+        <p:cNvGrpSpPr/>
+        <p:nvPr/>
+      </p:nvGrpSpPr>
+      <p:grpSpPr>
+        <a:xfrm>
+          <a:off x="0" y="0"/>
+          <a:ext cx="0" cy="0"/>
+          <a:chOff x="0" y="0"/>
+          <a:chExt cx="0" cy="0"/>
+        </a:xfrm>
+      </p:grpSpPr>
+      <p:sp>
+        <p:nvSpPr>
+          <p:cNvPr id="2" name="Segnaposto immagine diapositiva 1"/>
+          <p:cNvSpPr>
+            <a:spLocks noGrp="1" noRot="1" noChangeAspect="1"/>
+          </p:cNvSpPr>
+          <p:nvPr>
+            <p:ph type="sldImg"/>
+          </p:nvPr>
+        </p:nvSpPr>
+        <p:spPr/>
+      </p:sp>
+      <p:sp>
+        <p:nvSpPr>
+          <p:cNvPr id="3" name="Segnaposto note 2"/>
+          <p:cNvSpPr>
+            <a:spLocks noGrp="1"/>
+          </p:cNvSpPr>
+          <p:nvPr>
+            <p:ph type="body" idx="1"/>
+          </p:nvPr>
+        </p:nvSpPr>
+        <p:spPr/>
+        <p:txBody>
+          <a:bodyPr/>
+          <a:lstStyle/>
+          <a:p>
+            <a:endParaRPr lang="it-IT"/>
+          </a:p>
+        </p:txBody>
+      </p:sp>
+      <p:sp>
+        <p:nvSpPr>
+          <p:cNvPr id="4" name="Segnaposto numero diapositiva 3"/>
+          <p:cNvSpPr>
+            <a:spLocks noGrp="1"/>
+          </p:cNvSpPr>
+          <p:nvPr>
+            <p:ph type="sldNum" sz="quarter" idx="10"/>
+          </p:nvPr>
+        </p:nvSpPr>
+        <p:spPr/>
+        <p:txBody>
+          <a:bodyPr/>
+          <a:lstStyle/>
+          <a:p>
+            <a:fld id="{C519897D-FFB3-4111-B327-449DADBE2990}" type="slidenum">
+              <a:rPr lang="en-US" smtClean="0"/>
+              <a:t>21</a:t>
+            </a:fld>
+            <a:endParaRPr lang="en-US"/>
+          </a:p>
+        </p:txBody>
+      </p:sp>
+    </p:spTree>
+    <p:extLst>
+      <p:ext uri="{BB962C8B-B14F-4D97-AF65-F5344CB8AC3E}">
+        <p14:creationId xmlns:p14="http://schemas.microsoft.com/office/powerpoint/2010/main" val="2975374041"/>
+      </p:ext>
+    </p:extLst>
+  </p:cSld>
+  <p:clrMapOvr>
+    <a:masterClrMapping/>
+  </p:clrMapOvr>
+</p:notes>
+</file>
+
+<file path=ppt/notesSlides/notesSlide22.xml><?xml version="1.0" encoding="utf-8"?>
+<p:notes xmlns:a="http://schemas.openxmlformats.org/drawingml/2006/main" xmlns:r="http://schemas.openxmlformats.org/officeDocument/2006/relationships" xmlns:p="http://schemas.openxmlformats.org/presentationml/2006/main">
+  <p:cSld>
+    <p:spTree>
+      <p:nvGrpSpPr>
+        <p:cNvPr id="1" name=""/>
+        <p:cNvGrpSpPr/>
+        <p:nvPr/>
+      </p:nvGrpSpPr>
+      <p:grpSpPr>
+        <a:xfrm>
+          <a:off x="0" y="0"/>
+          <a:ext cx="0" cy="0"/>
+          <a:chOff x="0" y="0"/>
+          <a:chExt cx="0" cy="0"/>
+        </a:xfrm>
+      </p:grpSpPr>
+      <p:sp>
+        <p:nvSpPr>
+          <p:cNvPr id="2" name="Segnaposto immagine diapositiva 1"/>
+          <p:cNvSpPr>
+            <a:spLocks noGrp="1" noRot="1" noChangeAspect="1"/>
+          </p:cNvSpPr>
+          <p:nvPr>
+            <p:ph type="sldImg"/>
+          </p:nvPr>
+        </p:nvSpPr>
+        <p:spPr/>
+      </p:sp>
+      <p:sp>
+        <p:nvSpPr>
+          <p:cNvPr id="3" name="Segnaposto note 2"/>
+          <p:cNvSpPr>
+            <a:spLocks noGrp="1"/>
+          </p:cNvSpPr>
+          <p:nvPr>
+            <p:ph type="body" idx="1"/>
+          </p:nvPr>
+        </p:nvSpPr>
+        <p:spPr/>
+        <p:txBody>
+          <a:bodyPr/>
+          <a:lstStyle/>
+          <a:p>
+            <a:endParaRPr lang="it-IT"/>
+          </a:p>
+        </p:txBody>
+      </p:sp>
+      <p:sp>
+        <p:nvSpPr>
+          <p:cNvPr id="4" name="Segnaposto numero diapositiva 3"/>
+          <p:cNvSpPr>
+            <a:spLocks noGrp="1"/>
+          </p:cNvSpPr>
+          <p:nvPr>
+            <p:ph type="sldNum" sz="quarter" idx="10"/>
+          </p:nvPr>
+        </p:nvSpPr>
+        <p:spPr/>
+        <p:txBody>
+          <a:bodyPr/>
+          <a:lstStyle/>
+          <a:p>
+            <a:fld id="{C519897D-FFB3-4111-B327-449DADBE2990}" type="slidenum">
+              <a:rPr lang="en-US" smtClean="0"/>
+              <a:t>22</a:t>
+            </a:fld>
+            <a:endParaRPr lang="en-US"/>
+          </a:p>
+        </p:txBody>
+      </p:sp>
+    </p:spTree>
+    <p:extLst>
+      <p:ext uri="{BB962C8B-B14F-4D97-AF65-F5344CB8AC3E}">
+        <p14:creationId xmlns:p14="http://schemas.microsoft.com/office/powerpoint/2010/main" val="1848583555"/>
+      </p:ext>
+    </p:extLst>
+  </p:cSld>
+  <p:clrMapOvr>
+    <a:masterClrMapping/>
+  </p:clrMapOvr>
+</p:notes>
+</file>
+
+<file path=ppt/notesSlides/notesSlide23.xml><?xml version="1.0" encoding="utf-8"?>
+<p:notes xmlns:a="http://schemas.openxmlformats.org/drawingml/2006/main" xmlns:r="http://schemas.openxmlformats.org/officeDocument/2006/relationships" xmlns:p="http://schemas.openxmlformats.org/presentationml/2006/main">
+  <p:cSld>
+    <p:spTree>
+      <p:nvGrpSpPr>
+        <p:cNvPr id="1" name=""/>
+        <p:cNvGrpSpPr/>
+        <p:nvPr/>
+      </p:nvGrpSpPr>
+      <p:grpSpPr>
+        <a:xfrm>
+          <a:off x="0" y="0"/>
+          <a:ext cx="0" cy="0"/>
+          <a:chOff x="0" y="0"/>
+          <a:chExt cx="0" cy="0"/>
+        </a:xfrm>
+      </p:grpSpPr>
+      <p:sp>
+        <p:nvSpPr>
+          <p:cNvPr id="2" name="Segnaposto immagine diapositiva 1"/>
+          <p:cNvSpPr>
+            <a:spLocks noGrp="1" noRot="1" noChangeAspect="1"/>
+          </p:cNvSpPr>
+          <p:nvPr>
+            <p:ph type="sldImg"/>
+          </p:nvPr>
+        </p:nvSpPr>
+        <p:spPr/>
+      </p:sp>
+      <p:sp>
+        <p:nvSpPr>
+          <p:cNvPr id="3" name="Segnaposto note 2"/>
+          <p:cNvSpPr>
+            <a:spLocks noGrp="1"/>
+          </p:cNvSpPr>
+          <p:nvPr>
+            <p:ph type="body" idx="1"/>
+          </p:nvPr>
+        </p:nvSpPr>
+        <p:spPr/>
+        <p:txBody>
+          <a:bodyPr/>
+          <a:lstStyle/>
+          <a:p>
+            <a:endParaRPr lang="it-IT"/>
+          </a:p>
+        </p:txBody>
+      </p:sp>
+      <p:sp>
+        <p:nvSpPr>
+          <p:cNvPr id="4" name="Segnaposto numero diapositiva 3"/>
+          <p:cNvSpPr>
+            <a:spLocks noGrp="1"/>
+          </p:cNvSpPr>
+          <p:nvPr>
+            <p:ph type="sldNum" sz="quarter" idx="10"/>
+          </p:nvPr>
+        </p:nvSpPr>
+        <p:spPr/>
+        <p:txBody>
+          <a:bodyPr/>
+          <a:lstStyle/>
+          <a:p>
+            <a:fld id="{C519897D-FFB3-4111-B327-449DADBE2990}" type="slidenum">
+              <a:rPr lang="en-US" smtClean="0"/>
+              <a:t>23</a:t>
+            </a:fld>
+            <a:endParaRPr lang="en-US"/>
+          </a:p>
+        </p:txBody>
+      </p:sp>
+    </p:spTree>
+    <p:extLst>
+      <p:ext uri="{BB962C8B-B14F-4D97-AF65-F5344CB8AC3E}">
+        <p14:creationId xmlns:p14="http://schemas.microsoft.com/office/powerpoint/2010/main" val="53919114"/>
+      </p:ext>
+    </p:extLst>
+  </p:cSld>
+  <p:clrMapOvr>
+    <a:masterClrMapping/>
+  </p:clrMapOvr>
+</p:notes>
+</file>
+
+<file path=ppt/notesSlides/notesSlide24.xml><?xml version="1.0" encoding="utf-8"?>
+<p:notes xmlns:a="http://schemas.openxmlformats.org/drawingml/2006/main" xmlns:r="http://schemas.openxmlformats.org/officeDocument/2006/relationships" xmlns:p="http://schemas.openxmlformats.org/presentationml/2006/main">
+  <p:cSld>
+    <p:spTree>
+      <p:nvGrpSpPr>
+        <p:cNvPr id="1" name=""/>
+        <p:cNvGrpSpPr/>
+        <p:nvPr/>
+      </p:nvGrpSpPr>
+      <p:grpSpPr>
+        <a:xfrm>
+          <a:off x="0" y="0"/>
+          <a:ext cx="0" cy="0"/>
+          <a:chOff x="0" y="0"/>
+          <a:chExt cx="0" cy="0"/>
+        </a:xfrm>
+      </p:grpSpPr>
+      <p:sp>
+        <p:nvSpPr>
+          <p:cNvPr id="2" name="Segnaposto immagine diapositiva 1"/>
+          <p:cNvSpPr>
+            <a:spLocks noGrp="1" noRot="1" noChangeAspect="1"/>
+          </p:cNvSpPr>
+          <p:nvPr>
+            <p:ph type="sldImg"/>
+          </p:nvPr>
+        </p:nvSpPr>
+        <p:spPr/>
+      </p:sp>
+      <p:sp>
+        <p:nvSpPr>
+          <p:cNvPr id="3" name="Segnaposto note 2"/>
+          <p:cNvSpPr>
+            <a:spLocks noGrp="1"/>
+          </p:cNvSpPr>
+          <p:nvPr>
+            <p:ph type="body" idx="1"/>
+          </p:nvPr>
+        </p:nvSpPr>
+        <p:spPr/>
+        <p:txBody>
+          <a:bodyPr/>
+          <a:lstStyle/>
+          <a:p>
+            <a:endParaRPr lang="it-IT"/>
+          </a:p>
+        </p:txBody>
+      </p:sp>
+      <p:sp>
+        <p:nvSpPr>
+          <p:cNvPr id="4" name="Segnaposto numero diapositiva 3"/>
+          <p:cNvSpPr>
+            <a:spLocks noGrp="1"/>
+          </p:cNvSpPr>
+          <p:nvPr>
+            <p:ph type="sldNum" sz="quarter" idx="10"/>
+          </p:nvPr>
+        </p:nvSpPr>
+        <p:spPr/>
+        <p:txBody>
+          <a:bodyPr/>
+          <a:lstStyle/>
+          <a:p>
+            <a:fld id="{C519897D-FFB3-4111-B327-449DADBE2990}" type="slidenum">
+              <a:rPr lang="en-US" smtClean="0"/>
+              <a:t>24</a:t>
+            </a:fld>
+            <a:endParaRPr lang="en-US"/>
+          </a:p>
+        </p:txBody>
+      </p:sp>
+    </p:spTree>
+    <p:extLst>
+      <p:ext uri="{BB962C8B-B14F-4D97-AF65-F5344CB8AC3E}">
+        <p14:creationId xmlns:p14="http://schemas.microsoft.com/office/powerpoint/2010/main" val="1890942289"/>
+      </p:ext>
+    </p:extLst>
+  </p:cSld>
+  <p:clrMapOvr>
+    <a:masterClrMapping/>
+  </p:clrMapOvr>
+</p:notes>
+</file>
+
+<file path=ppt/notesSlides/notesSlide25.xml><?xml version="1.0" encoding="utf-8"?>
+<p:notes xmlns:a="http://schemas.openxmlformats.org/drawingml/2006/main" xmlns:r="http://schemas.openxmlformats.org/officeDocument/2006/relationships" xmlns:p="http://schemas.openxmlformats.org/presentationml/2006/main">
+  <p:cSld>
+    <p:spTree>
+      <p:nvGrpSpPr>
+        <p:cNvPr id="1" name=""/>
+        <p:cNvGrpSpPr/>
+        <p:nvPr/>
+      </p:nvGrpSpPr>
+      <p:grpSpPr>
+        <a:xfrm>
+          <a:off x="0" y="0"/>
+          <a:ext cx="0" cy="0"/>
+          <a:chOff x="0" y="0"/>
+          <a:chExt cx="0" cy="0"/>
+        </a:xfrm>
+      </p:grpSpPr>
+      <p:sp>
+        <p:nvSpPr>
+          <p:cNvPr id="2" name="Segnaposto immagine diapositiva 1"/>
+          <p:cNvSpPr>
+            <a:spLocks noGrp="1" noRot="1" noChangeAspect="1"/>
+          </p:cNvSpPr>
+          <p:nvPr>
+            <p:ph type="sldImg"/>
+          </p:nvPr>
+        </p:nvSpPr>
+        <p:spPr/>
+      </p:sp>
+      <p:sp>
+        <p:nvSpPr>
+          <p:cNvPr id="3" name="Segnaposto note 2"/>
+          <p:cNvSpPr>
+            <a:spLocks noGrp="1"/>
+          </p:cNvSpPr>
+          <p:nvPr>
+            <p:ph type="body" idx="1"/>
+          </p:nvPr>
+        </p:nvSpPr>
+        <p:spPr/>
+        <p:txBody>
+          <a:bodyPr/>
+          <a:lstStyle/>
+          <a:p>
+            <a:endParaRPr lang="it-IT"/>
+          </a:p>
+        </p:txBody>
+      </p:sp>
+      <p:sp>
+        <p:nvSpPr>
+          <p:cNvPr id="4" name="Segnaposto numero diapositiva 3"/>
+          <p:cNvSpPr>
+            <a:spLocks noGrp="1"/>
+          </p:cNvSpPr>
+          <p:nvPr>
+            <p:ph type="sldNum" sz="quarter" idx="10"/>
+          </p:nvPr>
+        </p:nvSpPr>
+        <p:spPr/>
+        <p:txBody>
+          <a:bodyPr/>
+          <a:lstStyle/>
+          <a:p>
+            <a:fld id="{C519897D-FFB3-4111-B327-449DADBE2990}" type="slidenum">
+              <a:rPr lang="en-US" smtClean="0"/>
+              <a:t>25</a:t>
+            </a:fld>
+            <a:endParaRPr lang="en-US"/>
+          </a:p>
+        </p:txBody>
+      </p:sp>
+    </p:spTree>
+    <p:extLst>
+      <p:ext uri="{BB962C8B-B14F-4D97-AF65-F5344CB8AC3E}">
+        <p14:creationId xmlns:p14="http://schemas.microsoft.com/office/powerpoint/2010/main" val="3645494453"/>
+      </p:ext>
+    </p:extLst>
+  </p:cSld>
+  <p:clrMapOvr>
+    <a:masterClrMapping/>
+  </p:clrMapOvr>
+</p:notes>
+</file>
+
+<file path=ppt/notesSlides/notesSlide26.xml><?xml version="1.0" encoding="utf-8"?>
+<p:notes xmlns:a="http://schemas.openxmlformats.org/drawingml/2006/main" xmlns:r="http://schemas.openxmlformats.org/officeDocument/2006/relationships" xmlns:p="http://schemas.openxmlformats.org/presentationml/2006/main">
+  <p:cSld>
+    <p:spTree>
+      <p:nvGrpSpPr>
+        <p:cNvPr id="1" name=""/>
+        <p:cNvGrpSpPr/>
+        <p:nvPr/>
+      </p:nvGrpSpPr>
+      <p:grpSpPr>
+        <a:xfrm>
+          <a:off x="0" y="0"/>
+          <a:ext cx="0" cy="0"/>
+          <a:chOff x="0" y="0"/>
+          <a:chExt cx="0" cy="0"/>
+        </a:xfrm>
+      </p:grpSpPr>
+      <p:sp>
+        <p:nvSpPr>
+          <p:cNvPr id="2" name="Segnaposto immagine diapositiva 1"/>
+          <p:cNvSpPr>
+            <a:spLocks noGrp="1" noRot="1" noChangeAspect="1"/>
+          </p:cNvSpPr>
+          <p:nvPr>
+            <p:ph type="sldImg"/>
+          </p:nvPr>
+        </p:nvSpPr>
+        <p:spPr/>
+      </p:sp>
+      <p:sp>
+        <p:nvSpPr>
+          <p:cNvPr id="3" name="Segnaposto note 2"/>
+          <p:cNvSpPr>
+            <a:spLocks noGrp="1"/>
+          </p:cNvSpPr>
+          <p:nvPr>
+            <p:ph type="body" idx="1"/>
+          </p:nvPr>
+        </p:nvSpPr>
+        <p:spPr/>
+        <p:txBody>
+          <a:bodyPr/>
+          <a:lstStyle/>
+          <a:p>
+            <a:endParaRPr lang="it-IT"/>
+          </a:p>
+        </p:txBody>
+      </p:sp>
+      <p:sp>
+        <p:nvSpPr>
+          <p:cNvPr id="4" name="Segnaposto numero diapositiva 3"/>
+          <p:cNvSpPr>
+            <a:spLocks noGrp="1"/>
+          </p:cNvSpPr>
+          <p:nvPr>
+            <p:ph type="sldNum" sz="quarter" idx="10"/>
+          </p:nvPr>
+        </p:nvSpPr>
+        <p:spPr/>
+        <p:txBody>
+          <a:bodyPr/>
+          <a:lstStyle/>
+          <a:p>
+            <a:fld id="{C519897D-FFB3-4111-B327-449DADBE2990}" type="slidenum">
+              <a:rPr lang="en-US" smtClean="0"/>
+              <a:t>26</a:t>
+            </a:fld>
+            <a:endParaRPr lang="en-US"/>
+          </a:p>
+        </p:txBody>
+      </p:sp>
+    </p:spTree>
+    <p:extLst>
+      <p:ext uri="{BB962C8B-B14F-4D97-AF65-F5344CB8AC3E}">
+        <p14:creationId xmlns:p14="http://schemas.microsoft.com/office/powerpoint/2010/main" val="2147294054"/>
+      </p:ext>
+    </p:extLst>
+  </p:cSld>
+  <p:clrMapOvr>
+    <a:masterClrMapping/>
+  </p:clrMapOvr>
+</p:notes>
+</file>
+
+<file path=ppt/notesSlides/notesSlide27.xml><?xml version="1.0" encoding="utf-8"?>
+<p:notes xmlns:a="http://schemas.openxmlformats.org/drawingml/2006/main" xmlns:r="http://schemas.openxmlformats.org/officeDocument/2006/relationships" xmlns:p="http://schemas.openxmlformats.org/presentationml/2006/main">
+  <p:cSld>
+    <p:spTree>
+      <p:nvGrpSpPr>
+        <p:cNvPr id="1" name=""/>
+        <p:cNvGrpSpPr/>
+        <p:nvPr/>
+      </p:nvGrpSpPr>
+      <p:grpSpPr>
+        <a:xfrm>
+          <a:off x="0" y="0"/>
+          <a:ext cx="0" cy="0"/>
+          <a:chOff x="0" y="0"/>
+          <a:chExt cx="0" cy="0"/>
+        </a:xfrm>
+      </p:grpSpPr>
+      <p:sp>
+        <p:nvSpPr>
+          <p:cNvPr id="2" name="Segnaposto immagine diapositiva 1"/>
+          <p:cNvSpPr>
+            <a:spLocks noGrp="1" noRot="1" noChangeAspect="1"/>
+          </p:cNvSpPr>
+          <p:nvPr>
+            <p:ph type="sldImg"/>
+          </p:nvPr>
+        </p:nvSpPr>
+        <p:spPr/>
+      </p:sp>
+      <p:sp>
+        <p:nvSpPr>
+          <p:cNvPr id="3" name="Segnaposto note 2"/>
+          <p:cNvSpPr>
+            <a:spLocks noGrp="1"/>
+          </p:cNvSpPr>
+          <p:nvPr>
+            <p:ph type="body" idx="1"/>
+          </p:nvPr>
+        </p:nvSpPr>
+        <p:spPr/>
+        <p:txBody>
+          <a:bodyPr/>
+          <a:lstStyle/>
+          <a:p>
+            <a:endParaRPr lang="it-IT"/>
+          </a:p>
+        </p:txBody>
+      </p:sp>
+      <p:sp>
+        <p:nvSpPr>
+          <p:cNvPr id="4" name="Segnaposto numero diapositiva 3"/>
+          <p:cNvSpPr>
+            <a:spLocks noGrp="1"/>
+          </p:cNvSpPr>
+          <p:nvPr>
+            <p:ph type="sldNum" sz="quarter" idx="10"/>
+          </p:nvPr>
+        </p:nvSpPr>
+        <p:spPr/>
+        <p:txBody>
+          <a:bodyPr/>
+          <a:lstStyle/>
+          <a:p>
+            <a:fld id="{C519897D-FFB3-4111-B327-449DADBE2990}" type="slidenum">
+              <a:rPr lang="en-US" smtClean="0"/>
+              <a:t>27</a:t>
+            </a:fld>
+            <a:endParaRPr lang="en-US"/>
+          </a:p>
+        </p:txBody>
+      </p:sp>
+    </p:spTree>
+    <p:extLst>
+      <p:ext uri="{BB962C8B-B14F-4D97-AF65-F5344CB8AC3E}">
+        <p14:creationId xmlns:p14="http://schemas.microsoft.com/office/powerpoint/2010/main" val="1343077763"/>
+      </p:ext>
+    </p:extLst>
+  </p:cSld>
+  <p:clrMapOvr>
+    <a:masterClrMapping/>
+  </p:clrMapOvr>
+</p:notes>
+</file>
+
+<file path=ppt/notesSlides/notesSlide28.xml><?xml version="1.0" encoding="utf-8"?>
+<p:notes xmlns:a="http://schemas.openxmlformats.org/drawingml/2006/main" xmlns:r="http://schemas.openxmlformats.org/officeDocument/2006/relationships" xmlns:p="http://schemas.openxmlformats.org/presentationml/2006/main">
+  <p:cSld>
+    <p:spTree>
+      <p:nvGrpSpPr>
+        <p:cNvPr id="1" name=""/>
+        <p:cNvGrpSpPr/>
+        <p:nvPr/>
+      </p:nvGrpSpPr>
+      <p:grpSpPr>
+        <a:xfrm>
+          <a:off x="0" y="0"/>
+          <a:ext cx="0" cy="0"/>
+          <a:chOff x="0" y="0"/>
+          <a:chExt cx="0" cy="0"/>
+        </a:xfrm>
+      </p:grpSpPr>
+      <p:sp>
+        <p:nvSpPr>
+          <p:cNvPr id="2" name="Segnaposto immagine diapositiva 1"/>
+          <p:cNvSpPr>
+            <a:spLocks noGrp="1" noRot="1" noChangeAspect="1"/>
+          </p:cNvSpPr>
+          <p:nvPr>
+            <p:ph type="sldImg"/>
+          </p:nvPr>
+        </p:nvSpPr>
+        <p:spPr/>
+      </p:sp>
+      <p:sp>
+        <p:nvSpPr>
+          <p:cNvPr id="3" name="Segnaposto note 2"/>
+          <p:cNvSpPr>
+            <a:spLocks noGrp="1"/>
+          </p:cNvSpPr>
+          <p:nvPr>
+            <p:ph type="body" idx="1"/>
+          </p:nvPr>
+        </p:nvSpPr>
+        <p:spPr/>
+        <p:txBody>
+          <a:bodyPr/>
+          <a:lstStyle/>
+          <a:p>
+            <a:endParaRPr lang="it-IT"/>
+          </a:p>
+        </p:txBody>
+      </p:sp>
+      <p:sp>
+        <p:nvSpPr>
+          <p:cNvPr id="4" name="Segnaposto numero diapositiva 3"/>
+          <p:cNvSpPr>
+            <a:spLocks noGrp="1"/>
+          </p:cNvSpPr>
+          <p:nvPr>
+            <p:ph type="sldNum" sz="quarter" idx="10"/>
+          </p:nvPr>
+        </p:nvSpPr>
+        <p:spPr/>
+        <p:txBody>
+          <a:bodyPr/>
+          <a:lstStyle/>
+          <a:p>
+            <a:fld id="{C519897D-FFB3-4111-B327-449DADBE2990}" type="slidenum">
+              <a:rPr lang="en-US" smtClean="0"/>
               <a:t>28</a:t>
             </a:fld>
             <a:endParaRPr lang="en-US"/>
@@ -825,6 +2421,90 @@
     <p:extLst>
       <p:ext uri="{BB962C8B-B14F-4D97-AF65-F5344CB8AC3E}">
         <p14:creationId xmlns:p14="http://schemas.microsoft.com/office/powerpoint/2010/main" val="958452951"/>
+      </p:ext>
+    </p:extLst>
+  </p:cSld>
+  <p:clrMapOvr>
+    <a:masterClrMapping/>
+  </p:clrMapOvr>
+</p:notes>
+</file>
+
+<file path=ppt/notesSlides/notesSlide29.xml><?xml version="1.0" encoding="utf-8"?>
+<p:notes xmlns:a="http://schemas.openxmlformats.org/drawingml/2006/main" xmlns:r="http://schemas.openxmlformats.org/officeDocument/2006/relationships" xmlns:p="http://schemas.openxmlformats.org/presentationml/2006/main">
+  <p:cSld>
+    <p:spTree>
+      <p:nvGrpSpPr>
+        <p:cNvPr id="1" name=""/>
+        <p:cNvGrpSpPr/>
+        <p:nvPr/>
+      </p:nvGrpSpPr>
+      <p:grpSpPr>
+        <a:xfrm>
+          <a:off x="0" y="0"/>
+          <a:ext cx="0" cy="0"/>
+          <a:chOff x="0" y="0"/>
+          <a:chExt cx="0" cy="0"/>
+        </a:xfrm>
+      </p:grpSpPr>
+      <p:sp>
+        <p:nvSpPr>
+          <p:cNvPr id="2" name="Segnaposto immagine diapositiva 1"/>
+          <p:cNvSpPr>
+            <a:spLocks noGrp="1" noRot="1" noChangeAspect="1"/>
+          </p:cNvSpPr>
+          <p:nvPr>
+            <p:ph type="sldImg"/>
+          </p:nvPr>
+        </p:nvSpPr>
+        <p:spPr/>
+      </p:sp>
+      <p:sp>
+        <p:nvSpPr>
+          <p:cNvPr id="3" name="Segnaposto note 2"/>
+          <p:cNvSpPr>
+            <a:spLocks noGrp="1"/>
+          </p:cNvSpPr>
+          <p:nvPr>
+            <p:ph type="body" idx="1"/>
+          </p:nvPr>
+        </p:nvSpPr>
+        <p:spPr/>
+        <p:txBody>
+          <a:bodyPr/>
+          <a:lstStyle/>
+          <a:p>
+            <a:endParaRPr lang="it-IT" dirty="0"/>
+          </a:p>
+        </p:txBody>
+      </p:sp>
+      <p:sp>
+        <p:nvSpPr>
+          <p:cNvPr id="4" name="Segnaposto numero diapositiva 3"/>
+          <p:cNvSpPr>
+            <a:spLocks noGrp="1"/>
+          </p:cNvSpPr>
+          <p:nvPr>
+            <p:ph type="sldNum" sz="quarter" idx="10"/>
+          </p:nvPr>
+        </p:nvSpPr>
+        <p:spPr/>
+        <p:txBody>
+          <a:bodyPr/>
+          <a:lstStyle/>
+          <a:p>
+            <a:fld id="{C519897D-FFB3-4111-B327-449DADBE2990}" type="slidenum">
+              <a:rPr lang="en-US" smtClean="0"/>
+              <a:t>29</a:t>
+            </a:fld>
+            <a:endParaRPr lang="en-US"/>
+          </a:p>
+        </p:txBody>
+      </p:sp>
+    </p:spTree>
+    <p:extLst>
+      <p:ext uri="{BB962C8B-B14F-4D97-AF65-F5344CB8AC3E}">
+        <p14:creationId xmlns:p14="http://schemas.microsoft.com/office/powerpoint/2010/main" val="3813177152"/>
       </p:ext>
     </p:extLst>
   </p:cSld>
@@ -878,7 +2558,7 @@
           <a:bodyPr/>
           <a:lstStyle/>
           <a:p>
-            <a:endParaRPr lang="it-IT" dirty="0"/>
+            <a:endParaRPr lang="it-IT"/>
           </a:p>
         </p:txBody>
       </p:sp>
@@ -899,7 +2579,7 @@
           <a:p>
             <a:fld id="{C519897D-FFB3-4111-B327-449DADBE2990}" type="slidenum">
               <a:rPr lang="en-US" smtClean="0"/>
-              <a:t>29</a:t>
+              <a:t>3</a:t>
             </a:fld>
             <a:endParaRPr lang="en-US"/>
           </a:p>
@@ -908,7 +2588,91 @@
     </p:spTree>
     <p:extLst>
       <p:ext uri="{BB962C8B-B14F-4D97-AF65-F5344CB8AC3E}">
-        <p14:creationId xmlns:p14="http://schemas.microsoft.com/office/powerpoint/2010/main" val="3813177152"/>
+        <p14:creationId xmlns:p14="http://schemas.microsoft.com/office/powerpoint/2010/main" val="350504078"/>
+      </p:ext>
+    </p:extLst>
+  </p:cSld>
+  <p:clrMapOvr>
+    <a:masterClrMapping/>
+  </p:clrMapOvr>
+</p:notes>
+</file>
+
+<file path=ppt/notesSlides/notesSlide30.xml><?xml version="1.0" encoding="utf-8"?>
+<p:notes xmlns:a="http://schemas.openxmlformats.org/drawingml/2006/main" xmlns:r="http://schemas.openxmlformats.org/officeDocument/2006/relationships" xmlns:p="http://schemas.openxmlformats.org/presentationml/2006/main">
+  <p:cSld>
+    <p:spTree>
+      <p:nvGrpSpPr>
+        <p:cNvPr id="1" name=""/>
+        <p:cNvGrpSpPr/>
+        <p:nvPr/>
+      </p:nvGrpSpPr>
+      <p:grpSpPr>
+        <a:xfrm>
+          <a:off x="0" y="0"/>
+          <a:ext cx="0" cy="0"/>
+          <a:chOff x="0" y="0"/>
+          <a:chExt cx="0" cy="0"/>
+        </a:xfrm>
+      </p:grpSpPr>
+      <p:sp>
+        <p:nvSpPr>
+          <p:cNvPr id="2" name="Segnaposto immagine diapositiva 1"/>
+          <p:cNvSpPr>
+            <a:spLocks noGrp="1" noRot="1" noChangeAspect="1"/>
+          </p:cNvSpPr>
+          <p:nvPr>
+            <p:ph type="sldImg"/>
+          </p:nvPr>
+        </p:nvSpPr>
+        <p:spPr/>
+      </p:sp>
+      <p:sp>
+        <p:nvSpPr>
+          <p:cNvPr id="3" name="Segnaposto note 2"/>
+          <p:cNvSpPr>
+            <a:spLocks noGrp="1"/>
+          </p:cNvSpPr>
+          <p:nvPr>
+            <p:ph type="body" idx="1"/>
+          </p:nvPr>
+        </p:nvSpPr>
+        <p:spPr/>
+        <p:txBody>
+          <a:bodyPr/>
+          <a:lstStyle/>
+          <a:p>
+            <a:endParaRPr lang="it-IT"/>
+          </a:p>
+        </p:txBody>
+      </p:sp>
+      <p:sp>
+        <p:nvSpPr>
+          <p:cNvPr id="4" name="Segnaposto numero diapositiva 3"/>
+          <p:cNvSpPr>
+            <a:spLocks noGrp="1"/>
+          </p:cNvSpPr>
+          <p:nvPr>
+            <p:ph type="sldNum" sz="quarter" idx="10"/>
+          </p:nvPr>
+        </p:nvSpPr>
+        <p:spPr/>
+        <p:txBody>
+          <a:bodyPr/>
+          <a:lstStyle/>
+          <a:p>
+            <a:fld id="{C519897D-FFB3-4111-B327-449DADBE2990}" type="slidenum">
+              <a:rPr lang="en-US" smtClean="0"/>
+              <a:t>30</a:t>
+            </a:fld>
+            <a:endParaRPr lang="en-US"/>
+          </a:p>
+        </p:txBody>
+      </p:sp>
+    </p:spTree>
+    <p:extLst>
+      <p:ext uri="{BB962C8B-B14F-4D97-AF65-F5344CB8AC3E}">
+        <p14:creationId xmlns:p14="http://schemas.microsoft.com/office/powerpoint/2010/main" val="2814216342"/>
       </p:ext>
     </p:extLst>
   </p:cSld>
@@ -983,7 +2747,7 @@
           <a:p>
             <a:fld id="{C519897D-FFB3-4111-B327-449DADBE2990}" type="slidenum">
               <a:rPr lang="en-US" smtClean="0"/>
-              <a:t>30</a:t>
+              <a:t>4</a:t>
             </a:fld>
             <a:endParaRPr lang="en-US"/>
           </a:p>
@@ -992,7 +2756,427 @@
     </p:spTree>
     <p:extLst>
       <p:ext uri="{BB962C8B-B14F-4D97-AF65-F5344CB8AC3E}">
-        <p14:creationId xmlns:p14="http://schemas.microsoft.com/office/powerpoint/2010/main" val="2814216342"/>
+        <p14:creationId xmlns:p14="http://schemas.microsoft.com/office/powerpoint/2010/main" val="1081562217"/>
+      </p:ext>
+    </p:extLst>
+  </p:cSld>
+  <p:clrMapOvr>
+    <a:masterClrMapping/>
+  </p:clrMapOvr>
+</p:notes>
+</file>
+
+<file path=ppt/notesSlides/notesSlide5.xml><?xml version="1.0" encoding="utf-8"?>
+<p:notes xmlns:a="http://schemas.openxmlformats.org/drawingml/2006/main" xmlns:r="http://schemas.openxmlformats.org/officeDocument/2006/relationships" xmlns:p="http://schemas.openxmlformats.org/presentationml/2006/main">
+  <p:cSld>
+    <p:spTree>
+      <p:nvGrpSpPr>
+        <p:cNvPr id="1" name=""/>
+        <p:cNvGrpSpPr/>
+        <p:nvPr/>
+      </p:nvGrpSpPr>
+      <p:grpSpPr>
+        <a:xfrm>
+          <a:off x="0" y="0"/>
+          <a:ext cx="0" cy="0"/>
+          <a:chOff x="0" y="0"/>
+          <a:chExt cx="0" cy="0"/>
+        </a:xfrm>
+      </p:grpSpPr>
+      <p:sp>
+        <p:nvSpPr>
+          <p:cNvPr id="2" name="Segnaposto immagine diapositiva 1"/>
+          <p:cNvSpPr>
+            <a:spLocks noGrp="1" noRot="1" noChangeAspect="1"/>
+          </p:cNvSpPr>
+          <p:nvPr>
+            <p:ph type="sldImg"/>
+          </p:nvPr>
+        </p:nvSpPr>
+        <p:spPr/>
+      </p:sp>
+      <p:sp>
+        <p:nvSpPr>
+          <p:cNvPr id="3" name="Segnaposto note 2"/>
+          <p:cNvSpPr>
+            <a:spLocks noGrp="1"/>
+          </p:cNvSpPr>
+          <p:nvPr>
+            <p:ph type="body" idx="1"/>
+          </p:nvPr>
+        </p:nvSpPr>
+        <p:spPr/>
+        <p:txBody>
+          <a:bodyPr/>
+          <a:lstStyle/>
+          <a:p>
+            <a:endParaRPr lang="it-IT"/>
+          </a:p>
+        </p:txBody>
+      </p:sp>
+      <p:sp>
+        <p:nvSpPr>
+          <p:cNvPr id="4" name="Segnaposto numero diapositiva 3"/>
+          <p:cNvSpPr>
+            <a:spLocks noGrp="1"/>
+          </p:cNvSpPr>
+          <p:nvPr>
+            <p:ph type="sldNum" sz="quarter" idx="10"/>
+          </p:nvPr>
+        </p:nvSpPr>
+        <p:spPr/>
+        <p:txBody>
+          <a:bodyPr/>
+          <a:lstStyle/>
+          <a:p>
+            <a:fld id="{C519897D-FFB3-4111-B327-449DADBE2990}" type="slidenum">
+              <a:rPr lang="en-US" smtClean="0"/>
+              <a:t>5</a:t>
+            </a:fld>
+            <a:endParaRPr lang="en-US"/>
+          </a:p>
+        </p:txBody>
+      </p:sp>
+    </p:spTree>
+    <p:extLst>
+      <p:ext uri="{BB962C8B-B14F-4D97-AF65-F5344CB8AC3E}">
+        <p14:creationId xmlns:p14="http://schemas.microsoft.com/office/powerpoint/2010/main" val="1129327399"/>
+      </p:ext>
+    </p:extLst>
+  </p:cSld>
+  <p:clrMapOvr>
+    <a:masterClrMapping/>
+  </p:clrMapOvr>
+</p:notes>
+</file>
+
+<file path=ppt/notesSlides/notesSlide6.xml><?xml version="1.0" encoding="utf-8"?>
+<p:notes xmlns:a="http://schemas.openxmlformats.org/drawingml/2006/main" xmlns:r="http://schemas.openxmlformats.org/officeDocument/2006/relationships" xmlns:p="http://schemas.openxmlformats.org/presentationml/2006/main">
+  <p:cSld>
+    <p:spTree>
+      <p:nvGrpSpPr>
+        <p:cNvPr id="1" name=""/>
+        <p:cNvGrpSpPr/>
+        <p:nvPr/>
+      </p:nvGrpSpPr>
+      <p:grpSpPr>
+        <a:xfrm>
+          <a:off x="0" y="0"/>
+          <a:ext cx="0" cy="0"/>
+          <a:chOff x="0" y="0"/>
+          <a:chExt cx="0" cy="0"/>
+        </a:xfrm>
+      </p:grpSpPr>
+      <p:sp>
+        <p:nvSpPr>
+          <p:cNvPr id="2" name="Segnaposto immagine diapositiva 1"/>
+          <p:cNvSpPr>
+            <a:spLocks noGrp="1" noRot="1" noChangeAspect="1"/>
+          </p:cNvSpPr>
+          <p:nvPr>
+            <p:ph type="sldImg"/>
+          </p:nvPr>
+        </p:nvSpPr>
+        <p:spPr/>
+      </p:sp>
+      <p:sp>
+        <p:nvSpPr>
+          <p:cNvPr id="3" name="Segnaposto note 2"/>
+          <p:cNvSpPr>
+            <a:spLocks noGrp="1"/>
+          </p:cNvSpPr>
+          <p:nvPr>
+            <p:ph type="body" idx="1"/>
+          </p:nvPr>
+        </p:nvSpPr>
+        <p:spPr/>
+        <p:txBody>
+          <a:bodyPr/>
+          <a:lstStyle/>
+          <a:p>
+            <a:endParaRPr lang="it-IT"/>
+          </a:p>
+        </p:txBody>
+      </p:sp>
+      <p:sp>
+        <p:nvSpPr>
+          <p:cNvPr id="4" name="Segnaposto numero diapositiva 3"/>
+          <p:cNvSpPr>
+            <a:spLocks noGrp="1"/>
+          </p:cNvSpPr>
+          <p:nvPr>
+            <p:ph type="sldNum" sz="quarter" idx="10"/>
+          </p:nvPr>
+        </p:nvSpPr>
+        <p:spPr/>
+        <p:txBody>
+          <a:bodyPr/>
+          <a:lstStyle/>
+          <a:p>
+            <a:fld id="{C519897D-FFB3-4111-B327-449DADBE2990}" type="slidenum">
+              <a:rPr lang="en-US" smtClean="0"/>
+              <a:t>6</a:t>
+            </a:fld>
+            <a:endParaRPr lang="en-US"/>
+          </a:p>
+        </p:txBody>
+      </p:sp>
+    </p:spTree>
+    <p:extLst>
+      <p:ext uri="{BB962C8B-B14F-4D97-AF65-F5344CB8AC3E}">
+        <p14:creationId xmlns:p14="http://schemas.microsoft.com/office/powerpoint/2010/main" val="3763042165"/>
+      </p:ext>
+    </p:extLst>
+  </p:cSld>
+  <p:clrMapOvr>
+    <a:masterClrMapping/>
+  </p:clrMapOvr>
+</p:notes>
+</file>
+
+<file path=ppt/notesSlides/notesSlide7.xml><?xml version="1.0" encoding="utf-8"?>
+<p:notes xmlns:a="http://schemas.openxmlformats.org/drawingml/2006/main" xmlns:r="http://schemas.openxmlformats.org/officeDocument/2006/relationships" xmlns:p="http://schemas.openxmlformats.org/presentationml/2006/main">
+  <p:cSld>
+    <p:spTree>
+      <p:nvGrpSpPr>
+        <p:cNvPr id="1" name=""/>
+        <p:cNvGrpSpPr/>
+        <p:nvPr/>
+      </p:nvGrpSpPr>
+      <p:grpSpPr>
+        <a:xfrm>
+          <a:off x="0" y="0"/>
+          <a:ext cx="0" cy="0"/>
+          <a:chOff x="0" y="0"/>
+          <a:chExt cx="0" cy="0"/>
+        </a:xfrm>
+      </p:grpSpPr>
+      <p:sp>
+        <p:nvSpPr>
+          <p:cNvPr id="2" name="Segnaposto immagine diapositiva 1"/>
+          <p:cNvSpPr>
+            <a:spLocks noGrp="1" noRot="1" noChangeAspect="1"/>
+          </p:cNvSpPr>
+          <p:nvPr>
+            <p:ph type="sldImg"/>
+          </p:nvPr>
+        </p:nvSpPr>
+        <p:spPr/>
+      </p:sp>
+      <p:sp>
+        <p:nvSpPr>
+          <p:cNvPr id="3" name="Segnaposto note 2"/>
+          <p:cNvSpPr>
+            <a:spLocks noGrp="1"/>
+          </p:cNvSpPr>
+          <p:nvPr>
+            <p:ph type="body" idx="1"/>
+          </p:nvPr>
+        </p:nvSpPr>
+        <p:spPr/>
+        <p:txBody>
+          <a:bodyPr/>
+          <a:lstStyle/>
+          <a:p>
+            <a:endParaRPr lang="it-IT"/>
+          </a:p>
+        </p:txBody>
+      </p:sp>
+      <p:sp>
+        <p:nvSpPr>
+          <p:cNvPr id="4" name="Segnaposto numero diapositiva 3"/>
+          <p:cNvSpPr>
+            <a:spLocks noGrp="1"/>
+          </p:cNvSpPr>
+          <p:nvPr>
+            <p:ph type="sldNum" sz="quarter" idx="10"/>
+          </p:nvPr>
+        </p:nvSpPr>
+        <p:spPr/>
+        <p:txBody>
+          <a:bodyPr/>
+          <a:lstStyle/>
+          <a:p>
+            <a:fld id="{C519897D-FFB3-4111-B327-449DADBE2990}" type="slidenum">
+              <a:rPr lang="en-US" smtClean="0"/>
+              <a:t>7</a:t>
+            </a:fld>
+            <a:endParaRPr lang="en-US"/>
+          </a:p>
+        </p:txBody>
+      </p:sp>
+    </p:spTree>
+    <p:extLst>
+      <p:ext uri="{BB962C8B-B14F-4D97-AF65-F5344CB8AC3E}">
+        <p14:creationId xmlns:p14="http://schemas.microsoft.com/office/powerpoint/2010/main" val="2447075404"/>
+      </p:ext>
+    </p:extLst>
+  </p:cSld>
+  <p:clrMapOvr>
+    <a:masterClrMapping/>
+  </p:clrMapOvr>
+</p:notes>
+</file>
+
+<file path=ppt/notesSlides/notesSlide8.xml><?xml version="1.0" encoding="utf-8"?>
+<p:notes xmlns:a="http://schemas.openxmlformats.org/drawingml/2006/main" xmlns:r="http://schemas.openxmlformats.org/officeDocument/2006/relationships" xmlns:p="http://schemas.openxmlformats.org/presentationml/2006/main">
+  <p:cSld>
+    <p:spTree>
+      <p:nvGrpSpPr>
+        <p:cNvPr id="1" name=""/>
+        <p:cNvGrpSpPr/>
+        <p:nvPr/>
+      </p:nvGrpSpPr>
+      <p:grpSpPr>
+        <a:xfrm>
+          <a:off x="0" y="0"/>
+          <a:ext cx="0" cy="0"/>
+          <a:chOff x="0" y="0"/>
+          <a:chExt cx="0" cy="0"/>
+        </a:xfrm>
+      </p:grpSpPr>
+      <p:sp>
+        <p:nvSpPr>
+          <p:cNvPr id="2" name="Segnaposto immagine diapositiva 1"/>
+          <p:cNvSpPr>
+            <a:spLocks noGrp="1" noRot="1" noChangeAspect="1"/>
+          </p:cNvSpPr>
+          <p:nvPr>
+            <p:ph type="sldImg"/>
+          </p:nvPr>
+        </p:nvSpPr>
+        <p:spPr/>
+      </p:sp>
+      <p:sp>
+        <p:nvSpPr>
+          <p:cNvPr id="3" name="Segnaposto note 2"/>
+          <p:cNvSpPr>
+            <a:spLocks noGrp="1"/>
+          </p:cNvSpPr>
+          <p:nvPr>
+            <p:ph type="body" idx="1"/>
+          </p:nvPr>
+        </p:nvSpPr>
+        <p:spPr/>
+        <p:txBody>
+          <a:bodyPr/>
+          <a:lstStyle/>
+          <a:p>
+            <a:endParaRPr lang="it-IT"/>
+          </a:p>
+        </p:txBody>
+      </p:sp>
+      <p:sp>
+        <p:nvSpPr>
+          <p:cNvPr id="4" name="Segnaposto numero diapositiva 3"/>
+          <p:cNvSpPr>
+            <a:spLocks noGrp="1"/>
+          </p:cNvSpPr>
+          <p:nvPr>
+            <p:ph type="sldNum" sz="quarter" idx="10"/>
+          </p:nvPr>
+        </p:nvSpPr>
+        <p:spPr/>
+        <p:txBody>
+          <a:bodyPr/>
+          <a:lstStyle/>
+          <a:p>
+            <a:fld id="{C519897D-FFB3-4111-B327-449DADBE2990}" type="slidenum">
+              <a:rPr lang="en-US" smtClean="0"/>
+              <a:t>8</a:t>
+            </a:fld>
+            <a:endParaRPr lang="en-US"/>
+          </a:p>
+        </p:txBody>
+      </p:sp>
+    </p:spTree>
+    <p:extLst>
+      <p:ext uri="{BB962C8B-B14F-4D97-AF65-F5344CB8AC3E}">
+        <p14:creationId xmlns:p14="http://schemas.microsoft.com/office/powerpoint/2010/main" val="2867635840"/>
+      </p:ext>
+    </p:extLst>
+  </p:cSld>
+  <p:clrMapOvr>
+    <a:masterClrMapping/>
+  </p:clrMapOvr>
+</p:notes>
+</file>
+
+<file path=ppt/notesSlides/notesSlide9.xml><?xml version="1.0" encoding="utf-8"?>
+<p:notes xmlns:a="http://schemas.openxmlformats.org/drawingml/2006/main" xmlns:r="http://schemas.openxmlformats.org/officeDocument/2006/relationships" xmlns:p="http://schemas.openxmlformats.org/presentationml/2006/main">
+  <p:cSld>
+    <p:spTree>
+      <p:nvGrpSpPr>
+        <p:cNvPr id="1" name=""/>
+        <p:cNvGrpSpPr/>
+        <p:nvPr/>
+      </p:nvGrpSpPr>
+      <p:grpSpPr>
+        <a:xfrm>
+          <a:off x="0" y="0"/>
+          <a:ext cx="0" cy="0"/>
+          <a:chOff x="0" y="0"/>
+          <a:chExt cx="0" cy="0"/>
+        </a:xfrm>
+      </p:grpSpPr>
+      <p:sp>
+        <p:nvSpPr>
+          <p:cNvPr id="2" name="Segnaposto immagine diapositiva 1"/>
+          <p:cNvSpPr>
+            <a:spLocks noGrp="1" noRot="1" noChangeAspect="1"/>
+          </p:cNvSpPr>
+          <p:nvPr>
+            <p:ph type="sldImg"/>
+          </p:nvPr>
+        </p:nvSpPr>
+        <p:spPr/>
+      </p:sp>
+      <p:sp>
+        <p:nvSpPr>
+          <p:cNvPr id="3" name="Segnaposto note 2"/>
+          <p:cNvSpPr>
+            <a:spLocks noGrp="1"/>
+          </p:cNvSpPr>
+          <p:nvPr>
+            <p:ph type="body" idx="1"/>
+          </p:nvPr>
+        </p:nvSpPr>
+        <p:spPr/>
+        <p:txBody>
+          <a:bodyPr/>
+          <a:lstStyle/>
+          <a:p>
+            <a:endParaRPr lang="it-IT"/>
+          </a:p>
+        </p:txBody>
+      </p:sp>
+      <p:sp>
+        <p:nvSpPr>
+          <p:cNvPr id="4" name="Segnaposto numero diapositiva 3"/>
+          <p:cNvSpPr>
+            <a:spLocks noGrp="1"/>
+          </p:cNvSpPr>
+          <p:nvPr>
+            <p:ph type="sldNum" sz="quarter" idx="10"/>
+          </p:nvPr>
+        </p:nvSpPr>
+        <p:spPr/>
+        <p:txBody>
+          <a:bodyPr/>
+          <a:lstStyle/>
+          <a:p>
+            <a:fld id="{C519897D-FFB3-4111-B327-449DADBE2990}" type="slidenum">
+              <a:rPr lang="en-US" smtClean="0"/>
+              <a:t>9</a:t>
+            </a:fld>
+            <a:endParaRPr lang="en-US"/>
+          </a:p>
+        </p:txBody>
+      </p:sp>
+    </p:spTree>
+    <p:extLst>
+      <p:ext uri="{BB962C8B-B14F-4D97-AF65-F5344CB8AC3E}">
+        <p14:creationId xmlns:p14="http://schemas.microsoft.com/office/powerpoint/2010/main" val="3209759412"/>
       </p:ext>
     </p:extLst>
   </p:cSld>
@@ -1226,7 +3410,7 @@
           <a:p>
             <a:fld id="{F1FA7AC5-6045-4418-8E60-F48788734473}" type="datetimeFigureOut">
               <a:rPr lang="en-US" smtClean="0"/>
-              <a:t>11/25/2018</a:t>
+              <a:t>12/3/2018</a:t>
             </a:fld>
             <a:endParaRPr lang="en-US"/>
           </a:p>
@@ -1439,7 +3623,7 @@
           <a:p>
             <a:fld id="{F1FA7AC5-6045-4418-8E60-F48788734473}" type="datetimeFigureOut">
               <a:rPr lang="en-US" smtClean="0"/>
-              <a:t>11/25/2018</a:t>
+              <a:t>12/3/2018</a:t>
             </a:fld>
             <a:endParaRPr lang="en-US"/>
           </a:p>
@@ -1693,7 +3877,7 @@
           <a:p>
             <a:fld id="{F1FA7AC5-6045-4418-8E60-F48788734473}" type="datetimeFigureOut">
               <a:rPr lang="en-US" smtClean="0"/>
-              <a:t>11/25/2018</a:t>
+              <a:t>12/3/2018</a:t>
             </a:fld>
             <a:endParaRPr lang="en-US"/>
           </a:p>
@@ -1861,7 +4045,7 @@
           <a:p>
             <a:fld id="{F1FA7AC5-6045-4418-8E60-F48788734473}" type="datetimeFigureOut">
               <a:rPr lang="en-US" smtClean="0"/>
-              <a:t>11/25/2018</a:t>
+              <a:t>12/3/2018</a:t>
             </a:fld>
             <a:endParaRPr lang="en-US"/>
           </a:p>
@@ -2203,7 +4387,7 @@
           <a:p>
             <a:fld id="{F1FA7AC5-6045-4418-8E60-F48788734473}" type="datetimeFigureOut">
               <a:rPr lang="en-US" smtClean="0"/>
-              <a:t>11/25/2018</a:t>
+              <a:t>12/3/2018</a:t>
             </a:fld>
             <a:endParaRPr lang="en-US"/>
           </a:p>
@@ -2475,7 +4659,7 @@
           <a:p>
             <a:fld id="{F1FA7AC5-6045-4418-8E60-F48788734473}" type="datetimeFigureOut">
               <a:rPr lang="en-US" smtClean="0"/>
-              <a:t>11/25/2018</a:t>
+              <a:t>12/3/2018</a:t>
             </a:fld>
             <a:endParaRPr lang="en-US"/>
           </a:p>
@@ -2851,7 +5035,7 @@
           <a:p>
             <a:fld id="{F1FA7AC5-6045-4418-8E60-F48788734473}" type="datetimeFigureOut">
               <a:rPr lang="en-US" smtClean="0"/>
-              <a:t>11/25/2018</a:t>
+              <a:t>12/3/2018</a:t>
             </a:fld>
             <a:endParaRPr lang="en-US"/>
           </a:p>
@@ -2968,7 +5152,7 @@
           <a:p>
             <a:fld id="{F1FA7AC5-6045-4418-8E60-F48788734473}" type="datetimeFigureOut">
               <a:rPr lang="en-US" smtClean="0"/>
-              <a:t>11/25/2018</a:t>
+              <a:t>12/3/2018</a:t>
             </a:fld>
             <a:endParaRPr lang="en-US"/>
           </a:p>
@@ -3139,7 +5323,7 @@
           <a:p>
             <a:fld id="{F1FA7AC5-6045-4418-8E60-F48788734473}" type="datetimeFigureOut">
               <a:rPr lang="en-US" smtClean="0"/>
-              <a:t>11/25/2018</a:t>
+              <a:t>12/3/2018</a:t>
             </a:fld>
             <a:endParaRPr lang="en-US"/>
           </a:p>
@@ -3491,7 +5675,7 @@
           <a:p>
             <a:fld id="{F1FA7AC5-6045-4418-8E60-F48788734473}" type="datetimeFigureOut">
               <a:rPr lang="en-US" smtClean="0"/>
-              <a:t>11/25/2018</a:t>
+              <a:t>12/3/2018</a:t>
             </a:fld>
             <a:endParaRPr lang="en-US"/>
           </a:p>
@@ -3866,7 +6050,7 @@
           <a:p>
             <a:fld id="{F1FA7AC5-6045-4418-8E60-F48788734473}" type="datetimeFigureOut">
               <a:rPr lang="en-US" smtClean="0"/>
-              <a:t>11/25/2018</a:t>
+              <a:t>12/3/2018</a:t>
             </a:fld>
             <a:endParaRPr lang="en-US"/>
           </a:p>
@@ -4151,7 +6335,7 @@
           <a:p>
             <a:fld id="{F1FA7AC5-6045-4418-8E60-F48788734473}" type="datetimeFigureOut">
               <a:rPr lang="en-US" smtClean="0"/>
-              <a:t>11/25/2018</a:t>
+              <a:t>12/3/2018</a:t>
             </a:fld>
             <a:endParaRPr lang="en-US"/>
           </a:p>
@@ -4883,7 +7067,7 @@
           <a:p>
             <a:r>
               <a:rPr lang="it-IT" dirty="0" err="1" smtClean="0"/>
-              <a:t>RxJs</a:t>
+              <a:t>RxJS</a:t>
             </a:r>
             <a:endParaRPr lang="it-IT" dirty="0"/>
           </a:p>
@@ -4913,7 +7097,7 @@
             <a:pPr algn="ctr"/>
             <a:r>
               <a:rPr lang="en-US" sz="4400" dirty="0" err="1">
-                <a:hlinkClick r:id="rId2" tooltip="https://github.com/ReactiveX/rxjs"/>
+                <a:hlinkClick r:id="rId3" tooltip="https://github.com/ReactiveX/rxjs"/>
               </a:rPr>
               <a:t>RxJS</a:t>
             </a:r>
@@ -4923,7 +7107,7 @@
             </a:r>
             <a:r>
               <a:rPr lang="en-US" sz="4400" dirty="0">
-                <a:hlinkClick r:id="rId3" tooltip="https://www.reactivemanifesto.org/"/>
+                <a:hlinkClick r:id="rId4" tooltip="https://www.reactivemanifesto.org/"/>
               </a:rPr>
               <a:t>Reactive Programming</a:t>
             </a:r>
@@ -4941,7 +7125,7 @@
             </a:r>
             <a:r>
               <a:rPr lang="en-US" sz="4400" dirty="0">
-                <a:hlinkClick r:id="rId4" tooltip="https://en.wikipedia.org/wiki/Observer_pattern"/>
+                <a:hlinkClick r:id="rId5" tooltip="https://en.wikipedia.org/wiki/Observer_pattern"/>
               </a:rPr>
               <a:t>Observer Pattern</a:t>
             </a:r>
@@ -5007,7 +7191,7 @@
           <a:p>
             <a:r>
               <a:rPr lang="it-IT" dirty="0" err="1" smtClean="0"/>
-              <a:t>RxJs</a:t>
+              <a:t>RxJS</a:t>
             </a:r>
             <a:r>
               <a:rPr lang="it-IT" dirty="0" smtClean="0"/>
@@ -5444,7 +7628,7 @@
           <a:p>
             <a:r>
               <a:rPr lang="it-IT" dirty="0" err="1" smtClean="0"/>
-              <a:t>RxJs</a:t>
+              <a:t>RxJS</a:t>
             </a:r>
             <a:r>
               <a:rPr lang="it-IT" dirty="0" smtClean="0"/>
@@ -6896,8 +9080,37 @@
             </a:r>
             <a:r>
               <a:rPr lang="it-IT" dirty="0" smtClean="0"/>
-              <a:t> Programming:</a:t>
-            </a:r>
+              <a:t> </a:t>
+            </a:r>
+            <a:r>
+              <a:rPr lang="it-IT" dirty="0" smtClean="0"/>
+              <a:t>Programming in </a:t>
+            </a:r>
+            <a:r>
+              <a:rPr lang="it-IT" dirty="0" err="1" smtClean="0"/>
+              <a:t>your</a:t>
+            </a:r>
+            <a:r>
+              <a:rPr lang="it-IT" dirty="0" smtClean="0"/>
+              <a:t> favorite </a:t>
+            </a:r>
+            <a:r>
+              <a:rPr lang="it-IT" dirty="0" err="1" smtClean="0"/>
+              <a:t>search</a:t>
+            </a:r>
+            <a:r>
+              <a:rPr lang="it-IT" dirty="0" smtClean="0"/>
+              <a:t> </a:t>
+            </a:r>
+            <a:r>
+              <a:rPr lang="it-IT" dirty="0" err="1" smtClean="0"/>
+              <a:t>engine</a:t>
+            </a:r>
+            <a:r>
+              <a:rPr lang="it-IT" dirty="0" smtClean="0"/>
+              <a:t>:</a:t>
+            </a:r>
+            <a:endParaRPr lang="it-IT" dirty="0" smtClean="0"/>
           </a:p>
           <a:p>
             <a:endParaRPr lang="it-IT" dirty="0" smtClean="0"/>
@@ -6913,13 +9126,13 @@
             </a:r>
             <a:r>
               <a:rPr lang="it-IT" dirty="0">
-                <a:hlinkClick r:id="rId2"/>
+                <a:hlinkClick r:id="rId3"/>
               </a:rPr>
               <a:t>https://</a:t>
             </a:r>
             <a:r>
               <a:rPr lang="it-IT" dirty="0" smtClean="0">
-                <a:hlinkClick r:id="rId2"/>
+                <a:hlinkClick r:id="rId3"/>
               </a:rPr>
               <a:t>en.wikipedia.org/wiki/Reactive_programming</a:t>
             </a:r>
@@ -6948,13 +9161,13 @@
             </a:r>
             <a:r>
               <a:rPr lang="it-IT" dirty="0">
-                <a:hlinkClick r:id="rId3"/>
+                <a:hlinkClick r:id="rId4"/>
               </a:rPr>
               <a:t>https://</a:t>
             </a:r>
             <a:r>
               <a:rPr lang="it-IT" dirty="0" smtClean="0">
-                <a:hlinkClick r:id="rId3"/>
+                <a:hlinkClick r:id="rId4"/>
               </a:rPr>
               <a:t>stackoverflow.com/questions/1028250/what-is-functional-reactive-programming</a:t>
             </a:r>
@@ -6979,13 +9192,13 @@
             </a:r>
             <a:r>
               <a:rPr lang="it-IT" dirty="0">
-                <a:hlinkClick r:id="rId4"/>
+                <a:hlinkClick r:id="rId5"/>
               </a:rPr>
               <a:t>https://www.reactivemanifesto.org</a:t>
             </a:r>
             <a:r>
               <a:rPr lang="it-IT" dirty="0" smtClean="0">
-                <a:hlinkClick r:id="rId4"/>
+                <a:hlinkClick r:id="rId5"/>
               </a:rPr>
               <a:t>/</a:t>
             </a:r>
@@ -7024,9 +9237,6 @@
                     <p:cTn id="3" fill="hold">
                       <p:stCondLst>
                         <p:cond delay="indefinite"/>
-                        <p:cond evt="onBegin" delay="0">
-                          <p:tn val="2"/>
-                        </p:cond>
                       </p:stCondLst>
                       <p:childTnLst>
                         <p:par>
@@ -7036,7 +9246,7 @@
                             </p:stCondLst>
                             <p:childTnLst>
                               <p:par>
-                                <p:cTn id="5" presetID="10" presetClass="entr" presetSubtype="0" fill="hold" nodeType="afterEffect">
+                                <p:cTn id="5" presetID="10" presetClass="entr" presetSubtype="0" fill="hold" nodeType="clickEffect">
                                   <p:stCondLst>
                                     <p:cond delay="0"/>
                                   </p:stCondLst>
@@ -7806,11 +10016,7 @@
             </a:r>
             <a:r>
               <a:rPr lang="it-IT" sz="2800" dirty="0" smtClean="0"/>
-              <a:t> </a:t>
-            </a:r>
-            <a:r>
-              <a:rPr lang="it-IT" sz="2800" dirty="0" smtClean="0"/>
-              <a:t>an </a:t>
+              <a:t> an </a:t>
             </a:r>
             <a:r>
               <a:rPr lang="it-IT" sz="2800" dirty="0" err="1" smtClean="0"/>
@@ -8024,15 +10230,7 @@
           <a:p>
             <a:r>
               <a:rPr lang="it-IT" sz="6000" dirty="0" smtClean="0"/>
-              <a:t>Demo </a:t>
-            </a:r>
-            <a:r>
-              <a:rPr lang="it-IT" sz="6000" dirty="0" smtClean="0"/>
-              <a:t>01</a:t>
-            </a:r>
-            <a:r>
-              <a:rPr lang="it-IT" sz="6000" dirty="0" smtClean="0"/>
-              <a:t/>
+              <a:t>Demo 01</a:t>
             </a:r>
             <a:br>
               <a:rPr lang="it-IT" sz="6000" dirty="0" smtClean="0"/>
@@ -8171,15 +10369,7 @@
           <a:p>
             <a:r>
               <a:rPr lang="it-IT" sz="6000" dirty="0" smtClean="0"/>
-              <a:t>Demo </a:t>
-            </a:r>
-            <a:r>
-              <a:rPr lang="it-IT" sz="6000" dirty="0" smtClean="0"/>
-              <a:t>02</a:t>
-            </a:r>
-            <a:r>
-              <a:rPr lang="it-IT" sz="6000" dirty="0" smtClean="0"/>
-              <a:t/>
+              <a:t>Demo 02</a:t>
             </a:r>
             <a:br>
               <a:rPr lang="it-IT" sz="6000" dirty="0" smtClean="0"/>
@@ -8339,15 +10529,7 @@
           <a:p>
             <a:r>
               <a:rPr lang="it-IT" sz="6000" dirty="0" smtClean="0"/>
-              <a:t>Demo </a:t>
-            </a:r>
-            <a:r>
-              <a:rPr lang="it-IT" sz="6000" dirty="0" smtClean="0"/>
-              <a:t>03</a:t>
-            </a:r>
-            <a:r>
-              <a:rPr lang="it-IT" sz="6000" dirty="0" smtClean="0"/>
-              <a:t/>
+              <a:t>Demo 03</a:t>
             </a:r>
             <a:br>
               <a:rPr lang="it-IT" sz="6000" dirty="0" smtClean="0"/>
@@ -8490,11 +10672,7 @@
           <a:p>
             <a:r>
               <a:rPr lang="it-IT" sz="6000" dirty="0" smtClean="0"/>
-              <a:t>Demo </a:t>
-            </a:r>
-            <a:r>
-              <a:rPr lang="it-IT" sz="6000" dirty="0" smtClean="0"/>
-              <a:t>04</a:t>
+              <a:t>Demo 04</a:t>
             </a:r>
             <a:r>
               <a:rPr lang="it-IT" dirty="0" smtClean="0"/>
@@ -8622,11 +10800,7 @@
           <a:p>
             <a:r>
               <a:rPr lang="it-IT" sz="6000" dirty="0" smtClean="0"/>
-              <a:t>Demo </a:t>
-            </a:r>
-            <a:r>
-              <a:rPr lang="it-IT" sz="6000" dirty="0" smtClean="0"/>
-              <a:t>05</a:t>
+              <a:t>Demo 05</a:t>
             </a:r>
             <a:r>
               <a:rPr lang="it-IT" dirty="0" smtClean="0"/>
@@ -9036,8 +11210,12 @@
               <a:t> state </a:t>
             </a:r>
             <a:r>
-              <a:rPr lang="it-IT" smtClean="0"/>
-              <a:t>change </a:t>
+              <a:rPr lang="it-IT" dirty="0" err="1" smtClean="0"/>
+              <a:t>change</a:t>
+            </a:r>
+            <a:r>
+              <a:rPr lang="it-IT" dirty="0" smtClean="0"/>
+              <a:t> </a:t>
             </a:r>
             <a:r>
               <a:rPr lang="it-IT" dirty="0" err="1" smtClean="0"/>
@@ -9050,83 +11228,83 @@
           </a:p>
           <a:p>
             <a:r>
-              <a:rPr lang="it-IT" dirty="0" smtClean="0"/>
+              <a:rPr lang="it-IT" sz="1700" dirty="0" smtClean="0"/>
               <a:t>Under some </a:t>
             </a:r>
             <a:r>
-              <a:rPr lang="it-IT" dirty="0" err="1" smtClean="0"/>
+              <a:rPr lang="it-IT" sz="1700" dirty="0" err="1" smtClean="0"/>
               <a:t>conditions</a:t>
             </a:r>
             <a:r>
-              <a:rPr lang="it-IT" dirty="0" smtClean="0"/>
+              <a:rPr lang="it-IT" sz="1700" dirty="0" smtClean="0"/>
               <a:t> </a:t>
             </a:r>
             <a:r>
-              <a:rPr lang="it-IT" dirty="0" err="1" smtClean="0"/>
+              <a:rPr lang="it-IT" sz="1700" dirty="0" err="1" smtClean="0"/>
               <a:t>we</a:t>
             </a:r>
             <a:r>
-              <a:rPr lang="it-IT" dirty="0" smtClean="0"/>
+              <a:rPr lang="it-IT" sz="1700" dirty="0" smtClean="0"/>
               <a:t> can </a:t>
             </a:r>
             <a:r>
-              <a:rPr lang="it-IT" dirty="0" err="1" smtClean="0"/>
+              <a:rPr lang="it-IT" sz="1700" dirty="0" err="1" smtClean="0"/>
               <a:t>disable</a:t>
             </a:r>
             <a:r>
-              <a:rPr lang="it-IT" dirty="0" smtClean="0"/>
+              <a:rPr lang="it-IT" sz="1700" dirty="0" smtClean="0"/>
               <a:t> </a:t>
             </a:r>
             <a:r>
-              <a:rPr lang="it-IT" dirty="0" err="1" smtClean="0"/>
+              <a:rPr lang="it-IT" sz="1700" dirty="0" err="1" smtClean="0"/>
               <a:t>Angular</a:t>
             </a:r>
             <a:r>
-              <a:rPr lang="it-IT" dirty="0" smtClean="0"/>
+              <a:rPr lang="it-IT" sz="1700" dirty="0" smtClean="0"/>
               <a:t> </a:t>
             </a:r>
             <a:r>
-              <a:rPr lang="it-IT" dirty="0" err="1" smtClean="0"/>
+              <a:rPr lang="it-IT" sz="1700" dirty="0" err="1" smtClean="0"/>
               <a:t>dirty</a:t>
             </a:r>
             <a:r>
-              <a:rPr lang="it-IT" dirty="0" smtClean="0"/>
+              <a:rPr lang="it-IT" sz="1700" dirty="0" smtClean="0"/>
               <a:t> </a:t>
             </a:r>
             <a:r>
-              <a:rPr lang="it-IT" dirty="0" err="1" smtClean="0"/>
+              <a:rPr lang="it-IT" sz="1700" dirty="0" err="1" smtClean="0"/>
               <a:t>checking</a:t>
             </a:r>
             <a:r>
-              <a:rPr lang="it-IT" dirty="0" smtClean="0"/>
+              <a:rPr lang="it-IT" sz="1700" dirty="0" smtClean="0"/>
               <a:t> </a:t>
             </a:r>
             <a:r>
-              <a:rPr lang="it-IT" dirty="0" err="1" smtClean="0"/>
+              <a:rPr lang="it-IT" sz="1700" dirty="0" err="1" smtClean="0"/>
               <a:t>mechanic</a:t>
             </a:r>
             <a:r>
-              <a:rPr lang="it-IT" dirty="0"/>
+              <a:rPr lang="it-IT" sz="1700" dirty="0"/>
               <a:t> </a:t>
             </a:r>
             <a:r>
-              <a:rPr lang="it-IT" dirty="0" smtClean="0"/>
+              <a:rPr lang="it-IT" sz="1700" dirty="0" smtClean="0"/>
               <a:t>and </a:t>
             </a:r>
             <a:r>
-              <a:rPr lang="it-IT" dirty="0" err="1" smtClean="0"/>
+              <a:rPr lang="it-IT" sz="1700" dirty="0" err="1" smtClean="0"/>
               <a:t>improve</a:t>
             </a:r>
             <a:r>
-              <a:rPr lang="it-IT" dirty="0" smtClean="0"/>
+              <a:rPr lang="it-IT" sz="1700" dirty="0" smtClean="0"/>
               <a:t> the </a:t>
             </a:r>
             <a:r>
-              <a:rPr lang="it-IT" dirty="0" err="1" smtClean="0"/>
+              <a:rPr lang="it-IT" sz="1700" dirty="0" err="1" smtClean="0"/>
               <a:t>components</a:t>
             </a:r>
             <a:r>
-              <a:rPr lang="it-IT" dirty="0" smtClean="0"/>
+              <a:rPr lang="it-IT" sz="1700" dirty="0" smtClean="0"/>
               <a:t> performances.</a:t>
             </a:r>
           </a:p>
@@ -9233,6 +11411,10 @@
             <a:r>
               <a:rPr lang="it-IT" dirty="0" err="1" smtClean="0"/>
               <a:t>observable</a:t>
+            </a:r>
+            <a:r>
+              <a:rPr lang="it-IT" dirty="0" smtClean="0"/>
+              <a:t>.</a:t>
             </a:r>
             <a:endParaRPr lang="it-IT" dirty="0"/>
           </a:p>
@@ -10110,21 +12292,11 @@
           <a:p>
             <a:r>
               <a:rPr lang="en-US" dirty="0" smtClean="0"/>
-              <a:t>In</a:t>
+              <a:t>…</a:t>
             </a:r>
             <a:r>
               <a:rPr lang="en-US" dirty="0"/>
               <a:t> </a:t>
-            </a:r>
-            <a:r>
-              <a:rPr lang="en-US" dirty="0">
-                <a:hlinkClick r:id="rId2" tooltip="Computing"/>
-              </a:rPr>
-              <a:t>computing</a:t>
-            </a:r>
-            <a:r>
-              <a:rPr lang="en-US" dirty="0"/>
-              <a:t>, </a:t>
             </a:r>
             <a:r>
               <a:rPr lang="en-US" b="1" dirty="0"/>
@@ -11385,8 +13557,12 @@
           <a:lstStyle/>
           <a:p>
             <a:r>
-              <a:rPr lang="it-IT" dirty="0" smtClean="0"/>
-              <a:t>R. P. - a </a:t>
+              <a:rPr lang="it-IT" dirty="0"/>
+              <a:t>A</a:t>
+            </a:r>
+            <a:r>
+              <a:rPr lang="it-IT" dirty="0" smtClean="0"/>
+              <a:t> </a:t>
             </a:r>
             <a:r>
               <a:rPr lang="it-IT" dirty="0" err="1" smtClean="0"/>
@@ -11426,13 +13602,11 @@
             <a:endParaRPr lang="it-IT" dirty="0" smtClean="0"/>
           </a:p>
           <a:p>
-            <a:endParaRPr lang="it-IT" dirty="0" smtClean="0"/>
-          </a:p>
-          <a:p>
+            <a:pPr algn="ctr"/>
             <a:endParaRPr lang="it-IT" dirty="0"/>
           </a:p>
           <a:p>
-            <a:pPr marL="0" indent="0">
+            <a:pPr marL="0" indent="0" algn="ctr">
               <a:buNone/>
             </a:pPr>
             <a:r>
@@ -11451,21 +13625,41 @@
               <a:rPr lang="it-IT" sz="4400" dirty="0" smtClean="0"/>
               <a:t> </a:t>
             </a:r>
+            <a:endParaRPr lang="it-IT" sz="4400" dirty="0" smtClean="0"/>
+          </a:p>
+          <a:p>
+            <a:pPr marL="0" indent="0" algn="ctr">
+              <a:buNone/>
+            </a:pPr>
             <a:r>
               <a:rPr lang="it-IT" sz="4400" dirty="0" err="1" smtClean="0"/>
               <a:t>programming</a:t>
             </a:r>
             <a:r>
               <a:rPr lang="it-IT" sz="4400" dirty="0" smtClean="0"/>
-              <a:t> with </a:t>
-            </a:r>
+              <a:t> </a:t>
+            </a:r>
+            <a:r>
+              <a:rPr lang="it-IT" sz="4400" dirty="0" smtClean="0"/>
+              <a:t>with </a:t>
+            </a:r>
+            <a:endParaRPr lang="it-IT" sz="4400" dirty="0" smtClean="0"/>
+          </a:p>
+          <a:p>
+            <a:pPr marL="0" indent="0" algn="ctr">
+              <a:buNone/>
+            </a:pPr>
             <a:r>
               <a:rPr lang="it-IT" sz="4400" dirty="0" err="1" smtClean="0"/>
               <a:t>Asynchronous</a:t>
             </a:r>
             <a:r>
               <a:rPr lang="it-IT" sz="4400" dirty="0" smtClean="0"/>
-              <a:t> (</a:t>
+              <a:t> </a:t>
+            </a:r>
+            <a:r>
+              <a:rPr lang="it-IT" sz="4400" dirty="0" smtClean="0"/>
+              <a:t>(</a:t>
             </a:r>
             <a:r>
               <a:rPr lang="it-IT" sz="4400" dirty="0" err="1" smtClean="0"/>
@@ -11500,7 +13694,204 @@
   <p:timing>
     <p:tnLst>
       <p:par>
-        <p:cTn id="1" dur="indefinite" restart="never" nodeType="tmRoot"/>
+        <p:cTn id="1" dur="indefinite" restart="never" nodeType="tmRoot">
+          <p:childTnLst>
+            <p:seq concurrent="1" nextAc="seek">
+              <p:cTn id="2" dur="indefinite" nodeType="mainSeq">
+                <p:childTnLst>
+                  <p:par>
+                    <p:cTn id="3" fill="hold">
+                      <p:stCondLst>
+                        <p:cond delay="indefinite"/>
+                      </p:stCondLst>
+                      <p:childTnLst>
+                        <p:par>
+                          <p:cTn id="4" fill="hold">
+                            <p:stCondLst>
+                              <p:cond delay="0"/>
+                            </p:stCondLst>
+                            <p:childTnLst>
+                              <p:par>
+                                <p:cTn id="5" presetID="10" presetClass="entr" presetSubtype="0" fill="hold" nodeType="clickEffect">
+                                  <p:stCondLst>
+                                    <p:cond delay="0"/>
+                                  </p:stCondLst>
+                                  <p:childTnLst>
+                                    <p:set>
+                                      <p:cBhvr>
+                                        <p:cTn id="6" dur="1" fill="hold">
+                                          <p:stCondLst>
+                                            <p:cond delay="0"/>
+                                          </p:stCondLst>
+                                        </p:cTn>
+                                        <p:tgtEl>
+                                          <p:spTgt spid="3">
+                                            <p:txEl>
+                                              <p:pRg st="2" end="2"/>
+                                            </p:txEl>
+                                          </p:spTgt>
+                                        </p:tgtEl>
+                                        <p:attrNameLst>
+                                          <p:attrName>style.visibility</p:attrName>
+                                        </p:attrNameLst>
+                                      </p:cBhvr>
+                                      <p:to>
+                                        <p:strVal val="visible"/>
+                                      </p:to>
+                                    </p:set>
+                                    <p:animEffect transition="in" filter="fade">
+                                      <p:cBhvr>
+                                        <p:cTn id="7" dur="500"/>
+                                        <p:tgtEl>
+                                          <p:spTgt spid="3">
+                                            <p:txEl>
+                                              <p:pRg st="2" end="2"/>
+                                            </p:txEl>
+                                          </p:spTgt>
+                                        </p:tgtEl>
+                                      </p:cBhvr>
+                                    </p:animEffect>
+                                  </p:childTnLst>
+                                </p:cTn>
+                              </p:par>
+                            </p:childTnLst>
+                          </p:cTn>
+                        </p:par>
+                        <p:par>
+                          <p:cTn id="8" fill="hold">
+                            <p:stCondLst>
+                              <p:cond delay="500"/>
+                            </p:stCondLst>
+                            <p:childTnLst>
+                              <p:par>
+                                <p:cTn id="9" presetID="10" presetClass="entr" presetSubtype="0" fill="hold" nodeType="afterEffect">
+                                  <p:stCondLst>
+                                    <p:cond delay="0"/>
+                                  </p:stCondLst>
+                                  <p:childTnLst>
+                                    <p:set>
+                                      <p:cBhvr>
+                                        <p:cTn id="10" dur="1" fill="hold">
+                                          <p:stCondLst>
+                                            <p:cond delay="0"/>
+                                          </p:stCondLst>
+                                        </p:cTn>
+                                        <p:tgtEl>
+                                          <p:spTgt spid="3">
+                                            <p:txEl>
+                                              <p:pRg st="3" end="3"/>
+                                            </p:txEl>
+                                          </p:spTgt>
+                                        </p:tgtEl>
+                                        <p:attrNameLst>
+                                          <p:attrName>style.visibility</p:attrName>
+                                        </p:attrNameLst>
+                                      </p:cBhvr>
+                                      <p:to>
+                                        <p:strVal val="visible"/>
+                                      </p:to>
+                                    </p:set>
+                                    <p:animEffect transition="in" filter="fade">
+                                      <p:cBhvr>
+                                        <p:cTn id="11" dur="500"/>
+                                        <p:tgtEl>
+                                          <p:spTgt spid="3">
+                                            <p:txEl>
+                                              <p:pRg st="3" end="3"/>
+                                            </p:txEl>
+                                          </p:spTgt>
+                                        </p:tgtEl>
+                                      </p:cBhvr>
+                                    </p:animEffect>
+                                  </p:childTnLst>
+                                </p:cTn>
+                              </p:par>
+                            </p:childTnLst>
+                          </p:cTn>
+                        </p:par>
+                      </p:childTnLst>
+                    </p:cTn>
+                  </p:par>
+                  <p:par>
+                    <p:cTn id="12" fill="hold">
+                      <p:stCondLst>
+                        <p:cond delay="indefinite"/>
+                      </p:stCondLst>
+                      <p:childTnLst>
+                        <p:par>
+                          <p:cTn id="13" fill="hold">
+                            <p:stCondLst>
+                              <p:cond delay="0"/>
+                            </p:stCondLst>
+                            <p:childTnLst>
+                              <p:par>
+                                <p:cTn id="14" presetID="10" presetClass="entr" presetSubtype="0" fill="hold" nodeType="clickEffect">
+                                  <p:stCondLst>
+                                    <p:cond delay="0"/>
+                                  </p:stCondLst>
+                                  <p:childTnLst>
+                                    <p:set>
+                                      <p:cBhvr>
+                                        <p:cTn id="15" dur="1" fill="hold">
+                                          <p:stCondLst>
+                                            <p:cond delay="0"/>
+                                          </p:stCondLst>
+                                        </p:cTn>
+                                        <p:tgtEl>
+                                          <p:spTgt spid="3">
+                                            <p:txEl>
+                                              <p:pRg st="4" end="4"/>
+                                            </p:txEl>
+                                          </p:spTgt>
+                                        </p:tgtEl>
+                                        <p:attrNameLst>
+                                          <p:attrName>style.visibility</p:attrName>
+                                        </p:attrNameLst>
+                                      </p:cBhvr>
+                                      <p:to>
+                                        <p:strVal val="visible"/>
+                                      </p:to>
+                                    </p:set>
+                                    <p:animEffect transition="in" filter="fade">
+                                      <p:cBhvr>
+                                        <p:cTn id="16" dur="500"/>
+                                        <p:tgtEl>
+                                          <p:spTgt spid="3">
+                                            <p:txEl>
+                                              <p:pRg st="4" end="4"/>
+                                            </p:txEl>
+                                          </p:spTgt>
+                                        </p:tgtEl>
+                                      </p:cBhvr>
+                                    </p:animEffect>
+                                  </p:childTnLst>
+                                </p:cTn>
+                              </p:par>
+                            </p:childTnLst>
+                          </p:cTn>
+                        </p:par>
+                      </p:childTnLst>
+                    </p:cTn>
+                  </p:par>
+                </p:childTnLst>
+              </p:cTn>
+              <p:prevCondLst>
+                <p:cond evt="onPrev" delay="0">
+                  <p:tgtEl>
+                    <p:sldTgt/>
+                  </p:tgtEl>
+                </p:cond>
+              </p:prevCondLst>
+              <p:nextCondLst>
+                <p:cond evt="onNext" delay="0">
+                  <p:tgtEl>
+                    <p:sldTgt/>
+                  </p:tgtEl>
+                </p:cond>
+              </p:nextCondLst>
+            </p:seq>
+          </p:childTnLst>
+        </p:cTn>
       </p:par>
     </p:tnLst>
   </p:timing>
@@ -11703,8 +14094,20 @@
               <a:t> </a:t>
             </a:r>
             <a:r>
-              <a:rPr lang="it-IT" dirty="0" err="1" smtClean="0"/>
-              <a:t>this</a:t>
+              <a:rPr lang="it-IT" dirty="0" smtClean="0"/>
+              <a:t>the </a:t>
+            </a:r>
+            <a:r>
+              <a:rPr lang="it-IT" dirty="0" err="1" smtClean="0"/>
+              <a:t>concept</a:t>
+            </a:r>
+            <a:r>
+              <a:rPr lang="it-IT" dirty="0" smtClean="0"/>
+              <a:t> of </a:t>
+            </a:r>
+            <a:r>
+              <a:rPr lang="it-IT" dirty="0" err="1" smtClean="0"/>
+              <a:t>messages</a:t>
             </a:r>
             <a:r>
               <a:rPr lang="it-IT" dirty="0" smtClean="0"/>
@@ -11712,19 +14115,23 @@
             </a:r>
             <a:r>
               <a:rPr lang="it-IT" dirty="0" err="1" smtClean="0"/>
-              <a:t>concept</a:t>
+              <a:t>coming</a:t>
+            </a:r>
+            <a:r>
+              <a:rPr lang="it-IT" dirty="0" smtClean="0"/>
+              <a:t> over time </a:t>
+            </a:r>
+            <a:r>
+              <a:rPr lang="it-IT" dirty="0" err="1" smtClean="0"/>
+              <a:t>we</a:t>
             </a:r>
             <a:r>
               <a:rPr lang="it-IT" dirty="0" smtClean="0"/>
               <a:t> </a:t>
             </a:r>
             <a:r>
-              <a:rPr lang="it-IT" dirty="0" err="1" smtClean="0"/>
-              <a:t>we</a:t>
-            </a:r>
-            <a:r>
-              <a:rPr lang="it-IT" dirty="0" smtClean="0"/>
-              <a:t> can </a:t>
+              <a:rPr lang="it-IT" dirty="0" smtClean="0"/>
+              <a:t>can </a:t>
             </a:r>
             <a:r>
               <a:rPr lang="it-IT" dirty="0" err="1" smtClean="0"/>
@@ -11768,19 +14175,27 @@
             </a:r>
           </a:p>
           <a:p>
-            <a:endParaRPr lang="it-IT" dirty="0"/>
+            <a:endParaRPr lang="it-IT" dirty="0" smtClean="0"/>
           </a:p>
           <a:p>
             <a:pPr marL="0" indent="0">
               <a:buNone/>
             </a:pPr>
             <a:r>
-              <a:rPr lang="it-IT" dirty="0" err="1"/>
-              <a:t>W</a:t>
-            </a:r>
-            <a:r>
-              <a:rPr lang="it-IT" dirty="0" err="1" smtClean="0"/>
-              <a:t>hich</a:t>
+              <a:rPr lang="it-IT" dirty="0" smtClean="0"/>
+              <a:t>The </a:t>
+            </a:r>
+            <a:r>
+              <a:rPr lang="it-IT" dirty="0" err="1" smtClean="0"/>
+              <a:t>reactive</a:t>
+            </a:r>
+            <a:r>
+              <a:rPr lang="it-IT" dirty="0" smtClean="0"/>
+              <a:t> manifesto </a:t>
+            </a:r>
+            <a:r>
+              <a:rPr lang="it-IT" dirty="0" err="1" smtClean="0"/>
+              <a:t>gives</a:t>
             </a:r>
             <a:r>
               <a:rPr lang="it-IT" dirty="0" smtClean="0"/>
@@ -11788,7 +14203,15 @@
             </a:r>
             <a:r>
               <a:rPr lang="it-IT" dirty="0" err="1" smtClean="0"/>
-              <a:t>expresses</a:t>
+              <a:t>us</a:t>
+            </a:r>
+            <a:r>
+              <a:rPr lang="it-IT" dirty="0" smtClean="0"/>
+              <a:t> a </a:t>
+            </a:r>
+            <a:r>
+              <a:rPr lang="it-IT" dirty="0" err="1" smtClean="0"/>
+              <a:t>clear</a:t>
             </a:r>
             <a:r>
               <a:rPr lang="it-IT" dirty="0" smtClean="0"/>
@@ -11796,15 +14219,23 @@
             </a:r>
             <a:r>
               <a:rPr lang="it-IT" dirty="0" err="1" smtClean="0"/>
-              <a:t>what</a:t>
-            </a:r>
-            <a:r>
-              <a:rPr lang="it-IT" dirty="0" smtClean="0"/>
-              <a:t> are the benefits of a </a:t>
-            </a:r>
-            <a:r>
-              <a:rPr lang="it-IT" dirty="0" err="1" smtClean="0"/>
-              <a:t>system</a:t>
+              <a:t>picture</a:t>
+            </a:r>
+            <a:r>
+              <a:rPr lang="it-IT" dirty="0" smtClean="0"/>
+              <a:t> of the </a:t>
+            </a:r>
+            <a:r>
+              <a:rPr lang="it-IT" dirty="0" err="1" smtClean="0"/>
+              <a:t>features</a:t>
+            </a:r>
+            <a:r>
+              <a:rPr lang="it-IT" dirty="0" smtClean="0"/>
+              <a:t> and the benefits </a:t>
+            </a:r>
+            <a:r>
+              <a:rPr lang="it-IT" dirty="0" err="1" smtClean="0"/>
+              <a:t>that</a:t>
             </a:r>
             <a:r>
               <a:rPr lang="it-IT" dirty="0" smtClean="0"/>
@@ -11812,7 +14243,7 @@
             </a:r>
             <a:r>
               <a:rPr lang="it-IT" dirty="0" err="1" smtClean="0"/>
-              <a:t>that</a:t>
+              <a:t>reactive</a:t>
             </a:r>
             <a:r>
               <a:rPr lang="it-IT" dirty="0" smtClean="0"/>
@@ -11820,7 +14251,7 @@
             </a:r>
             <a:r>
               <a:rPr lang="it-IT" dirty="0" err="1" smtClean="0"/>
-              <a:t>is</a:t>
+              <a:t>systems</a:t>
             </a:r>
             <a:r>
               <a:rPr lang="it-IT" dirty="0" smtClean="0"/>
@@ -11828,56 +14259,12 @@
             </a:r>
             <a:r>
               <a:rPr lang="it-IT" dirty="0" err="1" smtClean="0"/>
-              <a:t>build</a:t>
-            </a:r>
-            <a:r>
-              <a:rPr lang="it-IT" dirty="0" smtClean="0"/>
-              <a:t> </a:t>
-            </a:r>
-            <a:r>
-              <a:rPr lang="it-IT" dirty="0" err="1" smtClean="0"/>
-              <a:t>around</a:t>
-            </a:r>
-            <a:r>
-              <a:rPr lang="it-IT" dirty="0" smtClean="0"/>
-              <a:t> the </a:t>
-            </a:r>
-            <a:r>
-              <a:rPr lang="it-IT" dirty="0" err="1" smtClean="0"/>
-              <a:t>concept</a:t>
-            </a:r>
-            <a:r>
-              <a:rPr lang="it-IT" dirty="0" smtClean="0"/>
-              <a:t> of </a:t>
-            </a:r>
-            <a:r>
-              <a:rPr lang="it-IT" dirty="0" err="1" smtClean="0"/>
-              <a:t>asynchronous</a:t>
-            </a:r>
-            <a:r>
-              <a:rPr lang="it-IT" dirty="0" smtClean="0"/>
-              <a:t> data </a:t>
-            </a:r>
-            <a:r>
-              <a:rPr lang="it-IT" dirty="0" err="1" smtClean="0"/>
-              <a:t>streams</a:t>
+              <a:t>have</a:t>
             </a:r>
             <a:r>
               <a:rPr lang="it-IT" dirty="0" smtClean="0"/>
               <a:t>.</a:t>
             </a:r>
-          </a:p>
-          <a:p>
-            <a:pPr marL="0" indent="0">
-              <a:buNone/>
-            </a:pPr>
-            <a:endParaRPr lang="it-IT" dirty="0"/>
-          </a:p>
-          <a:p>
-            <a:pPr marL="0" indent="0">
-              <a:buNone/>
-            </a:pPr>
-            <a:endParaRPr lang="it-IT" dirty="0"/>
           </a:p>
         </p:txBody>
       </p:sp>
@@ -13475,7 +15862,7 @@
             </a:br>
             <a:r>
               <a:rPr lang="it-IT" dirty="0" err="1" smtClean="0"/>
-              <a:t>RxJs</a:t>
+              <a:t>RxJS</a:t>
             </a:r>
             <a:endParaRPr lang="it-IT" dirty="0"/>
           </a:p>
@@ -13797,7 +16184,7 @@
   <a:extraClrSchemeLst/>
   <a:extLst>
     <a:ext uri="{05A4C25C-085E-4340-85A3-A5531E510DB2}">
-      <thm15:themeFamily xmlns:thm15="http://schemas.microsoft.com/office/thememl/2012/main" xmlns="" name="Retrospect" id="{5F128B03-DCCA-4EEB-AB3B-CF2899314A46}" vid="{9CC26709-368C-4D72-9060-94E5B3FF3CD6}"/>
+      <thm15:themeFamily xmlns="" xmlns:thm15="http://schemas.microsoft.com/office/thememl/2012/main" name="Retrospect" id="{5F128B03-DCCA-4EEB-AB3B-CF2899314A46}" vid="{9CC26709-368C-4D72-9060-94E5B3FF3CD6}"/>
     </a:ext>
   </a:extLst>
 </a:theme>
@@ -14092,7 +16479,7 @@
   <a:extraClrSchemeLst/>
   <a:extLst>
     <a:ext uri="{05A4C25C-085E-4340-85A3-A5531E510DB2}">
-      <thm15:themeFamily xmlns:thm15="http://schemas.microsoft.com/office/thememl/2012/main" xmlns="" name="Office Theme" id="{62F939B6-93AF-4DB8-9C6B-D6C7DFDC589F}" vid="{4A3C46E8-61CC-4603-A589-7422A47A8E4A}"/>
+      <thm15:themeFamily xmlns="" xmlns:thm15="http://schemas.microsoft.com/office/thememl/2012/main" name="Office Theme" id="{62F939B6-93AF-4DB8-9C6B-D6C7DFDC589F}" vid="{4A3C46E8-61CC-4603-A589-7422A47A8E4A}"/>
     </a:ext>
   </a:extLst>
 </a:theme>

</xml_diff>

<commit_message>
Updated samples and docs
</commit_message>
<xml_diff>
--- a/ReactiveProgramming_RxJS.pptx
+++ b/ReactiveProgramming_RxJS.pptx
@@ -141,7 +141,7 @@
   </p:defaultTextStyle>
   <p:extLst>
     <p:ext uri="{EFAFB233-063F-42B5-8137-9DF3F51BA10A}">
-      <p15:sldGuideLst xmlns:p15="http://schemas.microsoft.com/office/powerpoint/2012/main" xmlns=""/>
+      <p15:sldGuideLst xmlns="" xmlns:p15="http://schemas.microsoft.com/office/powerpoint/2012/main"/>
     </p:ext>
   </p:extLst>
 </p:presentation>
@@ -229,7 +229,7 @@
           <a:p>
             <a:fld id="{327B5F9E-84DB-4811-8F56-9C65E911095D}" type="datetimeFigureOut">
               <a:rPr lang="it-IT" smtClean="0"/>
-              <a:t>04/12/2018</a:t>
+              <a:t>05/12/2018</a:t>
             </a:fld>
             <a:endParaRPr lang="it-IT"/>
           </a:p>
@@ -394,7 +394,7 @@
           <a:p>
             <a:fld id="{60073984-6E99-4D80-ADB1-BFDA0D866557}" type="datetimeFigureOut">
               <a:rPr lang="en-US"/>
-              <a:t>12/4/2018</a:t>
+              <a:t>12/5/2018</a:t>
             </a:fld>
             <a:endParaRPr lang="en-US"/>
           </a:p>
@@ -3410,7 +3410,7 @@
           <a:p>
             <a:fld id="{F1FA7AC5-6045-4418-8E60-F48788734473}" type="datetimeFigureOut">
               <a:rPr lang="en-US" smtClean="0"/>
-              <a:t>12/4/2018</a:t>
+              <a:t>12/5/2018</a:t>
             </a:fld>
             <a:endParaRPr lang="en-US"/>
           </a:p>
@@ -3623,7 +3623,7 @@
           <a:p>
             <a:fld id="{F1FA7AC5-6045-4418-8E60-F48788734473}" type="datetimeFigureOut">
               <a:rPr lang="en-US" smtClean="0"/>
-              <a:t>12/4/2018</a:t>
+              <a:t>12/5/2018</a:t>
             </a:fld>
             <a:endParaRPr lang="en-US"/>
           </a:p>
@@ -3877,7 +3877,7 @@
           <a:p>
             <a:fld id="{F1FA7AC5-6045-4418-8E60-F48788734473}" type="datetimeFigureOut">
               <a:rPr lang="en-US" smtClean="0"/>
-              <a:t>12/4/2018</a:t>
+              <a:t>12/5/2018</a:t>
             </a:fld>
             <a:endParaRPr lang="en-US"/>
           </a:p>
@@ -4045,7 +4045,7 @@
           <a:p>
             <a:fld id="{F1FA7AC5-6045-4418-8E60-F48788734473}" type="datetimeFigureOut">
               <a:rPr lang="en-US" smtClean="0"/>
-              <a:t>12/4/2018</a:t>
+              <a:t>12/5/2018</a:t>
             </a:fld>
             <a:endParaRPr lang="en-US"/>
           </a:p>
@@ -4387,7 +4387,7 @@
           <a:p>
             <a:fld id="{F1FA7AC5-6045-4418-8E60-F48788734473}" type="datetimeFigureOut">
               <a:rPr lang="en-US" smtClean="0"/>
-              <a:t>12/4/2018</a:t>
+              <a:t>12/5/2018</a:t>
             </a:fld>
             <a:endParaRPr lang="en-US"/>
           </a:p>
@@ -4659,7 +4659,7 @@
           <a:p>
             <a:fld id="{F1FA7AC5-6045-4418-8E60-F48788734473}" type="datetimeFigureOut">
               <a:rPr lang="en-US" smtClean="0"/>
-              <a:t>12/4/2018</a:t>
+              <a:t>12/5/2018</a:t>
             </a:fld>
             <a:endParaRPr lang="en-US"/>
           </a:p>
@@ -5035,7 +5035,7 @@
           <a:p>
             <a:fld id="{F1FA7AC5-6045-4418-8E60-F48788734473}" type="datetimeFigureOut">
               <a:rPr lang="en-US" smtClean="0"/>
-              <a:t>12/4/2018</a:t>
+              <a:t>12/5/2018</a:t>
             </a:fld>
             <a:endParaRPr lang="en-US"/>
           </a:p>
@@ -5152,7 +5152,7 @@
           <a:p>
             <a:fld id="{F1FA7AC5-6045-4418-8E60-F48788734473}" type="datetimeFigureOut">
               <a:rPr lang="en-US" smtClean="0"/>
-              <a:t>12/4/2018</a:t>
+              <a:t>12/5/2018</a:t>
             </a:fld>
             <a:endParaRPr lang="en-US"/>
           </a:p>
@@ -5323,7 +5323,7 @@
           <a:p>
             <a:fld id="{F1FA7AC5-6045-4418-8E60-F48788734473}" type="datetimeFigureOut">
               <a:rPr lang="en-US" smtClean="0"/>
-              <a:t>12/4/2018</a:t>
+              <a:t>12/5/2018</a:t>
             </a:fld>
             <a:endParaRPr lang="en-US"/>
           </a:p>
@@ -5675,7 +5675,7 @@
           <a:p>
             <a:fld id="{F1FA7AC5-6045-4418-8E60-F48788734473}" type="datetimeFigureOut">
               <a:rPr lang="en-US" smtClean="0"/>
-              <a:t>12/4/2018</a:t>
+              <a:t>12/5/2018</a:t>
             </a:fld>
             <a:endParaRPr lang="en-US"/>
           </a:p>
@@ -6050,7 +6050,7 @@
           <a:p>
             <a:fld id="{F1FA7AC5-6045-4418-8E60-F48788734473}" type="datetimeFigureOut">
               <a:rPr lang="en-US" smtClean="0"/>
-              <a:t>12/4/2018</a:t>
+              <a:t>12/5/2018</a:t>
             </a:fld>
             <a:endParaRPr lang="en-US"/>
           </a:p>
@@ -6335,7 +6335,7 @@
           <a:p>
             <a:fld id="{F1FA7AC5-6045-4418-8E60-F48788734473}" type="datetimeFigureOut">
               <a:rPr lang="en-US" smtClean="0"/>
-              <a:t>12/4/2018</a:t>
+              <a:t>12/5/2018</a:t>
             </a:fld>
             <a:endParaRPr lang="en-US"/>
           </a:p>
@@ -7775,15 +7775,31 @@
             </a:r>
             <a:r>
               <a:rPr lang="en-US" sz="2400" dirty="0"/>
-              <a:t>: are centralized dispatchers to control concurrency, allowing us to coordinate when computation happens on e.g. </a:t>
-            </a:r>
-            <a:r>
-              <a:rPr lang="en-US" sz="2400" dirty="0" err="1"/>
+              <a:t>: are centralized dispatchers to control concurrency, allowing us to coordinate when computation </a:t>
+            </a:r>
+            <a:r>
+              <a:rPr lang="en-US" sz="2400" dirty="0" smtClean="0"/>
+              <a:t>happens; e.g.: </a:t>
+            </a:r>
+            <a:r>
+              <a:rPr lang="en-US" sz="2400" dirty="0" err="1" smtClean="0"/>
               <a:t>setTimeout</a:t>
             </a:r>
             <a:r>
+              <a:rPr lang="en-US" sz="2400" smtClean="0"/>
+              <a:t>()</a:t>
+            </a:r>
+            <a:r>
+              <a:rPr lang="en-US" sz="2400" smtClean="0"/>
+              <a:t>, </a:t>
+            </a:r>
+            <a:r>
+              <a:rPr lang="en-US" sz="2400" smtClean="0"/>
+              <a:t>interval(), </a:t>
+            </a:r>
+            <a:r>
               <a:rPr lang="en-US" sz="2400" dirty="0"/>
-              <a:t> or interval, etc</a:t>
+              <a:t>etc</a:t>
             </a:r>
             <a:r>
               <a:rPr lang="en-US" sz="2400" dirty="0" smtClean="0"/>
@@ -8421,11 +8437,7 @@
             </a:r>
             <a:r>
               <a:rPr lang="it-IT" dirty="0" smtClean="0"/>
-              <a:t> </a:t>
-            </a:r>
-            <a:r>
-              <a:rPr lang="it-IT" dirty="0" smtClean="0"/>
-              <a:t>«</a:t>
+              <a:t> «</a:t>
             </a:r>
             <a:r>
               <a:rPr lang="it-IT" dirty="0" err="1" smtClean="0"/>
@@ -8433,11 +8445,7 @@
             </a:r>
             <a:r>
               <a:rPr lang="it-IT" dirty="0" smtClean="0"/>
-              <a:t>» </a:t>
-            </a:r>
-            <a:r>
-              <a:rPr lang="it-IT" dirty="0" smtClean="0"/>
-              <a:t>an </a:t>
+              <a:t>» an </a:t>
             </a:r>
             <a:r>
               <a:rPr lang="it-IT" dirty="0" err="1" smtClean="0"/>
@@ -10467,7 +10475,6 @@
               <a:rPr lang="it-IT" dirty="0" smtClean="0"/>
               <a:t>.</a:t>
             </a:r>
-            <a:endParaRPr lang="it-IT" dirty="0" smtClean="0"/>
           </a:p>
           <a:p>
             <a:r>
@@ -11423,11 +11430,7 @@
             </a:r>
             <a:r>
               <a:rPr lang="it-IT" dirty="0" smtClean="0"/>
-              <a:t> </a:t>
-            </a:r>
-            <a:r>
-              <a:rPr lang="it-IT" dirty="0" smtClean="0"/>
-              <a:t>performance </a:t>
+              <a:t> performance </a:t>
             </a:r>
             <a:r>
               <a:rPr lang="it-IT" dirty="0" err="1" smtClean="0"/>
@@ -11886,11 +11889,7 @@
             </a:r>
             <a:r>
               <a:rPr lang="it-IT" dirty="0" smtClean="0"/>
-              <a:t> </a:t>
-            </a:r>
-            <a:r>
-              <a:rPr lang="it-IT" dirty="0" smtClean="0"/>
-              <a:t>Manifesto</a:t>
+              <a:t> Manifesto</a:t>
             </a:r>
             <a:r>
               <a:rPr lang="it-IT" dirty="0"/>
@@ -13196,11 +13195,7 @@
             </a:r>
             <a:r>
               <a:rPr lang="en-US" dirty="0" smtClean="0"/>
-              <a:t>‘value over time’ </a:t>
-            </a:r>
-            <a:r>
-              <a:rPr lang="en-US" dirty="0" smtClean="0"/>
-              <a:t>”. </a:t>
+              <a:t>‘value over time’ ”. </a:t>
             </a:r>
           </a:p>
           <a:p>
@@ -16208,7 +16203,7 @@
   <a:extraClrSchemeLst/>
   <a:extLst>
     <a:ext uri="{05A4C25C-085E-4340-85A3-A5531E510DB2}">
-      <thm15:themeFamily xmlns:thm15="http://schemas.microsoft.com/office/thememl/2012/main" xmlns="" name="Retrospect" id="{5F128B03-DCCA-4EEB-AB3B-CF2899314A46}" vid="{9CC26709-368C-4D72-9060-94E5B3FF3CD6}"/>
+      <thm15:themeFamily xmlns="" xmlns:thm15="http://schemas.microsoft.com/office/thememl/2012/main" name="Retrospect" id="{5F128B03-DCCA-4EEB-AB3B-CF2899314A46}" vid="{9CC26709-368C-4D72-9060-94E5B3FF3CD6}"/>
     </a:ext>
   </a:extLst>
 </a:theme>
@@ -16503,7 +16498,7 @@
   <a:extraClrSchemeLst/>
   <a:extLst>
     <a:ext uri="{05A4C25C-085E-4340-85A3-A5531E510DB2}">
-      <thm15:themeFamily xmlns:thm15="http://schemas.microsoft.com/office/thememl/2012/main" xmlns="" name="Office Theme" id="{62F939B6-93AF-4DB8-9C6B-D6C7DFDC589F}" vid="{4A3C46E8-61CC-4603-A589-7422A47A8E4A}"/>
+      <thm15:themeFamily xmlns="" xmlns:thm15="http://schemas.microsoft.com/office/thememl/2012/main" name="Office Theme" id="{62F939B6-93AF-4DB8-9C6B-D6C7DFDC589F}" vid="{4A3C46E8-61CC-4603-A589-7422A47A8E4A}"/>
     </a:ext>
   </a:extLst>
 </a:theme>

</xml_diff>

<commit_message>
updated node sample and slides
</commit_message>
<xml_diff>
--- a/ReactiveProgramming_RxJS.pptx
+++ b/ReactiveProgramming_RxJS.pptx
@@ -141,7 +141,7 @@
   </p:defaultTextStyle>
   <p:extLst>
     <p:ext uri="{EFAFB233-063F-42B5-8137-9DF3F51BA10A}">
-      <p15:sldGuideLst xmlns="" xmlns:p15="http://schemas.microsoft.com/office/powerpoint/2012/main"/>
+      <p15:sldGuideLst xmlns:p15="http://schemas.microsoft.com/office/powerpoint/2012/main" xmlns=""/>
     </p:ext>
   </p:extLst>
 </p:presentation>
@@ -229,7 +229,7 @@
           <a:p>
             <a:fld id="{327B5F9E-84DB-4811-8F56-9C65E911095D}" type="datetimeFigureOut">
               <a:rPr lang="it-IT" smtClean="0"/>
-              <a:t>05/12/2018</a:t>
+              <a:t>25/05/2020</a:t>
             </a:fld>
             <a:endParaRPr lang="it-IT"/>
           </a:p>
@@ -394,7 +394,7 @@
           <a:p>
             <a:fld id="{60073984-6E99-4D80-ADB1-BFDA0D866557}" type="datetimeFigureOut">
               <a:rPr lang="en-US"/>
-              <a:t>12/5/2018</a:t>
+              <a:t>5/25/2020</a:t>
             </a:fld>
             <a:endParaRPr lang="en-US"/>
           </a:p>
@@ -3410,7 +3410,7 @@
           <a:p>
             <a:fld id="{F1FA7AC5-6045-4418-8E60-F48788734473}" type="datetimeFigureOut">
               <a:rPr lang="en-US" smtClean="0"/>
-              <a:t>12/5/2018</a:t>
+              <a:t>5/25/2020</a:t>
             </a:fld>
             <a:endParaRPr lang="en-US"/>
           </a:p>
@@ -3623,7 +3623,7 @@
           <a:p>
             <a:fld id="{F1FA7AC5-6045-4418-8E60-F48788734473}" type="datetimeFigureOut">
               <a:rPr lang="en-US" smtClean="0"/>
-              <a:t>12/5/2018</a:t>
+              <a:t>5/25/2020</a:t>
             </a:fld>
             <a:endParaRPr lang="en-US"/>
           </a:p>
@@ -3877,7 +3877,7 @@
           <a:p>
             <a:fld id="{F1FA7AC5-6045-4418-8E60-F48788734473}" type="datetimeFigureOut">
               <a:rPr lang="en-US" smtClean="0"/>
-              <a:t>12/5/2018</a:t>
+              <a:t>5/25/2020</a:t>
             </a:fld>
             <a:endParaRPr lang="en-US"/>
           </a:p>
@@ -4045,7 +4045,7 @@
           <a:p>
             <a:fld id="{F1FA7AC5-6045-4418-8E60-F48788734473}" type="datetimeFigureOut">
               <a:rPr lang="en-US" smtClean="0"/>
-              <a:t>12/5/2018</a:t>
+              <a:t>5/25/2020</a:t>
             </a:fld>
             <a:endParaRPr lang="en-US"/>
           </a:p>
@@ -4387,7 +4387,7 @@
           <a:p>
             <a:fld id="{F1FA7AC5-6045-4418-8E60-F48788734473}" type="datetimeFigureOut">
               <a:rPr lang="en-US" smtClean="0"/>
-              <a:t>12/5/2018</a:t>
+              <a:t>5/25/2020</a:t>
             </a:fld>
             <a:endParaRPr lang="en-US"/>
           </a:p>
@@ -4659,7 +4659,7 @@
           <a:p>
             <a:fld id="{F1FA7AC5-6045-4418-8E60-F48788734473}" type="datetimeFigureOut">
               <a:rPr lang="en-US" smtClean="0"/>
-              <a:t>12/5/2018</a:t>
+              <a:t>5/25/2020</a:t>
             </a:fld>
             <a:endParaRPr lang="en-US"/>
           </a:p>
@@ -5035,7 +5035,7 @@
           <a:p>
             <a:fld id="{F1FA7AC5-6045-4418-8E60-F48788734473}" type="datetimeFigureOut">
               <a:rPr lang="en-US" smtClean="0"/>
-              <a:t>12/5/2018</a:t>
+              <a:t>5/25/2020</a:t>
             </a:fld>
             <a:endParaRPr lang="en-US"/>
           </a:p>
@@ -5152,7 +5152,7 @@
           <a:p>
             <a:fld id="{F1FA7AC5-6045-4418-8E60-F48788734473}" type="datetimeFigureOut">
               <a:rPr lang="en-US" smtClean="0"/>
-              <a:t>12/5/2018</a:t>
+              <a:t>5/25/2020</a:t>
             </a:fld>
             <a:endParaRPr lang="en-US"/>
           </a:p>
@@ -5323,7 +5323,7 @@
           <a:p>
             <a:fld id="{F1FA7AC5-6045-4418-8E60-F48788734473}" type="datetimeFigureOut">
               <a:rPr lang="en-US" smtClean="0"/>
-              <a:t>12/5/2018</a:t>
+              <a:t>5/25/2020</a:t>
             </a:fld>
             <a:endParaRPr lang="en-US"/>
           </a:p>
@@ -5675,7 +5675,7 @@
           <a:p>
             <a:fld id="{F1FA7AC5-6045-4418-8E60-F48788734473}" type="datetimeFigureOut">
               <a:rPr lang="en-US" smtClean="0"/>
-              <a:t>12/5/2018</a:t>
+              <a:t>5/25/2020</a:t>
             </a:fld>
             <a:endParaRPr lang="en-US"/>
           </a:p>
@@ -6050,7 +6050,7 @@
           <a:p>
             <a:fld id="{F1FA7AC5-6045-4418-8E60-F48788734473}" type="datetimeFigureOut">
               <a:rPr lang="en-US" smtClean="0"/>
-              <a:t>12/5/2018</a:t>
+              <a:t>5/25/2020</a:t>
             </a:fld>
             <a:endParaRPr lang="en-US"/>
           </a:p>
@@ -6335,7 +6335,7 @@
           <a:p>
             <a:fld id="{F1FA7AC5-6045-4418-8E60-F48788734473}" type="datetimeFigureOut">
               <a:rPr lang="en-US" smtClean="0"/>
-              <a:t>12/5/2018</a:t>
+              <a:t>5/25/2020</a:t>
             </a:fld>
             <a:endParaRPr lang="en-US"/>
           </a:p>
@@ -7746,7 +7746,15 @@
             </a:r>
             <a:r>
               <a:rPr lang="en-US" sz="2400" dirty="0"/>
-              <a:t>a value or event to multiple Observers</a:t>
+              <a:t>a value </a:t>
+            </a:r>
+            <a:r>
+              <a:rPr lang="en-US" sz="2400" dirty="0" smtClean="0"/>
+              <a:t>(or event) </a:t>
+            </a:r>
+            <a:r>
+              <a:rPr lang="en-US" sz="2400" dirty="0"/>
+              <a:t>to multiple Observers</a:t>
             </a:r>
             <a:r>
               <a:rPr lang="en-US" sz="2400" dirty="0" smtClean="0"/>
@@ -7786,16 +7794,8 @@
               <a:t>setTimeout</a:t>
             </a:r>
             <a:r>
-              <a:rPr lang="en-US" sz="2400" smtClean="0"/>
-              <a:t>()</a:t>
-            </a:r>
-            <a:r>
-              <a:rPr lang="en-US" sz="2400" smtClean="0"/>
-              <a:t>, </a:t>
-            </a:r>
-            <a:r>
-              <a:rPr lang="en-US" sz="2400" smtClean="0"/>
-              <a:t>interval(), </a:t>
+              <a:rPr lang="en-US" sz="2400" dirty="0" smtClean="0"/>
+              <a:t>(), interval(), </a:t>
             </a:r>
             <a:r>
               <a:rPr lang="en-US" sz="2400" dirty="0"/>
@@ -8264,7 +8264,7 @@
             </a:r>
             <a:r>
               <a:rPr lang="it-IT" dirty="0" err="1" smtClean="0"/>
-              <a:t>value</a:t>
+              <a:t>values</a:t>
             </a:r>
             <a:r>
               <a:rPr lang="it-IT" dirty="0" smtClean="0"/>
@@ -9068,19 +9068,11 @@
           <a:p>
             <a:r>
               <a:rPr lang="it-IT" dirty="0" err="1" smtClean="0"/>
-              <a:t>When</a:t>
-            </a:r>
-            <a:r>
-              <a:rPr lang="it-IT" dirty="0" smtClean="0"/>
-              <a:t> </a:t>
-            </a:r>
-            <a:r>
-              <a:rPr lang="it-IT" dirty="0" err="1" smtClean="0"/>
-              <a:t>you</a:t>
-            </a:r>
-            <a:r>
-              <a:rPr lang="it-IT" dirty="0" smtClean="0"/>
-              <a:t> look for </a:t>
+              <a:t>Looking</a:t>
+            </a:r>
+            <a:r>
+              <a:rPr lang="it-IT" dirty="0" smtClean="0"/>
+              <a:t> for </a:t>
             </a:r>
             <a:r>
               <a:rPr lang="it-IT" dirty="0" err="1" smtClean="0"/>
@@ -9524,8 +9516,41 @@
             </a:r>
             <a:r>
               <a:rPr lang="it-IT" sz="2800" dirty="0" smtClean="0"/>
-              <a:t>.</a:t>
-            </a:r>
+              <a:t> and in state management </a:t>
+            </a:r>
+            <a:r>
+              <a:rPr lang="it-IT" sz="2800" dirty="0" err="1" smtClean="0"/>
+              <a:t>libraries</a:t>
+            </a:r>
+            <a:r>
+              <a:rPr lang="it-IT" sz="2800" dirty="0" smtClean="0"/>
+              <a:t> </a:t>
+            </a:r>
+            <a:r>
+              <a:rPr lang="it-IT" sz="2800" dirty="0" err="1" smtClean="0"/>
+              <a:t>that</a:t>
+            </a:r>
+            <a:r>
+              <a:rPr lang="it-IT" sz="2800" dirty="0" smtClean="0"/>
+              <a:t> </a:t>
+            </a:r>
+            <a:r>
+              <a:rPr lang="it-IT" sz="2800" dirty="0" err="1" smtClean="0"/>
+              <a:t>follow</a:t>
+            </a:r>
+            <a:r>
+              <a:rPr lang="it-IT" sz="2800" dirty="0" smtClean="0"/>
+              <a:t> the </a:t>
+            </a:r>
+            <a:r>
+              <a:rPr lang="it-IT" sz="2800" dirty="0" err="1" smtClean="0"/>
+              <a:t>Redux</a:t>
+            </a:r>
+            <a:r>
+              <a:rPr lang="it-IT" sz="2800" dirty="0" smtClean="0"/>
+              <a:t> pattern.</a:t>
+            </a:r>
+            <a:endParaRPr lang="it-IT" sz="2800" dirty="0" smtClean="0"/>
           </a:p>
           <a:p>
             <a:endParaRPr lang="it-IT" sz="2800" dirty="0" smtClean="0"/>
@@ -9988,6 +10013,10 @@
             <a:r>
               <a:rPr lang="it-IT" sz="2800" dirty="0" smtClean="0"/>
               <a:t> way) </a:t>
+            </a:r>
+            <a:r>
+              <a:rPr lang="it-IT" sz="2800" dirty="0" smtClean="0"/>
+              <a:t>use </a:t>
             </a:r>
             <a:r>
               <a:rPr lang="it-IT" sz="2800" b="1" dirty="0" err="1" smtClean="0">
@@ -12402,7 +12431,7 @@
           <a:p>
             <a:r>
               <a:rPr lang="en-US" dirty="0" smtClean="0"/>
-              <a:t>… more paragraphs explaining the thing …</a:t>
+              <a:t>(… more paragraphs explaining the thing …)</a:t>
             </a:r>
             <a:endParaRPr lang="it-IT" dirty="0"/>
           </a:p>
@@ -13254,7 +13283,7 @@
           <a:p>
             <a:r>
               <a:rPr lang="en-US" dirty="0" smtClean="0"/>
-              <a:t>… more paragraphs explaining the thing …</a:t>
+              <a:t>(… more paragraphs explaining the thing …)</a:t>
             </a:r>
             <a:endParaRPr lang="it-IT" dirty="0"/>
           </a:p>
@@ -14058,230 +14087,224 @@
             <a:pPr marL="0" indent="0">
               <a:buNone/>
             </a:pPr>
-            <a:endParaRPr lang="it-IT" dirty="0" smtClean="0"/>
+            <a:r>
+              <a:rPr lang="it-IT" sz="3200" dirty="0" err="1" smtClean="0"/>
+              <a:t>If</a:t>
+            </a:r>
+            <a:r>
+              <a:rPr lang="it-IT" sz="3200" dirty="0" smtClean="0"/>
+              <a:t> </a:t>
+            </a:r>
+            <a:r>
+              <a:rPr lang="it-IT" sz="3200" dirty="0" err="1" smtClean="0"/>
+              <a:t>we</a:t>
+            </a:r>
+            <a:r>
+              <a:rPr lang="it-IT" sz="3200" dirty="0" smtClean="0"/>
+              <a:t> </a:t>
+            </a:r>
+            <a:r>
+              <a:rPr lang="it-IT" sz="3200" dirty="0" err="1" smtClean="0"/>
+              <a:t>build</a:t>
+            </a:r>
+            <a:r>
+              <a:rPr lang="it-IT" sz="3200" dirty="0" smtClean="0"/>
+              <a:t> </a:t>
+            </a:r>
+            <a:r>
+              <a:rPr lang="it-IT" sz="3200" dirty="0" err="1" smtClean="0"/>
+              <a:t>our</a:t>
+            </a:r>
+            <a:r>
+              <a:rPr lang="it-IT" sz="3200" dirty="0" smtClean="0"/>
+              <a:t> </a:t>
+            </a:r>
+            <a:r>
+              <a:rPr lang="it-IT" sz="3200" dirty="0" err="1" smtClean="0"/>
+              <a:t>system</a:t>
+            </a:r>
+            <a:r>
+              <a:rPr lang="it-IT" sz="3200" dirty="0" smtClean="0"/>
+              <a:t> / </a:t>
+            </a:r>
+            <a:r>
+              <a:rPr lang="it-IT" sz="3200" dirty="0" err="1" smtClean="0"/>
+              <a:t>applications</a:t>
+            </a:r>
+            <a:r>
+              <a:rPr lang="it-IT" sz="3200" dirty="0" smtClean="0"/>
+              <a:t> </a:t>
+            </a:r>
+            <a:r>
+              <a:rPr lang="it-IT" sz="3200" dirty="0" err="1" smtClean="0"/>
+              <a:t>around</a:t>
+            </a:r>
+            <a:r>
+              <a:rPr lang="it-IT" sz="3200" dirty="0" smtClean="0"/>
+              <a:t> the </a:t>
+            </a:r>
+            <a:r>
+              <a:rPr lang="it-IT" sz="3200" dirty="0" err="1" smtClean="0"/>
+              <a:t>concept</a:t>
+            </a:r>
+            <a:r>
+              <a:rPr lang="it-IT" sz="3200" dirty="0" smtClean="0"/>
+              <a:t> of </a:t>
+            </a:r>
+            <a:r>
+              <a:rPr lang="it-IT" sz="3200" dirty="0" err="1" smtClean="0"/>
+              <a:t>messages</a:t>
+            </a:r>
+            <a:r>
+              <a:rPr lang="it-IT" sz="3200" dirty="0" smtClean="0"/>
+              <a:t> </a:t>
+            </a:r>
+            <a:r>
+              <a:rPr lang="it-IT" sz="3200" dirty="0" err="1" smtClean="0"/>
+              <a:t>coming</a:t>
+            </a:r>
+            <a:r>
+              <a:rPr lang="it-IT" sz="3200" dirty="0" smtClean="0"/>
+              <a:t> over time </a:t>
+            </a:r>
+            <a:r>
+              <a:rPr lang="it-IT" sz="3200" dirty="0" err="1" smtClean="0"/>
+              <a:t>we</a:t>
+            </a:r>
+            <a:r>
+              <a:rPr lang="it-IT" sz="3200" dirty="0" smtClean="0"/>
+              <a:t> can </a:t>
+            </a:r>
+            <a:r>
+              <a:rPr lang="it-IT" sz="3200" dirty="0" err="1" smtClean="0"/>
+              <a:t>achieve</a:t>
+            </a:r>
+            <a:r>
+              <a:rPr lang="it-IT" sz="3200" dirty="0" smtClean="0"/>
+              <a:t> </a:t>
+            </a:r>
+            <a:r>
+              <a:rPr lang="it-IT" sz="3200" dirty="0" err="1" smtClean="0"/>
+              <a:t>what</a:t>
+            </a:r>
+            <a:r>
+              <a:rPr lang="it-IT" sz="3200" dirty="0" smtClean="0"/>
+              <a:t> </a:t>
+            </a:r>
+            <a:r>
+              <a:rPr lang="it-IT" sz="3200" dirty="0" err="1" smtClean="0"/>
+              <a:t>is</a:t>
+            </a:r>
+            <a:r>
+              <a:rPr lang="it-IT" sz="3200" dirty="0" smtClean="0"/>
+              <a:t> </a:t>
+            </a:r>
+            <a:r>
+              <a:rPr lang="it-IT" sz="3200" dirty="0" err="1" smtClean="0"/>
+              <a:t>summarized</a:t>
+            </a:r>
+            <a:r>
+              <a:rPr lang="it-IT" sz="3200" dirty="0" smtClean="0"/>
+              <a:t> by the </a:t>
+            </a:r>
+            <a:r>
+              <a:rPr lang="it-IT" sz="3200" dirty="0" err="1" smtClean="0"/>
+              <a:t>reactive</a:t>
+            </a:r>
+            <a:r>
+              <a:rPr lang="it-IT" sz="3200" dirty="0" smtClean="0"/>
+              <a:t> manifesto!</a:t>
+            </a:r>
+          </a:p>
+          <a:p>
+            <a:endParaRPr lang="it-IT" sz="3200" dirty="0" smtClean="0"/>
           </a:p>
           <a:p>
             <a:pPr marL="0" indent="0">
               <a:buNone/>
             </a:pPr>
             <a:r>
-              <a:rPr lang="it-IT" dirty="0" err="1" smtClean="0"/>
-              <a:t>If</a:t>
-            </a:r>
-            <a:r>
-              <a:rPr lang="it-IT" dirty="0" smtClean="0"/>
+              <a:rPr lang="it-IT" sz="3200" dirty="0" smtClean="0"/>
+              <a:t>The </a:t>
+            </a:r>
+            <a:r>
+              <a:rPr lang="it-IT" sz="3200" dirty="0" err="1" smtClean="0"/>
+              <a:t>reactive</a:t>
+            </a:r>
+            <a:r>
+              <a:rPr lang="it-IT" sz="3200" dirty="0" smtClean="0"/>
+              <a:t> manifesto </a:t>
+            </a:r>
+            <a:r>
+              <a:rPr lang="it-IT" sz="3200" dirty="0" err="1" smtClean="0"/>
+              <a:t>gives</a:t>
+            </a:r>
+            <a:r>
+              <a:rPr lang="it-IT" sz="3200" dirty="0" smtClean="0"/>
               <a:t> </a:t>
             </a:r>
             <a:r>
-              <a:rPr lang="it-IT" dirty="0" err="1" smtClean="0"/>
-              <a:t>we</a:t>
-            </a:r>
-            <a:r>
-              <a:rPr lang="it-IT" dirty="0" smtClean="0"/>
+              <a:rPr lang="it-IT" sz="3200" dirty="0" err="1" smtClean="0"/>
+              <a:t>us</a:t>
+            </a:r>
+            <a:r>
+              <a:rPr lang="it-IT" sz="3200" dirty="0" smtClean="0"/>
+              <a:t> a </a:t>
+            </a:r>
+            <a:r>
+              <a:rPr lang="it-IT" sz="3200" dirty="0" err="1" smtClean="0"/>
+              <a:t>clear</a:t>
+            </a:r>
+            <a:r>
+              <a:rPr lang="it-IT" sz="3200" dirty="0" smtClean="0"/>
               <a:t> </a:t>
             </a:r>
             <a:r>
-              <a:rPr lang="it-IT" dirty="0" err="1" smtClean="0"/>
-              <a:t>build</a:t>
-            </a:r>
-            <a:r>
-              <a:rPr lang="it-IT" dirty="0" smtClean="0"/>
+              <a:rPr lang="it-IT" sz="3200" dirty="0" err="1" smtClean="0"/>
+              <a:t>picture</a:t>
+            </a:r>
+            <a:r>
+              <a:rPr lang="it-IT" sz="3200" dirty="0" smtClean="0"/>
+              <a:t> of the </a:t>
+            </a:r>
+            <a:r>
+              <a:rPr lang="it-IT" sz="3200" dirty="0" err="1" smtClean="0"/>
+              <a:t>features</a:t>
+            </a:r>
+            <a:r>
+              <a:rPr lang="it-IT" sz="3200" dirty="0" smtClean="0"/>
+              <a:t> and the benefits </a:t>
+            </a:r>
+            <a:r>
+              <a:rPr lang="it-IT" sz="3200" dirty="0" err="1" smtClean="0"/>
+              <a:t>that</a:t>
+            </a:r>
+            <a:r>
+              <a:rPr lang="it-IT" sz="3200" dirty="0" smtClean="0"/>
               <a:t> </a:t>
             </a:r>
             <a:r>
-              <a:rPr lang="it-IT" dirty="0" err="1" smtClean="0"/>
-              <a:t>our</a:t>
-            </a:r>
-            <a:r>
-              <a:rPr lang="it-IT" dirty="0" smtClean="0"/>
+              <a:rPr lang="it-IT" sz="3200" dirty="0" err="1" smtClean="0"/>
+              <a:t>reactive</a:t>
+            </a:r>
+            <a:r>
+              <a:rPr lang="it-IT" sz="3200" dirty="0" smtClean="0"/>
               <a:t> </a:t>
             </a:r>
             <a:r>
-              <a:rPr lang="it-IT" dirty="0" err="1" smtClean="0"/>
-              <a:t>system</a:t>
-            </a:r>
-            <a:r>
-              <a:rPr lang="it-IT" dirty="0" smtClean="0"/>
-              <a:t> / </a:t>
-            </a:r>
-            <a:r>
-              <a:rPr lang="it-IT" dirty="0" err="1" smtClean="0"/>
-              <a:t>application</a:t>
-            </a:r>
-            <a:r>
-              <a:rPr lang="it-IT" dirty="0" smtClean="0"/>
+              <a:rPr lang="it-IT" sz="3200" dirty="0" err="1" smtClean="0"/>
+              <a:t>systems</a:t>
+            </a:r>
+            <a:r>
+              <a:rPr lang="it-IT" sz="3200" dirty="0" smtClean="0"/>
               <a:t> </a:t>
             </a:r>
             <a:r>
-              <a:rPr lang="it-IT" dirty="0" err="1" smtClean="0"/>
-              <a:t>around</a:t>
-            </a:r>
-            <a:r>
-              <a:rPr lang="it-IT" dirty="0" smtClean="0"/>
-              <a:t> the </a:t>
-            </a:r>
-            <a:r>
-              <a:rPr lang="it-IT" dirty="0" err="1" smtClean="0"/>
-              <a:t>concept</a:t>
-            </a:r>
-            <a:r>
-              <a:rPr lang="it-IT" dirty="0" smtClean="0"/>
-              <a:t> of </a:t>
-            </a:r>
-            <a:r>
-              <a:rPr lang="it-IT" dirty="0" err="1" smtClean="0"/>
-              <a:t>messages</a:t>
-            </a:r>
-            <a:r>
-              <a:rPr lang="it-IT" dirty="0" smtClean="0"/>
-              <a:t> </a:t>
-            </a:r>
-            <a:r>
-              <a:rPr lang="it-IT" dirty="0" err="1" smtClean="0"/>
-              <a:t>coming</a:t>
-            </a:r>
-            <a:r>
-              <a:rPr lang="it-IT" dirty="0" smtClean="0"/>
-              <a:t> over time </a:t>
-            </a:r>
-            <a:r>
-              <a:rPr lang="it-IT" dirty="0" err="1" smtClean="0"/>
-              <a:t>we</a:t>
-            </a:r>
-            <a:r>
-              <a:rPr lang="it-IT" dirty="0" smtClean="0"/>
-              <a:t> can </a:t>
-            </a:r>
-            <a:r>
-              <a:rPr lang="it-IT" dirty="0" err="1" smtClean="0"/>
-              <a:t>achieve</a:t>
-            </a:r>
-            <a:r>
-              <a:rPr lang="it-IT" dirty="0" smtClean="0"/>
-              <a:t> </a:t>
-            </a:r>
-            <a:r>
-              <a:rPr lang="it-IT" dirty="0" err="1" smtClean="0"/>
-              <a:t>what</a:t>
-            </a:r>
-            <a:r>
-              <a:rPr lang="it-IT" dirty="0" smtClean="0"/>
-              <a:t> </a:t>
-            </a:r>
-            <a:r>
-              <a:rPr lang="it-IT" dirty="0" err="1" smtClean="0"/>
-              <a:t>is</a:t>
-            </a:r>
-            <a:r>
-              <a:rPr lang="it-IT" dirty="0" smtClean="0"/>
-              <a:t> </a:t>
-            </a:r>
-            <a:r>
-              <a:rPr lang="it-IT" dirty="0" err="1" smtClean="0"/>
-              <a:t>summarized</a:t>
-            </a:r>
-            <a:r>
-              <a:rPr lang="it-IT" dirty="0" smtClean="0"/>
-              <a:t> by the </a:t>
-            </a:r>
-            <a:r>
-              <a:rPr lang="it-IT" dirty="0" err="1" smtClean="0"/>
-              <a:t>reactive</a:t>
-            </a:r>
-            <a:r>
-              <a:rPr lang="it-IT" dirty="0" smtClean="0"/>
-              <a:t> manifesto!</a:t>
-            </a:r>
-          </a:p>
-          <a:p>
-            <a:endParaRPr lang="it-IT" dirty="0" smtClean="0"/>
-          </a:p>
-          <a:p>
-            <a:pPr marL="0" indent="0">
-              <a:buNone/>
-            </a:pPr>
-            <a:r>
-              <a:rPr lang="it-IT" dirty="0" smtClean="0"/>
-              <a:t>The </a:t>
-            </a:r>
-            <a:r>
-              <a:rPr lang="it-IT" dirty="0" err="1" smtClean="0"/>
-              <a:t>reactive</a:t>
-            </a:r>
-            <a:r>
-              <a:rPr lang="it-IT" dirty="0" smtClean="0"/>
-              <a:t> manifesto </a:t>
-            </a:r>
-            <a:r>
-              <a:rPr lang="it-IT" dirty="0" err="1" smtClean="0"/>
-              <a:t>gives</a:t>
-            </a:r>
-            <a:r>
-              <a:rPr lang="it-IT" dirty="0" smtClean="0"/>
-              <a:t> </a:t>
-            </a:r>
-            <a:r>
-              <a:rPr lang="it-IT" dirty="0" err="1" smtClean="0"/>
-              <a:t>us</a:t>
-            </a:r>
-            <a:r>
-              <a:rPr lang="it-IT" dirty="0" smtClean="0"/>
-              <a:t> a </a:t>
-            </a:r>
-            <a:r>
-              <a:rPr lang="it-IT" dirty="0" err="1" smtClean="0"/>
-              <a:t>clear</a:t>
-            </a:r>
-            <a:r>
-              <a:rPr lang="it-IT" dirty="0" smtClean="0"/>
-              <a:t> </a:t>
-            </a:r>
-            <a:r>
-              <a:rPr lang="it-IT" dirty="0" err="1" smtClean="0"/>
-              <a:t>picture</a:t>
-            </a:r>
-            <a:r>
-              <a:rPr lang="it-IT" dirty="0" smtClean="0"/>
-              <a:t> of the </a:t>
-            </a:r>
-            <a:r>
-              <a:rPr lang="it-IT" dirty="0" err="1" smtClean="0"/>
-              <a:t>features</a:t>
-            </a:r>
-            <a:r>
-              <a:rPr lang="it-IT" dirty="0" smtClean="0"/>
-              <a:t> and the benefits </a:t>
-            </a:r>
-            <a:r>
-              <a:rPr lang="it-IT" dirty="0" err="1" smtClean="0"/>
-              <a:t>that</a:t>
-            </a:r>
-            <a:r>
-              <a:rPr lang="it-IT" dirty="0" smtClean="0"/>
-              <a:t> </a:t>
-            </a:r>
-            <a:r>
-              <a:rPr lang="it-IT" dirty="0" err="1" smtClean="0"/>
-              <a:t>reactive</a:t>
-            </a:r>
-            <a:r>
-              <a:rPr lang="it-IT" dirty="0" smtClean="0"/>
-              <a:t> </a:t>
-            </a:r>
-            <a:r>
-              <a:rPr lang="it-IT" dirty="0" err="1" smtClean="0"/>
-              <a:t>systems</a:t>
-            </a:r>
-            <a:r>
-              <a:rPr lang="it-IT" dirty="0" smtClean="0"/>
-              <a:t> </a:t>
-            </a:r>
-            <a:r>
-              <a:rPr lang="it-IT" dirty="0" err="1" smtClean="0"/>
+              <a:rPr lang="it-IT" sz="3200" dirty="0" err="1" smtClean="0"/>
               <a:t>have</a:t>
             </a:r>
             <a:r>
-              <a:rPr lang="it-IT" dirty="0" smtClean="0"/>
+              <a:rPr lang="it-IT" sz="3200" dirty="0" smtClean="0"/>
               <a:t>.</a:t>
             </a:r>
           </a:p>
@@ -16203,7 +16226,7 @@
   <a:extraClrSchemeLst/>
   <a:extLst>
     <a:ext uri="{05A4C25C-085E-4340-85A3-A5531E510DB2}">
-      <thm15:themeFamily xmlns="" xmlns:thm15="http://schemas.microsoft.com/office/thememl/2012/main" name="Retrospect" id="{5F128B03-DCCA-4EEB-AB3B-CF2899314A46}" vid="{9CC26709-368C-4D72-9060-94E5B3FF3CD6}"/>
+      <thm15:themeFamily xmlns:thm15="http://schemas.microsoft.com/office/thememl/2012/main" xmlns="" name="Retrospect" id="{5F128B03-DCCA-4EEB-AB3B-CF2899314A46}" vid="{9CC26709-368C-4D72-9060-94E5B3FF3CD6}"/>
     </a:ext>
   </a:extLst>
 </a:theme>
@@ -16498,7 +16521,7 @@
   <a:extraClrSchemeLst/>
   <a:extLst>
     <a:ext uri="{05A4C25C-085E-4340-85A3-A5531E510DB2}">
-      <thm15:themeFamily xmlns="" xmlns:thm15="http://schemas.microsoft.com/office/thememl/2012/main" name="Office Theme" id="{62F939B6-93AF-4DB8-9C6B-D6C7DFDC589F}" vid="{4A3C46E8-61CC-4603-A589-7422A47A8E4A}"/>
+      <thm15:themeFamily xmlns:thm15="http://schemas.microsoft.com/office/thememl/2012/main" xmlns="" name="Office Theme" id="{62F939B6-93AF-4DB8-9C6B-D6C7DFDC589F}" vid="{4A3C46E8-61CC-4603-A589-7422A47A8E4A}"/>
     </a:ext>
   </a:extLst>
 </a:theme>

</xml_diff>

<commit_message>
Updated libs and samples
</commit_message>
<xml_diff>
--- a/ReactiveProgramming_RxJS.pptx
+++ b/ReactiveProgramming_RxJS.pptx
@@ -175,6 +175,7 @@
 <file path=ppt/revisionInfo.xml><?xml version="1.0" encoding="utf-8"?>
 <p1510:revInfo xmlns:a="http://schemas.openxmlformats.org/drawingml/2006/main" xmlns:r="http://schemas.openxmlformats.org/officeDocument/2006/relationships" xmlns:p1510="http://schemas.microsoft.com/office/powerpoint/2015/10/main">
   <p1510:revLst>
+    <p1510:client id="{23A54F07-80E2-44E9-AC9F-C20D33936091}" v="28" dt="2023-11-28T21:23:17.262"/>
     <p1510:client id="{66574AF1-BD74-4221-907B-632CC101DA1D}" v="14" dt="2023-05-16T17:41:14.246"/>
   </p1510:revLst>
 </p1510:revInfo>
@@ -235,6 +236,75 @@
       </pc:sldChg>
     </pc:docChg>
   </pc:docChgLst>
+  <pc:docChgLst>
+    <pc:chgData name="Alessandro Giorgetti" userId="332e11a8ec89c5cd" providerId="Windows Live" clId="Web-{23A54F07-80E2-44E9-AC9F-C20D33936091}"/>
+    <pc:docChg chg="modSld">
+      <pc:chgData name="Alessandro Giorgetti" userId="332e11a8ec89c5cd" providerId="Windows Live" clId="Web-{23A54F07-80E2-44E9-AC9F-C20D33936091}" dt="2023-11-28T21:23:17.262" v="27" actId="20577"/>
+      <pc:docMkLst>
+        <pc:docMk/>
+      </pc:docMkLst>
+      <pc:sldChg chg="modSp">
+        <pc:chgData name="Alessandro Giorgetti" userId="332e11a8ec89c5cd" providerId="Windows Live" clId="Web-{23A54F07-80E2-44E9-AC9F-C20D33936091}" dt="2023-11-28T21:15:55.581" v="7" actId="20577"/>
+        <pc:sldMkLst>
+          <pc:docMk/>
+          <pc:sldMk cId="3130042911" sldId="420"/>
+        </pc:sldMkLst>
+        <pc:spChg chg="mod">
+          <ac:chgData name="Alessandro Giorgetti" userId="332e11a8ec89c5cd" providerId="Windows Live" clId="Web-{23A54F07-80E2-44E9-AC9F-C20D33936091}" dt="2023-11-28T21:15:55.581" v="7" actId="20577"/>
+          <ac:spMkLst>
+            <pc:docMk/>
+            <pc:sldMk cId="3130042911" sldId="420"/>
+            <ac:spMk id="3" creationId="{00000000-0000-0000-0000-000000000000}"/>
+          </ac:spMkLst>
+        </pc:spChg>
+      </pc:sldChg>
+      <pc:sldChg chg="modSp">
+        <pc:chgData name="Alessandro Giorgetti" userId="332e11a8ec89c5cd" providerId="Windows Live" clId="Web-{23A54F07-80E2-44E9-AC9F-C20D33936091}" dt="2023-11-28T21:20:35.618" v="10" actId="20577"/>
+        <pc:sldMkLst>
+          <pc:docMk/>
+          <pc:sldMk cId="1728736343" sldId="429"/>
+        </pc:sldMkLst>
+        <pc:spChg chg="mod">
+          <ac:chgData name="Alessandro Giorgetti" userId="332e11a8ec89c5cd" providerId="Windows Live" clId="Web-{23A54F07-80E2-44E9-AC9F-C20D33936091}" dt="2023-11-28T21:20:35.618" v="10" actId="20577"/>
+          <ac:spMkLst>
+            <pc:docMk/>
+            <pc:sldMk cId="1728736343" sldId="429"/>
+            <ac:spMk id="3" creationId="{00000000-0000-0000-0000-000000000000}"/>
+          </ac:spMkLst>
+        </pc:spChg>
+      </pc:sldChg>
+      <pc:sldChg chg="modSp">
+        <pc:chgData name="Alessandro Giorgetti" userId="332e11a8ec89c5cd" providerId="Windows Live" clId="Web-{23A54F07-80E2-44E9-AC9F-C20D33936091}" dt="2023-11-28T21:21:56.214" v="25" actId="20577"/>
+        <pc:sldMkLst>
+          <pc:docMk/>
+          <pc:sldMk cId="2770691382" sldId="442"/>
+        </pc:sldMkLst>
+        <pc:spChg chg="mod">
+          <ac:chgData name="Alessandro Giorgetti" userId="332e11a8ec89c5cd" providerId="Windows Live" clId="Web-{23A54F07-80E2-44E9-AC9F-C20D33936091}" dt="2023-11-28T21:21:56.214" v="25" actId="20577"/>
+          <ac:spMkLst>
+            <pc:docMk/>
+            <pc:sldMk cId="2770691382" sldId="442"/>
+            <ac:spMk id="4" creationId="{00000000-0000-0000-0000-000000000000}"/>
+          </ac:spMkLst>
+        </pc:spChg>
+      </pc:sldChg>
+      <pc:sldChg chg="modSp">
+        <pc:chgData name="Alessandro Giorgetti" userId="332e11a8ec89c5cd" providerId="Windows Live" clId="Web-{23A54F07-80E2-44E9-AC9F-C20D33936091}" dt="2023-11-28T21:23:17.262" v="27" actId="20577"/>
+        <pc:sldMkLst>
+          <pc:docMk/>
+          <pc:sldMk cId="3247008050" sldId="447"/>
+        </pc:sldMkLst>
+        <pc:spChg chg="mod">
+          <ac:chgData name="Alessandro Giorgetti" userId="332e11a8ec89c5cd" providerId="Windows Live" clId="Web-{23A54F07-80E2-44E9-AC9F-C20D33936091}" dt="2023-11-28T21:23:17.262" v="27" actId="20577"/>
+          <ac:spMkLst>
+            <pc:docMk/>
+            <pc:sldMk cId="3247008050" sldId="447"/>
+            <ac:spMk id="3" creationId="{00000000-0000-0000-0000-000000000000}"/>
+          </ac:spMkLst>
+        </pc:spChg>
+      </pc:sldChg>
+    </pc:docChg>
+  </pc:docChgLst>
 </pc:chgInfo>
 </file>
 
@@ -320,7 +390,7 @@
           <a:p>
             <a:fld id="{327B5F9E-84DB-4811-8F56-9C65E911095D}" type="datetimeFigureOut">
               <a:rPr lang="it-IT" smtClean="0"/>
-              <a:t>16/05/2023</a:t>
+              <a:t>28/11/2023</a:t>
             </a:fld>
             <a:endParaRPr lang="it-IT"/>
           </a:p>
@@ -485,7 +555,7 @@
           <a:p>
             <a:fld id="{60073984-6E99-4D80-ADB1-BFDA0D866557}" type="datetimeFigureOut">
               <a:rPr lang="en-US"/>
-              <a:t>5/16/2023</a:t>
+              <a:t>11/28/2023</a:t>
             </a:fld>
             <a:endParaRPr lang="en-US"/>
           </a:p>
@@ -906,7 +976,7 @@
           <a:p>
             <a:fld id="{C519897D-FFB3-4111-B327-449DADBE2990}" type="slidenum">
               <a:rPr lang="en-US" smtClean="0"/>
-              <a:t>11</a:t>
+              <a:t>10</a:t>
             </a:fld>
             <a:endParaRPr lang="en-US"/>
           </a:p>
@@ -990,7 +1060,7 @@
           <a:p>
             <a:fld id="{C519897D-FFB3-4111-B327-449DADBE2990}" type="slidenum">
               <a:rPr lang="en-US" smtClean="0"/>
-              <a:t>12</a:t>
+              <a:t>11</a:t>
             </a:fld>
             <a:endParaRPr lang="en-US"/>
           </a:p>
@@ -1074,7 +1144,7 @@
           <a:p>
             <a:fld id="{C519897D-FFB3-4111-B327-449DADBE2990}" type="slidenum">
               <a:rPr lang="en-US" smtClean="0"/>
-              <a:t>13</a:t>
+              <a:t>12</a:t>
             </a:fld>
             <a:endParaRPr lang="en-US"/>
           </a:p>
@@ -1158,7 +1228,7 @@
           <a:p>
             <a:fld id="{C519897D-FFB3-4111-B327-449DADBE2990}" type="slidenum">
               <a:rPr lang="en-US" smtClean="0"/>
-              <a:t>14</a:t>
+              <a:t>13</a:t>
             </a:fld>
             <a:endParaRPr lang="en-US"/>
           </a:p>
@@ -1242,7 +1312,7 @@
           <a:p>
             <a:fld id="{C519897D-FFB3-4111-B327-449DADBE2990}" type="slidenum">
               <a:rPr lang="en-US" smtClean="0"/>
-              <a:t>15</a:t>
+              <a:t>14</a:t>
             </a:fld>
             <a:endParaRPr lang="en-US"/>
           </a:p>
@@ -1326,7 +1396,7 @@
           <a:p>
             <a:fld id="{C519897D-FFB3-4111-B327-449DADBE2990}" type="slidenum">
               <a:rPr lang="en-US" smtClean="0"/>
-              <a:t>16</a:t>
+              <a:t>15</a:t>
             </a:fld>
             <a:endParaRPr lang="en-US"/>
           </a:p>
@@ -1410,7 +1480,7 @@
           <a:p>
             <a:fld id="{C519897D-FFB3-4111-B327-449DADBE2990}" type="slidenum">
               <a:rPr lang="en-US" smtClean="0"/>
-              <a:t>17</a:t>
+              <a:t>16</a:t>
             </a:fld>
             <a:endParaRPr lang="en-US"/>
           </a:p>
@@ -1494,7 +1564,7 @@
           <a:p>
             <a:fld id="{C519897D-FFB3-4111-B327-449DADBE2990}" type="slidenum">
               <a:rPr lang="en-US" smtClean="0"/>
-              <a:t>18</a:t>
+              <a:t>17</a:t>
             </a:fld>
             <a:endParaRPr lang="en-US"/>
           </a:p>
@@ -1578,7 +1648,7 @@
           <a:p>
             <a:fld id="{C519897D-FFB3-4111-B327-449DADBE2990}" type="slidenum">
               <a:rPr lang="en-US" smtClean="0"/>
-              <a:t>19</a:t>
+              <a:t>18</a:t>
             </a:fld>
             <a:endParaRPr lang="en-US"/>
           </a:p>
@@ -1662,7 +1732,7 @@
           <a:p>
             <a:fld id="{C519897D-FFB3-4111-B327-449DADBE2990}" type="slidenum">
               <a:rPr lang="en-US" smtClean="0"/>
-              <a:t>20</a:t>
+              <a:t>19</a:t>
             </a:fld>
             <a:endParaRPr lang="en-US"/>
           </a:p>
@@ -1830,7 +1900,7 @@
           <a:p>
             <a:fld id="{C519897D-FFB3-4111-B327-449DADBE2990}" type="slidenum">
               <a:rPr lang="en-US" smtClean="0"/>
-              <a:t>21</a:t>
+              <a:t>20</a:t>
             </a:fld>
             <a:endParaRPr lang="en-US"/>
           </a:p>
@@ -1914,7 +1984,7 @@
           <a:p>
             <a:fld id="{C519897D-FFB3-4111-B327-449DADBE2990}" type="slidenum">
               <a:rPr lang="en-US" smtClean="0"/>
-              <a:t>22</a:t>
+              <a:t>21</a:t>
             </a:fld>
             <a:endParaRPr lang="en-US"/>
           </a:p>
@@ -1998,7 +2068,7 @@
           <a:p>
             <a:fld id="{C519897D-FFB3-4111-B327-449DADBE2990}" type="slidenum">
               <a:rPr lang="en-US" smtClean="0"/>
-              <a:t>23</a:t>
+              <a:t>22</a:t>
             </a:fld>
             <a:endParaRPr lang="en-US"/>
           </a:p>
@@ -2082,7 +2152,7 @@
           <a:p>
             <a:fld id="{C519897D-FFB3-4111-B327-449DADBE2990}" type="slidenum">
               <a:rPr lang="en-US" smtClean="0"/>
-              <a:t>24</a:t>
+              <a:t>23</a:t>
             </a:fld>
             <a:endParaRPr lang="en-US"/>
           </a:p>
@@ -2166,7 +2236,7 @@
           <a:p>
             <a:fld id="{C519897D-FFB3-4111-B327-449DADBE2990}" type="slidenum">
               <a:rPr lang="en-US" smtClean="0"/>
-              <a:t>25</a:t>
+              <a:t>24</a:t>
             </a:fld>
             <a:endParaRPr lang="en-US"/>
           </a:p>
@@ -2250,7 +2320,7 @@
           <a:p>
             <a:fld id="{C519897D-FFB3-4111-B327-449DADBE2990}" type="slidenum">
               <a:rPr lang="en-US" smtClean="0"/>
-              <a:t>26</a:t>
+              <a:t>25</a:t>
             </a:fld>
             <a:endParaRPr lang="en-US"/>
           </a:p>
@@ -2334,7 +2404,7 @@
           <a:p>
             <a:fld id="{C519897D-FFB3-4111-B327-449DADBE2990}" type="slidenum">
               <a:rPr lang="en-US" smtClean="0"/>
-              <a:t>27</a:t>
+              <a:t>26</a:t>
             </a:fld>
             <a:endParaRPr lang="en-US"/>
           </a:p>
@@ -2684,7 +2754,7 @@
           <a:p>
             <a:fld id="{C519897D-FFB3-4111-B327-449DADBE2990}" type="slidenum">
               <a:rPr lang="en-US" smtClean="0"/>
-              <a:t>28</a:t>
+              <a:t>27</a:t>
             </a:fld>
             <a:endParaRPr lang="en-US"/>
           </a:p>
@@ -2768,7 +2838,7 @@
           <a:p>
             <a:fld id="{C519897D-FFB3-4111-B327-449DADBE2990}" type="slidenum">
               <a:rPr lang="en-US" smtClean="0"/>
-              <a:t>29</a:t>
+              <a:t>28</a:t>
             </a:fld>
             <a:endParaRPr lang="en-US"/>
           </a:p>
@@ -2852,7 +2922,7 @@
           <a:p>
             <a:fld id="{C519897D-FFB3-4111-B327-449DADBE2990}" type="slidenum">
               <a:rPr lang="en-US" smtClean="0"/>
-              <a:t>30</a:t>
+              <a:t>29</a:t>
             </a:fld>
             <a:endParaRPr lang="en-US"/>
           </a:p>
@@ -3020,7 +3090,7 @@
           <a:p>
             <a:fld id="{C519897D-FFB3-4111-B327-449DADBE2990}" type="slidenum">
               <a:rPr lang="en-US" smtClean="0"/>
-              <a:t>31</a:t>
+              <a:t>30</a:t>
             </a:fld>
             <a:endParaRPr lang="en-US"/>
           </a:p>
@@ -3188,7 +3258,7 @@
           <a:p>
             <a:fld id="{C519897D-FFB3-4111-B327-449DADBE2990}" type="slidenum">
               <a:rPr lang="en-US" smtClean="0"/>
-              <a:t>6</a:t>
+              <a:t>5</a:t>
             </a:fld>
             <a:endParaRPr lang="en-US"/>
           </a:p>
@@ -3272,7 +3342,7 @@
           <a:p>
             <a:fld id="{C519897D-FFB3-4111-B327-449DADBE2990}" type="slidenum">
               <a:rPr lang="en-US" smtClean="0"/>
-              <a:t>7</a:t>
+              <a:t>6</a:t>
             </a:fld>
             <a:endParaRPr lang="en-US"/>
           </a:p>
@@ -3356,7 +3426,7 @@
           <a:p>
             <a:fld id="{C519897D-FFB3-4111-B327-449DADBE2990}" type="slidenum">
               <a:rPr lang="en-US" smtClean="0"/>
-              <a:t>8</a:t>
+              <a:t>7</a:t>
             </a:fld>
             <a:endParaRPr lang="en-US"/>
           </a:p>
@@ -3440,7 +3510,7 @@
           <a:p>
             <a:fld id="{C519897D-FFB3-4111-B327-449DADBE2990}" type="slidenum">
               <a:rPr lang="en-US" smtClean="0"/>
-              <a:t>9</a:t>
+              <a:t>8</a:t>
             </a:fld>
             <a:endParaRPr lang="en-US"/>
           </a:p>
@@ -3524,7 +3594,7 @@
           <a:p>
             <a:fld id="{C519897D-FFB3-4111-B327-449DADBE2990}" type="slidenum">
               <a:rPr lang="en-US" smtClean="0"/>
-              <a:t>10</a:t>
+              <a:t>9</a:t>
             </a:fld>
             <a:endParaRPr lang="en-US"/>
           </a:p>
@@ -3767,7 +3837,7 @@
           <a:p>
             <a:fld id="{F1FA7AC5-6045-4418-8E60-F48788734473}" type="datetimeFigureOut">
               <a:rPr lang="en-US" smtClean="0"/>
-              <a:t>5/16/2023</a:t>
+              <a:t>11/28/2023</a:t>
             </a:fld>
             <a:endParaRPr lang="en-US"/>
           </a:p>
@@ -3973,7 +4043,7 @@
           <a:p>
             <a:fld id="{F1FA7AC5-6045-4418-8E60-F48788734473}" type="datetimeFigureOut">
               <a:rPr lang="en-US" smtClean="0"/>
-              <a:t>5/16/2023</a:t>
+              <a:t>11/28/2023</a:t>
             </a:fld>
             <a:endParaRPr lang="en-US"/>
           </a:p>
@@ -4227,7 +4297,7 @@
           <a:p>
             <a:fld id="{F1FA7AC5-6045-4418-8E60-F48788734473}" type="datetimeFigureOut">
               <a:rPr lang="en-US" smtClean="0"/>
-              <a:t>5/16/2023</a:t>
+              <a:t>11/28/2023</a:t>
             </a:fld>
             <a:endParaRPr lang="en-US"/>
           </a:p>
@@ -4395,7 +4465,7 @@
           <a:p>
             <a:fld id="{F1FA7AC5-6045-4418-8E60-F48788734473}" type="datetimeFigureOut">
               <a:rPr lang="en-US" smtClean="0"/>
-              <a:t>5/16/2023</a:t>
+              <a:t>11/28/2023</a:t>
             </a:fld>
             <a:endParaRPr lang="en-US"/>
           </a:p>
@@ -4737,7 +4807,7 @@
           <a:p>
             <a:fld id="{F1FA7AC5-6045-4418-8E60-F48788734473}" type="datetimeFigureOut">
               <a:rPr lang="en-US" smtClean="0"/>
-              <a:t>5/16/2023</a:t>
+              <a:t>11/28/2023</a:t>
             </a:fld>
             <a:endParaRPr lang="en-US"/>
           </a:p>
@@ -5009,7 +5079,7 @@
           <a:p>
             <a:fld id="{F1FA7AC5-6045-4418-8E60-F48788734473}" type="datetimeFigureOut">
               <a:rPr lang="en-US" smtClean="0"/>
-              <a:t>5/16/2023</a:t>
+              <a:t>11/28/2023</a:t>
             </a:fld>
             <a:endParaRPr lang="en-US"/>
           </a:p>
@@ -5385,7 +5455,7 @@
           <a:p>
             <a:fld id="{F1FA7AC5-6045-4418-8E60-F48788734473}" type="datetimeFigureOut">
               <a:rPr lang="en-US" smtClean="0"/>
-              <a:t>5/16/2023</a:t>
+              <a:t>11/28/2023</a:t>
             </a:fld>
             <a:endParaRPr lang="en-US"/>
           </a:p>
@@ -5502,7 +5572,7 @@
           <a:p>
             <a:fld id="{F1FA7AC5-6045-4418-8E60-F48788734473}" type="datetimeFigureOut">
               <a:rPr lang="en-US" smtClean="0"/>
-              <a:t>5/16/2023</a:t>
+              <a:t>11/28/2023</a:t>
             </a:fld>
             <a:endParaRPr lang="en-US"/>
           </a:p>
@@ -5673,7 +5743,7 @@
           <a:p>
             <a:fld id="{F1FA7AC5-6045-4418-8E60-F48788734473}" type="datetimeFigureOut">
               <a:rPr lang="en-US" smtClean="0"/>
-              <a:t>5/16/2023</a:t>
+              <a:t>11/28/2023</a:t>
             </a:fld>
             <a:endParaRPr lang="en-US"/>
           </a:p>
@@ -6025,7 +6095,7 @@
           <a:p>
             <a:fld id="{F1FA7AC5-6045-4418-8E60-F48788734473}" type="datetimeFigureOut">
               <a:rPr lang="en-US" smtClean="0"/>
-              <a:t>5/16/2023</a:t>
+              <a:t>11/28/2023</a:t>
             </a:fld>
             <a:endParaRPr lang="en-US"/>
           </a:p>
@@ -6400,7 +6470,7 @@
           <a:p>
             <a:fld id="{F1FA7AC5-6045-4418-8E60-F48788734473}" type="datetimeFigureOut">
               <a:rPr lang="en-US" smtClean="0"/>
-              <a:t>5/16/2023</a:t>
+              <a:t>11/28/2023</a:t>
             </a:fld>
             <a:endParaRPr lang="en-US"/>
           </a:p>
@@ -6685,7 +6755,7 @@
           <a:p>
             <a:fld id="{F1FA7AC5-6045-4418-8E60-F48788734473}" type="datetimeFigureOut">
               <a:rPr lang="en-US" smtClean="0"/>
-              <a:t>5/16/2023</a:t>
+              <a:t>11/28/2023</a:t>
             </a:fld>
             <a:endParaRPr lang="en-US"/>
           </a:p>
@@ -7972,7 +8042,7 @@
         </p:nvSpPr>
         <p:spPr/>
         <p:txBody>
-          <a:bodyPr>
+          <a:bodyPr vert="horz" lIns="0" tIns="45720" rIns="0" bIns="45720" rtlCol="0" anchor="t">
             <a:normAutofit/>
           </a:bodyPr>
           <a:lstStyle/>
@@ -8077,7 +8147,7 @@
             </a:r>
             <a:r>
               <a:rPr lang="en-US" sz="2400" dirty="0"/>
-              <a:t>: are centralized dispatchers to control concurrency, allowing us to coordinate when computation happens on e.g.: </a:t>
+              <a:t>: are centralized dispatchers that control concurrency, allowing us to coordinate when computation happens on e.g.: </a:t>
             </a:r>
             <a:r>
               <a:rPr lang="en-US" sz="2400" dirty="0" err="1"/>
@@ -9265,52 +9335,12 @@
         </p:nvSpPr>
         <p:spPr/>
         <p:txBody>
-          <a:bodyPr/>
+          <a:bodyPr vert="horz" lIns="0" tIns="45720" rIns="0" bIns="45720" rtlCol="0" anchor="t">
+            <a:normAutofit/>
+          </a:bodyPr>
           <a:lstStyle/>
           <a:p>
             <a:endParaRPr lang="it-IT" dirty="0"/>
-          </a:p>
-          <a:p>
-            <a:r>
-              <a:rPr lang="it-IT" dirty="0" err="1"/>
-              <a:t>Looking</a:t>
-            </a:r>
-            <a:r>
-              <a:rPr lang="it-IT" dirty="0"/>
-              <a:t> for </a:t>
-            </a:r>
-            <a:r>
-              <a:rPr lang="it-IT" dirty="0" err="1"/>
-              <a:t>Reactive</a:t>
-            </a:r>
-            <a:r>
-              <a:rPr lang="it-IT" dirty="0"/>
-              <a:t> Programming in </a:t>
-            </a:r>
-            <a:r>
-              <a:rPr lang="it-IT" dirty="0" err="1"/>
-              <a:t>your</a:t>
-            </a:r>
-            <a:r>
-              <a:rPr lang="it-IT" dirty="0"/>
-              <a:t> favorite </a:t>
-            </a:r>
-            <a:r>
-              <a:rPr lang="it-IT" dirty="0" err="1"/>
-              <a:t>search</a:t>
-            </a:r>
-            <a:r>
-              <a:rPr lang="it-IT" dirty="0"/>
-              <a:t> </a:t>
-            </a:r>
-            <a:r>
-              <a:rPr lang="it-IT" dirty="0" err="1"/>
-              <a:t>engine</a:t>
-            </a:r>
-            <a:r>
-              <a:rPr lang="it-IT" dirty="0"/>
-              <a:t>:</a:t>
-            </a:r>
           </a:p>
           <a:p>
             <a:endParaRPr lang="it-IT" dirty="0"/>
@@ -9337,21 +9367,20 @@
               <a:buFont typeface="Arial" panose="020B0604020202020204" pitchFamily="34" charset="0"/>
               <a:buChar char="•"/>
             </a:pPr>
-            <a:r>
-              <a:rPr lang="it-IT" dirty="0" err="1"/>
+            <a:endParaRPr lang="it-IT" dirty="0"/>
+          </a:p>
+          <a:p>
+            <a:pPr>
+              <a:buFont typeface="Arial" panose="020B0604020202020204" pitchFamily="34" charset="0"/>
+              <a:buChar char="•"/>
+            </a:pPr>
+            <a:r>
+              <a:rPr lang="it-IT" err="1"/>
               <a:t>Stack</a:t>
             </a:r>
             <a:r>
               <a:rPr lang="it-IT" dirty="0"/>
-              <a:t> </a:t>
-            </a:r>
-            <a:r>
-              <a:rPr lang="it-IT" dirty="0" err="1"/>
-              <a:t>Overflow</a:t>
-            </a:r>
-            <a:r>
-              <a:rPr lang="it-IT" dirty="0"/>
-              <a:t>: </a:t>
+              <a:t> Overflow: </a:t>
             </a:r>
             <a:r>
               <a:rPr lang="it-IT" dirty="0">
@@ -9359,6 +9388,13 @@
               </a:rPr>
               <a:t>https://stackoverflow.com/questions/1028250/what-is-functional-reactive-programming</a:t>
             </a:r>
+            <a:endParaRPr lang="it-IT" dirty="0"/>
+          </a:p>
+          <a:p>
+            <a:pPr>
+              <a:buFont typeface="Arial" panose="020B0604020202020204" pitchFamily="34" charset="0"/>
+              <a:buChar char="•"/>
+            </a:pPr>
             <a:endParaRPr lang="it-IT" dirty="0"/>
           </a:p>
           <a:p>
@@ -9443,7 +9479,7 @@
                                         <p:tgtEl>
                                           <p:spTgt spid="3">
                                             <p:txEl>
-                                              <p:pRg st="3" end="3"/>
+                                              <p:pRg st="2" end="2"/>
                                             </p:txEl>
                                           </p:spTgt>
                                         </p:tgtEl>
@@ -9461,7 +9497,7 @@
                                         <p:tgtEl>
                                           <p:spTgt spid="3">
                                             <p:txEl>
-                                              <p:pRg st="3" end="3"/>
+                                              <p:pRg st="2" end="2"/>
                                             </p:txEl>
                                           </p:spTgt>
                                         </p:tgtEl>
@@ -9547,7 +9583,7 @@
                                         <p:tgtEl>
                                           <p:spTgt spid="3">
                                             <p:txEl>
-                                              <p:pRg st="5" end="5"/>
+                                              <p:pRg st="6" end="6"/>
                                             </p:txEl>
                                           </p:spTgt>
                                         </p:tgtEl>
@@ -9565,7 +9601,7 @@
                                         <p:tgtEl>
                                           <p:spTgt spid="3">
                                             <p:txEl>
-                                              <p:pRg st="5" end="5"/>
+                                              <p:pRg st="6" end="6"/>
                                             </p:txEl>
                                           </p:spTgt>
                                         </p:tgtEl>
@@ -10538,7 +10574,7 @@
         <p:spPr/>
         <p:txBody>
           <a:bodyPr>
-            <a:normAutofit/>
+            <a:normAutofit fontScale="90000"/>
           </a:bodyPr>
           <a:lstStyle/>
           <a:p>
@@ -10553,15 +10589,28 @@
               <a:rPr lang="it-IT" dirty="0"/>
             </a:br>
             <a:r>
-              <a:rPr lang="it-IT" dirty="0"/>
+              <a:rPr lang="it-IT" err="1"/>
+              <a:t>firstValueFrom</a:t>
+            </a:r>
+            <a:r>
+              <a:rPr lang="it-IT" dirty="0"/>
+              <a:t>()</a:t>
+            </a:r>
+            <a:br>
+              <a:rPr lang="it-IT" dirty="0">
+                <a:cs typeface="Calibri Light"/>
+              </a:rPr>
+            </a:br>
+            <a:r>
+              <a:rPr lang="it-IT" strike="sngStrike" dirty="0"/>
               <a:t>.</a:t>
             </a:r>
             <a:r>
-              <a:rPr lang="it-IT" dirty="0" err="1"/>
+              <a:rPr lang="it-IT" strike="sngStrike" err="1"/>
               <a:t>toPromise</a:t>
             </a:r>
             <a:r>
-              <a:rPr lang="it-IT" dirty="0"/>
+              <a:rPr lang="it-IT" strike="sngStrike" dirty="0"/>
               <a:t>()</a:t>
             </a:r>
           </a:p>
@@ -11158,7 +11207,7 @@
         </p:nvSpPr>
         <p:spPr/>
         <p:txBody>
-          <a:bodyPr>
+          <a:bodyPr vert="horz" lIns="0" tIns="45720" rIns="0" bIns="45720" rtlCol="0" anchor="t">
             <a:normAutofit/>
           </a:bodyPr>
           <a:lstStyle/>
@@ -11220,15 +11269,7 @@
             </a:r>
             <a:r>
               <a:rPr lang="it-IT" dirty="0"/>
-              <a:t> </a:t>
-            </a:r>
-            <a:r>
-              <a:rPr lang="it-IT" dirty="0" err="1"/>
-              <a:t>one</a:t>
-            </a:r>
-            <a:r>
-              <a:rPr lang="it-IT" dirty="0"/>
-              <a:t>. </a:t>
+              <a:t> one. </a:t>
             </a:r>
             <a:br>
               <a:rPr lang="it-IT" dirty="0"/>
@@ -11349,15 +11390,7 @@
             </a:r>
             <a:r>
               <a:rPr lang="it-IT" dirty="0"/>
-              <a:t> in a single </a:t>
-            </a:r>
-            <a:r>
-              <a:rPr lang="it-IT" dirty="0" err="1"/>
-              <a:t>stream</a:t>
-            </a:r>
-            <a:r>
-              <a:rPr lang="it-IT" dirty="0"/>
-              <a:t>. </a:t>
+              <a:t> in a single stream. </a:t>
             </a:r>
             <a:br>
               <a:rPr lang="it-IT" dirty="0"/>
@@ -11403,12 +11436,8 @@
               <a:t>. </a:t>
             </a:r>
             <a:r>
-              <a:rPr lang="it-IT" b="1" dirty="0" err="1"/>
-              <a:t>Better</a:t>
-            </a:r>
-            <a:r>
               <a:rPr lang="it-IT" b="1" dirty="0"/>
-              <a:t> </a:t>
+              <a:t>Better </a:t>
             </a:r>
             <a:r>
               <a:rPr lang="it-IT" b="1" dirty="0" err="1"/>
@@ -11573,12 +11602,8 @@
               <a:t>. </a:t>
             </a:r>
             <a:r>
-              <a:rPr lang="it-IT" b="1" dirty="0" err="1"/>
-              <a:t>Better</a:t>
-            </a:r>
-            <a:r>
               <a:rPr lang="it-IT" b="1" dirty="0"/>
-              <a:t> </a:t>
+              <a:t>Better </a:t>
             </a:r>
             <a:r>
               <a:rPr lang="it-IT" b="1" dirty="0" err="1"/>
@@ -11629,10 +11654,12 @@
               <a:t>operations</a:t>
             </a:r>
             <a:r>
-              <a:rPr lang="it-IT" b="1"/>
-              <a:t>-</a:t>
-            </a:r>
-            <a:endParaRPr lang="it-IT" dirty="0"/>
+              <a:rPr lang="it-IT" b="1" dirty="0"/>
+              <a:t>.</a:t>
+            </a:r>
+            <a:endParaRPr lang="it-IT" b="1" dirty="0">
+              <a:cs typeface="Calibri"/>
+            </a:endParaRPr>
           </a:p>
           <a:p>
             <a:pPr>
@@ -11697,15 +11724,7 @@
             </a:r>
             <a:r>
               <a:rPr lang="it-IT" b="1" dirty="0"/>
-              <a:t> </a:t>
-            </a:r>
-            <a:r>
-              <a:rPr lang="it-IT" b="1" dirty="0" err="1"/>
-              <a:t>one</a:t>
-            </a:r>
-            <a:r>
-              <a:rPr lang="it-IT" b="1" dirty="0"/>
-              <a:t> </a:t>
+              <a:t> one </a:t>
             </a:r>
             <a:r>
               <a:rPr lang="it-IT" b="1" dirty="0" err="1"/>

</xml_diff>